<commit_message>
"Tag-2_5: CIOps vs GitOps Animationen hinzugefügt
</commit_message>
<xml_diff>
--- a/slides/Tag-2_5-GitOps.pptx
+++ b/slides/Tag-2_5-GitOps.pptx
@@ -1216,6 +1216,10 @@
             </a:r>
           </a:p>
           <a:p>
+            <a:pPr marL="171450" indent="-171450">
+              <a:buFont typeface="Arial" panose="020B0604020202020204" pitchFamily="34" charset="0"/>
+              <a:buChar char="•"/>
+            </a:pPr>
             <a:r>
               <a:rPr lang="de-DE" dirty="0"/>
               <a:t>Softwareentwickler pushen Code in ein </a:t>
@@ -1226,7 +1230,17 @@
             </a:r>
             <a:r>
               <a:rPr lang="de-DE" dirty="0"/>
-              <a:t> Repo. Auf das </a:t>
+              <a:t> Repo. </a:t>
+            </a:r>
+          </a:p>
+          <a:p>
+            <a:pPr marL="171450" indent="-171450">
+              <a:buFont typeface="Arial" panose="020B0604020202020204" pitchFamily="34" charset="0"/>
+              <a:buChar char="•"/>
+            </a:pPr>
+            <a:r>
+              <a:rPr lang="de-DE" dirty="0"/>
+              <a:t>Auf das </a:t>
             </a:r>
             <a:r>
               <a:rPr lang="de-DE" dirty="0" err="1"/>
@@ -1234,7 +1248,17 @@
             </a:r>
             <a:r>
               <a:rPr lang="de-DE" dirty="0"/>
-              <a:t> Repo lauscht ein CI Server. Dieser baut, testet, </a:t>
+              <a:t> Repo lauscht ein CI Server.</a:t>
+            </a:r>
+          </a:p>
+          <a:p>
+            <a:pPr marL="171450" indent="-171450">
+              <a:buFont typeface="Arial" panose="020B0604020202020204" pitchFamily="34" charset="0"/>
+              <a:buChar char="•"/>
+            </a:pPr>
+            <a:r>
+              <a:rPr lang="de-DE" dirty="0"/>
+              <a:t>Dieser baut, testet, </a:t>
             </a:r>
             <a:r>
               <a:rPr lang="de-DE" dirty="0" err="1"/>
@@ -1242,7 +1266,17 @@
             </a:r>
             <a:r>
               <a:rPr lang="de-DE" dirty="0"/>
-              <a:t>, statisch analysiert und wenn das alles erfolgreich war, wird in </a:t>
+              <a:t>, statisch analysiert und </a:t>
+            </a:r>
+          </a:p>
+          <a:p>
+            <a:pPr marL="628650" lvl="1" indent="-171450">
+              <a:buFont typeface="Arial" panose="020B0604020202020204" pitchFamily="34" charset="0"/>
+              <a:buChar char="•"/>
+            </a:pPr>
+            <a:r>
+              <a:rPr lang="de-DE" dirty="0"/>
+              <a:t>wenn das alles erfolgreich war, wird in </a:t>
             </a:r>
             <a:r>
               <a:rPr lang="de-DE" dirty="0" err="1"/>
@@ -1258,7 +1292,16 @@
             </a:r>
             <a:r>
               <a:rPr lang="de-DE" dirty="0"/>
-              <a:t>. „Push“-Prinzip (durch den deploy-Pfeil!), wie der Code in die produktive Umgebung kommt.</a:t>
+              <a:t>. </a:t>
+            </a:r>
+          </a:p>
+          <a:p>
+            <a:endParaRPr lang="de-DE" dirty="0"/>
+          </a:p>
+          <a:p>
+            <a:r>
+              <a:rPr lang="de-DE" dirty="0"/>
+              <a:t>„Push“-Prinzip (durch den deploy-Pfeil!), wie der Code in die produktive Umgebung kommt.</a:t>
             </a:r>
           </a:p>
           <a:p>
@@ -1282,6 +1325,46 @@
             <a:endParaRPr lang="de-DE" dirty="0"/>
           </a:p>
           <a:p>
+            <a:pPr marL="171450" indent="-171450">
+              <a:buFont typeface="Arial" panose="020B0604020202020204" pitchFamily="34" charset="0"/>
+              <a:buChar char="•"/>
+            </a:pPr>
+            <a:r>
+              <a:rPr lang="de-DE" dirty="0"/>
+              <a:t>Softwareentwickler pushen Code in ein </a:t>
+            </a:r>
+            <a:r>
+              <a:rPr lang="de-DE" dirty="0" err="1"/>
+              <a:t>Git</a:t>
+            </a:r>
+            <a:r>
+              <a:rPr lang="de-DE" dirty="0"/>
+              <a:t> Repo. </a:t>
+            </a:r>
+          </a:p>
+          <a:p>
+            <a:pPr marL="171450" indent="-171450">
+              <a:buFont typeface="Arial" panose="020B0604020202020204" pitchFamily="34" charset="0"/>
+              <a:buChar char="•"/>
+            </a:pPr>
+            <a:r>
+              <a:rPr lang="de-DE" dirty="0"/>
+              <a:t>Auf das </a:t>
+            </a:r>
+            <a:r>
+              <a:rPr lang="de-DE" dirty="0" err="1"/>
+              <a:t>Git</a:t>
+            </a:r>
+            <a:r>
+              <a:rPr lang="de-DE" dirty="0"/>
+              <a:t> Repo lauscht ein CI Server.</a:t>
+            </a:r>
+          </a:p>
+          <a:p>
+            <a:pPr marL="171450" indent="-171450">
+              <a:buFont typeface="Arial" panose="020B0604020202020204" pitchFamily="34" charset="0"/>
+              <a:buChar char="•"/>
+            </a:pPr>
             <a:r>
               <a:rPr lang="de-DE" dirty="0"/>
               <a:t>Der/das Cluster zieht sich sein Stake aus dem </a:t>
@@ -1292,7 +1375,17 @@
             </a:r>
             <a:r>
               <a:rPr lang="de-DE" dirty="0"/>
-              <a:t> selbst. Das geschieht durch die Umsetzung des Operator-Pattern im </a:t>
+              <a:t> selbst. </a:t>
+            </a:r>
+          </a:p>
+          <a:p>
+            <a:pPr marL="171450" indent="-171450">
+              <a:buFont typeface="Arial" panose="020B0604020202020204" pitchFamily="34" charset="0"/>
+              <a:buChar char="•"/>
+            </a:pPr>
+            <a:r>
+              <a:rPr lang="de-DE" dirty="0"/>
+              <a:t>Das geschieht durch die Umsetzung des Operator-Pattern im </a:t>
             </a:r>
             <a:r>
               <a:rPr lang="de-DE" dirty="0" err="1"/>
@@ -1300,7 +1393,17 @@
             </a:r>
             <a:r>
               <a:rPr lang="de-DE" dirty="0"/>
-              <a:t>. Der </a:t>
+              <a:t>. </a:t>
+            </a:r>
+          </a:p>
+          <a:p>
+            <a:pPr marL="171450" indent="-171450">
+              <a:buFont typeface="Arial" panose="020B0604020202020204" pitchFamily="34" charset="0"/>
+              <a:buChar char="•"/>
+            </a:pPr>
+            <a:r>
+              <a:rPr lang="de-DE" dirty="0"/>
+              <a:t>Der </a:t>
             </a:r>
             <a:r>
               <a:rPr lang="de-DE" dirty="0" err="1"/>
@@ -1316,7 +1419,17 @@
             </a:r>
             <a:r>
               <a:rPr lang="de-DE" dirty="0"/>
-              <a:t> Repo und dort den Zielzustand des Systems abruft (= SOLL-Zustand) und dieser wird verglichen mit dem IST-Zustand (bereitgestellt durch den API Server) des Clusters. Wenn es zwischen diesen beiden Zuständen einen Unterschied gibt, dann wird der </a:t>
+              <a:t> Repo und dort den Zielzustand des Systems abruft (= SOLL-Zustand) und dieser wird verglichen mit dem IST-Zustand (bereitgestellt durch den API Server) des Clusters.</a:t>
+            </a:r>
+          </a:p>
+          <a:p>
+            <a:pPr marL="171450" indent="-171450">
+              <a:buFont typeface="Arial" panose="020B0604020202020204" pitchFamily="34" charset="0"/>
+              <a:buChar char="•"/>
+            </a:pPr>
+            <a:r>
+              <a:rPr lang="de-DE" dirty="0"/>
+              <a:t>Wenn es zwischen diesen beiden Zuständen einen Unterschied gibt, dann wird der </a:t>
             </a:r>
             <a:r>
               <a:rPr lang="de-DE" dirty="0" err="1"/>
@@ -5756,7 +5869,7 @@
                 <a:effectLst/>
                 <a:latin typeface="Inter"/>
               </a:rPr>
-              <a:t>- GitLab</a:t>
+              <a:t>- Someone from GitLab</a:t>
             </a:r>
             <a:endParaRPr lang="de-DE" altLang="de-DE" b="1" dirty="0"/>
           </a:p>
@@ -8241,25 +8354,28 @@
               <a:buNone/>
               <a:tabLst/>
             </a:pPr>
-            <a:endParaRPr kumimoji="0" lang="de-DE" sz="2400" b="0" i="0" u="none" strike="noStrike" cap="none" normalizeH="0" baseline="0">
-              <a:ln>
-                <a:noFill/>
-              </a:ln>
-              <a:solidFill>
-                <a:schemeClr val="tx1"/>
-              </a:solidFill>
-              <a:effectLst/>
-              <a:latin typeface="Times New Roman" pitchFamily="18" charset="0"/>
-            </a:endParaRPr>
+            <a:r>
+              <a:rPr kumimoji="0" lang="de-DE" sz="900" b="0" i="0" u="none" strike="noStrike" cap="none" normalizeH="0" baseline="0" dirty="0">
+                <a:ln>
+                  <a:noFill/>
+                </a:ln>
+                <a:solidFill>
+                  <a:schemeClr val="tx1"/>
+                </a:solidFill>
+                <a:effectLst/>
+                <a:latin typeface="+mj-lt"/>
+              </a:rPr>
+              <a:t>imperative</a:t>
+            </a:r>
           </a:p>
         </p:txBody>
       </p:sp>
       <p:sp>
         <p:nvSpPr>
-          <p:cNvPr id="29" name="Rechteck: obere Ecken, eine abgerundet, eine abgeschnitten 28">
+          <p:cNvPr id="5" name="Rechteck: obere Ecken, eine abgerundet, eine abgeschnitten 4">
             <a:extLst>
               <a:ext uri="{FF2B5EF4-FFF2-40B4-BE49-F238E27FC236}">
-                <a16:creationId xmlns:a16="http://schemas.microsoft.com/office/drawing/2014/main" id="{FBA6C3EB-7B7B-4500-4AD9-666285D204F2}"/>
+                <a16:creationId xmlns:a16="http://schemas.microsoft.com/office/drawing/2014/main" id="{2226134A-CC6D-1671-A7DD-519895B25887}"/>
               </a:ext>
             </a:extLst>
           </p:cNvPr>
@@ -8268,7 +8384,7 @@
         </p:nvSpPr>
         <p:spPr bwMode="auto">
           <a:xfrm>
-            <a:off x="6835751" y="4614354"/>
+            <a:off x="6835751" y="4587383"/>
             <a:ext cx="847079" cy="466169"/>
           </a:xfrm>
           <a:prstGeom prst="snipRoundRect">
@@ -8312,7 +8428,20 @@
               <a:buNone/>
               <a:tabLst/>
             </a:pPr>
-            <a:endParaRPr kumimoji="0" lang="de-DE" sz="2400" b="0" i="0" u="none" strike="noStrike" cap="none" normalizeH="0" baseline="0">
+            <a:r>
+              <a:rPr kumimoji="0" lang="de-DE" sz="900" b="0" i="0" u="none" strike="noStrike" cap="none" normalizeH="0" baseline="0" dirty="0" err="1">
+                <a:ln>
+                  <a:noFill/>
+                </a:ln>
+                <a:solidFill>
+                  <a:schemeClr val="tx1"/>
+                </a:solidFill>
+                <a:effectLst/>
+                <a:latin typeface="+mj-lt"/>
+              </a:rPr>
+              <a:t>declarative</a:t>
+            </a:r>
+            <a:endParaRPr kumimoji="0" lang="de-DE" sz="900" b="0" i="0" u="none" strike="noStrike" cap="none" normalizeH="0" baseline="0" dirty="0">
               <a:ln>
                 <a:noFill/>
               </a:ln>
@@ -8320,7 +8449,101 @@
                 <a:schemeClr val="tx1"/>
               </a:solidFill>
               <a:effectLst/>
-              <a:latin typeface="Times New Roman" pitchFamily="18" charset="0"/>
+              <a:latin typeface="+mj-lt"/>
+            </a:endParaRPr>
+          </a:p>
+        </p:txBody>
+      </p:sp>
+      <p:sp>
+        <p:nvSpPr>
+          <p:cNvPr id="7" name="Textfeld 6">
+            <a:extLst>
+              <a:ext uri="{FF2B5EF4-FFF2-40B4-BE49-F238E27FC236}">
+                <a16:creationId xmlns:a16="http://schemas.microsoft.com/office/drawing/2014/main" id="{EAC57911-102C-7D7D-9E19-46FB8DC3E2F8}"/>
+              </a:ext>
+            </a:extLst>
+          </p:cNvPr>
+          <p:cNvSpPr txBox="1"/>
+          <p:nvPr/>
+        </p:nvSpPr>
+        <p:spPr bwMode="auto">
+          <a:xfrm>
+            <a:off x="4835969" y="2375279"/>
+            <a:ext cx="453970" cy="230832"/>
+          </a:xfrm>
+          <a:prstGeom prst="rect">
+            <a:avLst/>
+          </a:prstGeom>
+          <a:noFill/>
+          <a:ln w="9525">
+            <a:noFill/>
+            <a:miter lim="800000"/>
+            <a:headEnd/>
+            <a:tailEnd/>
+          </a:ln>
+        </p:spPr>
+        <p:txBody>
+          <a:bodyPr wrap="none" rtlCol="0" anchor="ctr">
+            <a:spAutoFit/>
+          </a:bodyPr>
+          <a:lstStyle/>
+          <a:p>
+            <a:pPr eaLnBrk="1" hangingPunct="1"/>
+            <a:r>
+              <a:rPr lang="de-DE" sz="900" b="1" dirty="0" err="1">
+                <a:latin typeface="Arial" charset="0"/>
+              </a:rPr>
+              <a:t>once</a:t>
+            </a:r>
+            <a:endParaRPr lang="de-DE" sz="900" b="1" dirty="0">
+              <a:latin typeface="Arial" charset="0"/>
+            </a:endParaRPr>
+          </a:p>
+        </p:txBody>
+      </p:sp>
+      <p:sp>
+        <p:nvSpPr>
+          <p:cNvPr id="8" name="Textfeld 7">
+            <a:extLst>
+              <a:ext uri="{FF2B5EF4-FFF2-40B4-BE49-F238E27FC236}">
+                <a16:creationId xmlns:a16="http://schemas.microsoft.com/office/drawing/2014/main" id="{23AAF468-7B73-C8F7-4946-0C5B9E664742}"/>
+              </a:ext>
+            </a:extLst>
+          </p:cNvPr>
+          <p:cNvSpPr txBox="1"/>
+          <p:nvPr/>
+        </p:nvSpPr>
+        <p:spPr bwMode="auto">
+          <a:xfrm>
+            <a:off x="6860150" y="4782310"/>
+            <a:ext cx="902811" cy="230832"/>
+          </a:xfrm>
+          <a:prstGeom prst="rect">
+            <a:avLst/>
+          </a:prstGeom>
+          <a:noFill/>
+          <a:ln w="9525">
+            <a:noFill/>
+            <a:miter lim="800000"/>
+            <a:headEnd/>
+            <a:tailEnd/>
+          </a:ln>
+        </p:spPr>
+        <p:txBody>
+          <a:bodyPr wrap="none" rtlCol="0" anchor="ctr">
+            <a:spAutoFit/>
+          </a:bodyPr>
+          <a:lstStyle/>
+          <a:p>
+            <a:pPr eaLnBrk="1" hangingPunct="1"/>
+            <a:r>
+              <a:rPr lang="de-DE" sz="900" b="1" dirty="0" err="1">
+                <a:latin typeface="Arial" charset="0"/>
+              </a:rPr>
+              <a:t>continuously</a:t>
+            </a:r>
+            <a:endParaRPr lang="de-DE" sz="900" b="1" dirty="0">
+              <a:latin typeface="Arial" charset="0"/>
             </a:endParaRPr>
           </a:p>
         </p:txBody>
@@ -8418,33 +8641,6 @@
                                           </p:stCondLst>
                                         </p:cTn>
                                         <p:tgtEl>
-                                          <p:spTgt spid="45"/>
-                                        </p:tgtEl>
-                                        <p:attrNameLst>
-                                          <p:attrName>style.visibility</p:attrName>
-                                        </p:attrNameLst>
-                                      </p:cBhvr>
-                                      <p:to>
-                                        <p:strVal val="visible"/>
-                                      </p:to>
-                                    </p:set>
-                                  </p:childTnLst>
-                                </p:cTn>
-                              </p:par>
-                              <p:par>
-                                <p:cTn id="11" presetID="1" presetClass="entr" presetSubtype="0" fill="hold" grpId="0" nodeType="withEffect">
-                                  <p:stCondLst>
-                                    <p:cond delay="0"/>
-                                  </p:stCondLst>
-                                  <p:childTnLst>
-                                    <p:set>
-                                      <p:cBhvr>
-                                        <p:cTn id="12" dur="1" fill="hold">
-                                          <p:stCondLst>
-                                            <p:cond delay="0"/>
-                                          </p:stCondLst>
-                                        </p:cTn>
-                                        <p:tgtEl>
                                           <p:spTgt spid="46"/>
                                         </p:tgtEl>
                                         <p:attrNameLst>
@@ -8459,14 +8655,14 @@
                                 </p:cTn>
                               </p:par>
                               <p:par>
-                                <p:cTn id="13" presetID="1" presetClass="entr" presetSubtype="0" fill="hold" nodeType="withEffect">
+                                <p:cTn id="11" presetID="1" presetClass="entr" presetSubtype="0" fill="hold" nodeType="withEffect">
                                   <p:stCondLst>
                                     <p:cond delay="0"/>
                                   </p:stCondLst>
                                   <p:childTnLst>
                                     <p:set>
                                       <p:cBhvr>
-                                        <p:cTn id="14" dur="1" fill="hold">
+                                        <p:cTn id="12" dur="1" fill="hold">
                                           <p:stCondLst>
                                             <p:cond delay="0"/>
                                           </p:stCondLst>
@@ -8485,8 +8681,26 @@
                                   </p:childTnLst>
                                 </p:cTn>
                               </p:par>
+                            </p:childTnLst>
+                          </p:cTn>
+                        </p:par>
+                      </p:childTnLst>
+                    </p:cTn>
+                  </p:par>
+                  <p:par>
+                    <p:cTn id="13" fill="hold">
+                      <p:stCondLst>
+                        <p:cond delay="indefinite"/>
+                      </p:stCondLst>
+                      <p:childTnLst>
+                        <p:par>
+                          <p:cTn id="14" fill="hold">
+                            <p:stCondLst>
+                              <p:cond delay="0"/>
+                            </p:stCondLst>
+                            <p:childTnLst>
                               <p:par>
-                                <p:cTn id="15" presetID="1" presetClass="entr" presetSubtype="0" fill="hold" nodeType="withEffect">
+                                <p:cTn id="15" presetID="1" presetClass="entr" presetSubtype="0" fill="hold" nodeType="clickEffect">
                                   <p:stCondLst>
                                     <p:cond delay="0"/>
                                   </p:stCondLst>
@@ -8499,7 +8713,7 @@
                                           </p:stCondLst>
                                         </p:cTn>
                                         <p:tgtEl>
-                                          <p:spTgt spid="48"/>
+                                          <p:spTgt spid="6"/>
                                         </p:tgtEl>
                                         <p:attrNameLst>
                                           <p:attrName>style.visibility</p:attrName>
@@ -8526,7 +8740,7 @@
                                           </p:stCondLst>
                                         </p:cTn>
                                         <p:tgtEl>
-                                          <p:spTgt spid="49"/>
+                                          <p:spTgt spid="10"/>
                                         </p:tgtEl>
                                         <p:attrNameLst>
                                           <p:attrName>style.visibility</p:attrName>
@@ -8540,7 +8754,7 @@
                                 </p:cTn>
                               </p:par>
                               <p:par>
-                                <p:cTn id="19" presetID="1" presetClass="entr" presetSubtype="0" fill="hold" nodeType="withEffect">
+                                <p:cTn id="19" presetID="1" presetClass="entr" presetSubtype="0" fill="hold" grpId="0" nodeType="withEffect">
                                   <p:stCondLst>
                                     <p:cond delay="0"/>
                                   </p:stCondLst>
@@ -8553,7 +8767,7 @@
                                           </p:stCondLst>
                                         </p:cTn>
                                         <p:tgtEl>
-                                          <p:spTgt spid="50"/>
+                                          <p:spTgt spid="45"/>
                                         </p:tgtEl>
                                         <p:attrNameLst>
                                           <p:attrName>style.visibility</p:attrName>
@@ -8567,7 +8781,7 @@
                                 </p:cTn>
                               </p:par>
                               <p:par>
-                                <p:cTn id="21" presetID="1" presetClass="entr" presetSubtype="0" fill="hold" grpId="0" nodeType="withEffect">
+                                <p:cTn id="21" presetID="1" presetClass="entr" presetSubtype="0" fill="hold" nodeType="withEffect">
                                   <p:stCondLst>
                                     <p:cond delay="0"/>
                                   </p:stCondLst>
@@ -8580,7 +8794,52 @@
                                           </p:stCondLst>
                                         </p:cTn>
                                         <p:tgtEl>
-                                          <p:spTgt spid="51"/>
+                                          <p:spTgt spid="48"/>
+                                        </p:tgtEl>
+                                        <p:attrNameLst>
+                                          <p:attrName>style.visibility</p:attrName>
+                                        </p:attrNameLst>
+                                      </p:cBhvr>
+                                      <p:to>
+                                        <p:strVal val="visible"/>
+                                      </p:to>
+                                    </p:set>
+                                  </p:childTnLst>
+                                </p:cTn>
+                              </p:par>
+                            </p:childTnLst>
+                          </p:cTn>
+                        </p:par>
+                      </p:childTnLst>
+                    </p:cTn>
+                  </p:par>
+                  <p:par>
+                    <p:cTn id="23" fill="hold">
+                      <p:stCondLst>
+                        <p:cond delay="indefinite"/>
+                      </p:stCondLst>
+                      <p:childTnLst>
+                        <p:par>
+                          <p:cTn id="24" fill="hold">
+                            <p:stCondLst>
+                              <p:cond delay="0"/>
+                            </p:stCondLst>
+                            <p:childTnLst>
+                              <p:par>
+                                <p:cTn id="25" presetID="1" presetClass="entr" presetSubtype="0" fill="hold" nodeType="clickEffect">
+                                  <p:stCondLst>
+                                    <p:cond delay="0"/>
+                                  </p:stCondLst>
+                                  <p:childTnLst>
+                                    <p:set>
+                                      <p:cBhvr>
+                                        <p:cTn id="26" dur="1" fill="hold">
+                                          <p:stCondLst>
+                                            <p:cond delay="0"/>
+                                          </p:stCondLst>
+                                        </p:cTn>
+                                        <p:tgtEl>
+                                          <p:spTgt spid="16"/>
                                         </p:tgtEl>
                                         <p:attrNameLst>
                                           <p:attrName>style.visibility</p:attrName>
@@ -8594,20 +8853,20 @@
                                 </p:cTn>
                               </p:par>
                               <p:par>
-                                <p:cTn id="23" presetID="1" presetClass="entr" presetSubtype="0" fill="hold" nodeType="withEffect">
+                                <p:cTn id="27" presetID="1" presetClass="entr" presetSubtype="0" fill="hold" grpId="0" nodeType="withEffect">
                                   <p:stCondLst>
                                     <p:cond delay="0"/>
                                   </p:stCondLst>
                                   <p:childTnLst>
                                     <p:set>
                                       <p:cBhvr>
-                                        <p:cTn id="24" dur="1" fill="hold">
+                                        <p:cTn id="28" dur="1" fill="hold">
                                           <p:stCondLst>
                                             <p:cond delay="0"/>
                                           </p:stCondLst>
                                         </p:cTn>
                                         <p:tgtEl>
-                                          <p:spTgt spid="52"/>
+                                          <p:spTgt spid="14"/>
                                         </p:tgtEl>
                                         <p:attrNameLst>
                                           <p:attrName>style.visibility</p:attrName>
@@ -8621,61 +8880,7 @@
                                 </p:cTn>
                               </p:par>
                               <p:par>
-                                <p:cTn id="25" presetID="1" presetClass="entr" presetSubtype="0" fill="hold" nodeType="withEffect">
-                                  <p:stCondLst>
-                                    <p:cond delay="0"/>
-                                  </p:stCondLst>
-                                  <p:childTnLst>
-                                    <p:set>
-                                      <p:cBhvr>
-                                        <p:cTn id="26" dur="1" fill="hold">
-                                          <p:stCondLst>
-                                            <p:cond delay="0"/>
-                                          </p:stCondLst>
-                                        </p:cTn>
-                                        <p:tgtEl>
-                                          <p:spTgt spid="6"/>
-                                        </p:tgtEl>
-                                        <p:attrNameLst>
-                                          <p:attrName>style.visibility</p:attrName>
-                                        </p:attrNameLst>
-                                      </p:cBhvr>
-                                      <p:to>
-                                        <p:strVal val="visible"/>
-                                      </p:to>
-                                    </p:set>
-                                  </p:childTnLst>
-                                </p:cTn>
-                              </p:par>
-                              <p:par>
-                                <p:cTn id="27" presetID="1" presetClass="entr" presetSubtype="0" fill="hold" nodeType="withEffect">
-                                  <p:stCondLst>
-                                    <p:cond delay="0"/>
-                                  </p:stCondLst>
-                                  <p:childTnLst>
-                                    <p:set>
-                                      <p:cBhvr>
-                                        <p:cTn id="28" dur="1" fill="hold">
-                                          <p:stCondLst>
-                                            <p:cond delay="0"/>
-                                          </p:stCondLst>
-                                        </p:cTn>
-                                        <p:tgtEl>
-                                          <p:spTgt spid="11"/>
-                                        </p:tgtEl>
-                                        <p:attrNameLst>
-                                          <p:attrName>style.visibility</p:attrName>
-                                        </p:attrNameLst>
-                                      </p:cBhvr>
-                                      <p:to>
-                                        <p:strVal val="visible"/>
-                                      </p:to>
-                                    </p:set>
-                                  </p:childTnLst>
-                                </p:cTn>
-                              </p:par>
-                              <p:par>
-                                <p:cTn id="29" presetID="1" presetClass="entr" presetSubtype="0" fill="hold" grpId="0" nodeType="withEffect">
+                                <p:cTn id="29" presetID="1" presetClass="entr" presetSubtype="0" fill="hold" nodeType="withEffect">
                                   <p:stCondLst>
                                     <p:cond delay="0"/>
                                   </p:stCondLst>
@@ -8688,7 +8893,7 @@
                                           </p:stCondLst>
                                         </p:cTn>
                                         <p:tgtEl>
-                                          <p:spTgt spid="10"/>
+                                          <p:spTgt spid="50"/>
                                         </p:tgtEl>
                                         <p:attrNameLst>
                                           <p:attrName>style.visibility</p:attrName>
@@ -8715,61 +8920,7 @@
                                           </p:stCondLst>
                                         </p:cTn>
                                         <p:tgtEl>
-                                          <p:spTgt spid="14"/>
-                                        </p:tgtEl>
-                                        <p:attrNameLst>
-                                          <p:attrName>style.visibility</p:attrName>
-                                        </p:attrNameLst>
-                                      </p:cBhvr>
-                                      <p:to>
-                                        <p:strVal val="visible"/>
-                                      </p:to>
-                                    </p:set>
-                                  </p:childTnLst>
-                                </p:cTn>
-                              </p:par>
-                              <p:par>
-                                <p:cTn id="33" presetID="1" presetClass="entr" presetSubtype="0" fill="hold" nodeType="withEffect">
-                                  <p:stCondLst>
-                                    <p:cond delay="0"/>
-                                  </p:stCondLst>
-                                  <p:childTnLst>
-                                    <p:set>
-                                      <p:cBhvr>
-                                        <p:cTn id="34" dur="1" fill="hold">
-                                          <p:stCondLst>
-                                            <p:cond delay="0"/>
-                                          </p:stCondLst>
-                                        </p:cTn>
-                                        <p:tgtEl>
-                                          <p:spTgt spid="16"/>
-                                        </p:tgtEl>
-                                        <p:attrNameLst>
-                                          <p:attrName>style.visibility</p:attrName>
-                                        </p:attrNameLst>
-                                      </p:cBhvr>
-                                      <p:to>
-                                        <p:strVal val="visible"/>
-                                      </p:to>
-                                    </p:set>
-                                  </p:childTnLst>
-                                </p:cTn>
-                              </p:par>
-                              <p:par>
-                                <p:cTn id="35" presetID="1" presetClass="entr" presetSubtype="0" fill="hold" grpId="0" nodeType="withEffect">
-                                  <p:stCondLst>
-                                    <p:cond delay="0"/>
-                                  </p:stCondLst>
-                                  <p:childTnLst>
-                                    <p:set>
-                                      <p:cBhvr>
-                                        <p:cTn id="36" dur="1" fill="hold">
-                                          <p:stCondLst>
-                                            <p:cond delay="0"/>
-                                          </p:stCondLst>
-                                        </p:cTn>
-                                        <p:tgtEl>
-                                          <p:spTgt spid="23"/>
+                                          <p:spTgt spid="49"/>
                                         </p:tgtEl>
                                         <p:attrNameLst>
                                           <p:attrName>style.visibility</p:attrName>
@@ -8789,19 +8940,73 @@
                     </p:cTn>
                   </p:par>
                   <p:par>
-                    <p:cTn id="37" fill="hold">
+                    <p:cTn id="33" fill="hold">
                       <p:stCondLst>
                         <p:cond delay="indefinite"/>
                       </p:stCondLst>
                       <p:childTnLst>
                         <p:par>
-                          <p:cTn id="38" fill="hold">
+                          <p:cTn id="34" fill="hold">
                             <p:stCondLst>
                               <p:cond delay="0"/>
                             </p:stCondLst>
                             <p:childTnLst>
                               <p:par>
-                                <p:cTn id="39" presetID="1" presetClass="entr" presetSubtype="0" fill="hold" grpId="0" nodeType="clickEffect">
+                                <p:cTn id="35" presetID="1" presetClass="entr" presetSubtype="0" fill="hold" nodeType="clickEffect">
+                                  <p:stCondLst>
+                                    <p:cond delay="0"/>
+                                  </p:stCondLst>
+                                  <p:childTnLst>
+                                    <p:set>
+                                      <p:cBhvr>
+                                        <p:cTn id="36" dur="1" fill="hold">
+                                          <p:stCondLst>
+                                            <p:cond delay="0"/>
+                                          </p:stCondLst>
+                                        </p:cTn>
+                                        <p:tgtEl>
+                                          <p:spTgt spid="11"/>
+                                        </p:tgtEl>
+                                        <p:attrNameLst>
+                                          <p:attrName>style.visibility</p:attrName>
+                                        </p:attrNameLst>
+                                      </p:cBhvr>
+                                      <p:to>
+                                        <p:strVal val="visible"/>
+                                      </p:to>
+                                    </p:set>
+                                  </p:childTnLst>
+                                </p:cTn>
+                              </p:par>
+                              <p:par>
+                                <p:cTn id="37" presetID="1" presetClass="entr" presetSubtype="0" fill="hold" grpId="0" nodeType="withEffect">
+                                  <p:stCondLst>
+                                    <p:cond delay="0"/>
+                                  </p:stCondLst>
+                                  <p:childTnLst>
+                                    <p:set>
+                                      <p:cBhvr>
+                                        <p:cTn id="38" dur="1" fill="hold">
+                                          <p:stCondLst>
+                                            <p:cond delay="0"/>
+                                          </p:stCondLst>
+                                        </p:cTn>
+                                        <p:tgtEl>
+                                          <p:spTgt spid="23"/>
+                                        </p:tgtEl>
+                                        <p:attrNameLst>
+                                          <p:attrName>style.visibility</p:attrName>
+                                        </p:attrNameLst>
+                                      </p:cBhvr>
+                                      <p:to>
+                                        <p:strVal val="visible"/>
+                                      </p:to>
+                                    </p:set>
+                                  </p:childTnLst>
+                                </p:cTn>
+                              </p:par>
+                              <p:par>
+                                <p:cTn id="39" presetID="1" presetClass="entr" presetSubtype="0" fill="hold" nodeType="withEffect">
                                   <p:stCondLst>
                                     <p:cond delay="0"/>
                                   </p:stCondLst>
@@ -8809,6 +9014,78 @@
                                     <p:set>
                                       <p:cBhvr>
                                         <p:cTn id="40" dur="1" fill="hold">
+                                          <p:stCondLst>
+                                            <p:cond delay="0"/>
+                                          </p:stCondLst>
+                                        </p:cTn>
+                                        <p:tgtEl>
+                                          <p:spTgt spid="52"/>
+                                        </p:tgtEl>
+                                        <p:attrNameLst>
+                                          <p:attrName>style.visibility</p:attrName>
+                                        </p:attrNameLst>
+                                      </p:cBhvr>
+                                      <p:to>
+                                        <p:strVal val="visible"/>
+                                      </p:to>
+                                    </p:set>
+                                  </p:childTnLst>
+                                </p:cTn>
+                              </p:par>
+                              <p:par>
+                                <p:cTn id="41" presetID="1" presetClass="entr" presetSubtype="0" fill="hold" grpId="0" nodeType="withEffect">
+                                  <p:stCondLst>
+                                    <p:cond delay="0"/>
+                                  </p:stCondLst>
+                                  <p:childTnLst>
+                                    <p:set>
+                                      <p:cBhvr>
+                                        <p:cTn id="42" dur="1" fill="hold">
+                                          <p:stCondLst>
+                                            <p:cond delay="0"/>
+                                          </p:stCondLst>
+                                        </p:cTn>
+                                        <p:tgtEl>
+                                          <p:spTgt spid="51"/>
+                                        </p:tgtEl>
+                                        <p:attrNameLst>
+                                          <p:attrName>style.visibility</p:attrName>
+                                        </p:attrNameLst>
+                                      </p:cBhvr>
+                                      <p:to>
+                                        <p:strVal val="visible"/>
+                                      </p:to>
+                                    </p:set>
+                                  </p:childTnLst>
+                                </p:cTn>
+                              </p:par>
+                            </p:childTnLst>
+                          </p:cTn>
+                        </p:par>
+                      </p:childTnLst>
+                    </p:cTn>
+                  </p:par>
+                  <p:par>
+                    <p:cTn id="43" fill="hold">
+                      <p:stCondLst>
+                        <p:cond delay="indefinite"/>
+                      </p:stCondLst>
+                      <p:childTnLst>
+                        <p:par>
+                          <p:cTn id="44" fill="hold">
+                            <p:stCondLst>
+                              <p:cond delay="0"/>
+                            </p:stCondLst>
+                            <p:childTnLst>
+                              <p:par>
+                                <p:cTn id="45" presetID="1" presetClass="entr" presetSubtype="0" fill="hold" grpId="0" nodeType="clickEffect">
+                                  <p:stCondLst>
+                                    <p:cond delay="0"/>
+                                  </p:stCondLst>
+                                  <p:childTnLst>
+                                    <p:set>
+                                      <p:cBhvr>
+                                        <p:cTn id="46" dur="1" fill="hold">
                                           <p:stCondLst>
                                             <p:cond delay="0"/>
                                           </p:stCondLst>
@@ -8834,53 +9111,26 @@
                     </p:cTn>
                   </p:par>
                   <p:par>
-                    <p:cTn id="41" fill="hold">
+                    <p:cTn id="47" fill="hold">
                       <p:stCondLst>
                         <p:cond delay="indefinite"/>
                       </p:stCondLst>
                       <p:childTnLst>
                         <p:par>
-                          <p:cTn id="42" fill="hold">
+                          <p:cTn id="48" fill="hold">
                             <p:stCondLst>
                               <p:cond delay="0"/>
                             </p:stCondLst>
                             <p:childTnLst>
                               <p:par>
-                                <p:cTn id="43" presetID="1" presetClass="entr" presetSubtype="0" fill="hold" grpId="0" nodeType="clickEffect">
+                                <p:cTn id="49" presetID="1" presetClass="entr" presetSubtype="0" fill="hold" grpId="0" nodeType="clickEffect">
                                   <p:stCondLst>
                                     <p:cond delay="0"/>
                                   </p:stCondLst>
                                   <p:childTnLst>
                                     <p:set>
                                       <p:cBhvr>
-                                        <p:cTn id="44" dur="1" fill="hold">
-                                          <p:stCondLst>
-                                            <p:cond delay="0"/>
-                                          </p:stCondLst>
-                                        </p:cTn>
-                                        <p:tgtEl>
-                                          <p:spTgt spid="27"/>
-                                        </p:tgtEl>
-                                        <p:attrNameLst>
-                                          <p:attrName>style.visibility</p:attrName>
-                                        </p:attrNameLst>
-                                      </p:cBhvr>
-                                      <p:to>
-                                        <p:strVal val="visible"/>
-                                      </p:to>
-                                    </p:set>
-                                  </p:childTnLst>
-                                </p:cTn>
-                              </p:par>
-                              <p:par>
-                                <p:cTn id="45" presetID="1" presetClass="entr" presetSubtype="0" fill="hold" grpId="0" nodeType="withEffect">
-                                  <p:stCondLst>
-                                    <p:cond delay="0"/>
-                                  </p:stCondLst>
-                                  <p:childTnLst>
-                                    <p:set>
-                                      <p:cBhvr>
-                                        <p:cTn id="46" dur="1" fill="hold">
+                                        <p:cTn id="50" dur="1" fill="hold">
                                           <p:stCondLst>
                                             <p:cond delay="0"/>
                                           </p:stCondLst>
@@ -8900,14 +9150,14 @@
                                 </p:cTn>
                               </p:par>
                               <p:par>
-                                <p:cTn id="47" presetID="1" presetClass="entr" presetSubtype="0" fill="hold" nodeType="withEffect">
+                                <p:cTn id="51" presetID="1" presetClass="entr" presetSubtype="0" fill="hold" nodeType="withEffect">
                                   <p:stCondLst>
                                     <p:cond delay="0"/>
                                   </p:stCondLst>
                                   <p:childTnLst>
                                     <p:set>
                                       <p:cBhvr>
-                                        <p:cTn id="48" dur="1" fill="hold">
+                                        <p:cTn id="52" dur="1" fill="hold">
                                           <p:stCondLst>
                                             <p:cond delay="0"/>
                                           </p:stCondLst>
@@ -8926,21 +9176,39 @@
                                   </p:childTnLst>
                                 </p:cTn>
                               </p:par>
+                            </p:childTnLst>
+                          </p:cTn>
+                        </p:par>
+                      </p:childTnLst>
+                    </p:cTn>
+                  </p:par>
+                  <p:par>
+                    <p:cTn id="53" fill="hold">
+                      <p:stCondLst>
+                        <p:cond delay="indefinite"/>
+                      </p:stCondLst>
+                      <p:childTnLst>
+                        <p:par>
+                          <p:cTn id="54" fill="hold">
+                            <p:stCondLst>
+                              <p:cond delay="0"/>
+                            </p:stCondLst>
+                            <p:childTnLst>
                               <p:par>
-                                <p:cTn id="49" presetID="1" presetClass="entr" presetSubtype="0" fill="hold" nodeType="withEffect">
+                                <p:cTn id="55" presetID="1" presetClass="entr" presetSubtype="0" fill="hold" nodeType="clickEffect">
                                   <p:stCondLst>
                                     <p:cond delay="0"/>
                                   </p:stCondLst>
                                   <p:childTnLst>
                                     <p:set>
                                       <p:cBhvr>
-                                        <p:cTn id="50" dur="1" fill="hold">
+                                        <p:cTn id="56" dur="1" fill="hold">
                                           <p:stCondLst>
                                             <p:cond delay="0"/>
                                           </p:stCondLst>
                                         </p:cTn>
                                         <p:tgtEl>
-                                          <p:spTgt spid="12"/>
+                                          <p:spTgt spid="17"/>
                                         </p:tgtEl>
                                         <p:attrNameLst>
                                           <p:attrName>style.visibility</p:attrName>
@@ -8954,88 +9222,7 @@
                                 </p:cTn>
                               </p:par>
                               <p:par>
-                                <p:cTn id="51" presetID="1" presetClass="entr" presetSubtype="0" fill="hold" grpId="0" nodeType="withEffect">
-                                  <p:stCondLst>
-                                    <p:cond delay="0"/>
-                                  </p:stCondLst>
-                                  <p:childTnLst>
-                                    <p:set>
-                                      <p:cBhvr>
-                                        <p:cTn id="52" dur="1" fill="hold">
-                                          <p:stCondLst>
-                                            <p:cond delay="0"/>
-                                          </p:stCondLst>
-                                        </p:cTn>
-                                        <p:tgtEl>
-                                          <p:spTgt spid="43"/>
-                                        </p:tgtEl>
-                                        <p:attrNameLst>
-                                          <p:attrName>style.visibility</p:attrName>
-                                        </p:attrNameLst>
-                                      </p:cBhvr>
-                                      <p:to>
-                                        <p:strVal val="visible"/>
-                                      </p:to>
-                                    </p:set>
-                                  </p:childTnLst>
-                                </p:cTn>
-                              </p:par>
-                              <p:par>
-                                <p:cTn id="53" presetID="1" presetClass="entr" presetSubtype="0" fill="hold" nodeType="withEffect">
-                                  <p:stCondLst>
-                                    <p:cond delay="0"/>
-                                  </p:stCondLst>
-                                  <p:childTnLst>
-                                    <p:set>
-                                      <p:cBhvr>
-                                        <p:cTn id="54" dur="1" fill="hold">
-                                          <p:stCondLst>
-                                            <p:cond delay="0"/>
-                                          </p:stCondLst>
-                                        </p:cTn>
-                                        <p:tgtEl>
-                                          <p:spTgt spid="20"/>
-                                        </p:tgtEl>
-                                        <p:attrNameLst>
-                                          <p:attrName>style.visibility</p:attrName>
-                                        </p:attrNameLst>
-                                      </p:cBhvr>
-                                      <p:to>
-                                        <p:strVal val="visible"/>
-                                      </p:to>
-                                    </p:set>
-                                  </p:childTnLst>
-                                </p:cTn>
-                              </p:par>
-                              <p:par>
-                                <p:cTn id="55" presetID="1" presetClass="entr" presetSubtype="0" fill="hold" grpId="0" nodeType="withEffect">
-                                  <p:stCondLst>
-                                    <p:cond delay="0"/>
-                                  </p:stCondLst>
-                                  <p:childTnLst>
-                                    <p:set>
-                                      <p:cBhvr>
-                                        <p:cTn id="56" dur="1" fill="hold">
-                                          <p:stCondLst>
-                                            <p:cond delay="0"/>
-                                          </p:stCondLst>
-                                        </p:cTn>
-                                        <p:tgtEl>
-                                          <p:spTgt spid="25"/>
-                                        </p:tgtEl>
-                                        <p:attrNameLst>
-                                          <p:attrName>style.visibility</p:attrName>
-                                        </p:attrNameLst>
-                                      </p:cBhvr>
-                                      <p:to>
-                                        <p:strVal val="visible"/>
-                                      </p:to>
-                                    </p:set>
-                                  </p:childTnLst>
-                                </p:cTn>
-                              </p:par>
-                              <p:par>
-                                <p:cTn id="57" presetID="1" presetClass="entr" presetSubtype="0" fill="hold" nodeType="withEffect">
+                                <p:cTn id="57" presetID="1" presetClass="entr" presetSubtype="0" fill="hold" grpId="0" nodeType="withEffect">
                                   <p:stCondLst>
                                     <p:cond delay="0"/>
                                   </p:stCondLst>
@@ -9048,7 +9235,7 @@
                                           </p:stCondLst>
                                         </p:cTn>
                                         <p:tgtEl>
-                                          <p:spTgt spid="39"/>
+                                          <p:spTgt spid="13"/>
                                         </p:tgtEl>
                                         <p:attrNameLst>
                                           <p:attrName>style.visibility</p:attrName>
@@ -9075,7 +9262,7 @@
                                           </p:stCondLst>
                                         </p:cTn>
                                         <p:tgtEl>
-                                          <p:spTgt spid="41"/>
+                                          <p:spTgt spid="27"/>
                                         </p:tgtEl>
                                         <p:attrNameLst>
                                           <p:attrName>style.visibility</p:attrName>
@@ -9102,7 +9289,7 @@
                                           </p:stCondLst>
                                         </p:cTn>
                                         <p:tgtEl>
-                                          <p:spTgt spid="17"/>
+                                          <p:spTgt spid="12"/>
                                         </p:tgtEl>
                                         <p:attrNameLst>
                                           <p:attrName>style.visibility</p:attrName>
@@ -9115,35 +9302,26 @@
                                   </p:childTnLst>
                                 </p:cTn>
                               </p:par>
+                            </p:childTnLst>
+                          </p:cTn>
+                        </p:par>
+                      </p:childTnLst>
+                    </p:cTn>
+                  </p:par>
+                  <p:par>
+                    <p:cTn id="63" fill="hold">
+                      <p:stCondLst>
+                        <p:cond delay="indefinite"/>
+                      </p:stCondLst>
+                      <p:childTnLst>
+                        <p:par>
+                          <p:cTn id="64" fill="hold">
+                            <p:stCondLst>
+                              <p:cond delay="0"/>
+                            </p:stCondLst>
+                            <p:childTnLst>
                               <p:par>
-                                <p:cTn id="63" presetID="1" presetClass="entr" presetSubtype="0" fill="hold" nodeType="withEffect">
-                                  <p:stCondLst>
-                                    <p:cond delay="0"/>
-                                  </p:stCondLst>
-                                  <p:childTnLst>
-                                    <p:set>
-                                      <p:cBhvr>
-                                        <p:cTn id="64" dur="1" fill="hold">
-                                          <p:stCondLst>
-                                            <p:cond delay="0"/>
-                                          </p:stCondLst>
-                                        </p:cTn>
-                                        <p:tgtEl>
-                                          <p:spTgt spid="42"/>
-                                        </p:tgtEl>
-                                        <p:attrNameLst>
-                                          <p:attrName>style.visibility</p:attrName>
-                                        </p:attrNameLst>
-                                      </p:cBhvr>
-                                      <p:to>
-                                        <p:strVal val="visible"/>
-                                      </p:to>
-                                    </p:set>
-                                  </p:childTnLst>
-                                </p:cTn>
-                              </p:par>
-                              <p:par>
-                                <p:cTn id="65" presetID="1" presetClass="entr" presetSubtype="0" fill="hold" nodeType="withEffect">
+                                <p:cTn id="65" presetID="1" presetClass="entr" presetSubtype="0" fill="hold" grpId="0" nodeType="clickEffect">
                                   <p:stCondLst>
                                     <p:cond delay="0"/>
                                   </p:stCondLst>
@@ -9156,7 +9334,7 @@
                                           </p:stCondLst>
                                         </p:cTn>
                                         <p:tgtEl>
-                                          <p:spTgt spid="53"/>
+                                          <p:spTgt spid="40"/>
                                         </p:tgtEl>
                                         <p:attrNameLst>
                                           <p:attrName>style.visibility</p:attrName>
@@ -9183,7 +9361,7 @@
                                           </p:stCondLst>
                                         </p:cTn>
                                         <p:tgtEl>
-                                          <p:spTgt spid="57"/>
+                                          <p:spTgt spid="39"/>
                                         </p:tgtEl>
                                         <p:attrNameLst>
                                           <p:attrName>style.visibility</p:attrName>
@@ -9197,7 +9375,7 @@
                                 </p:cTn>
                               </p:par>
                               <p:par>
-                                <p:cTn id="69" presetID="1" presetClass="entr" presetSubtype="0" fill="hold" grpId="0" nodeType="withEffect">
+                                <p:cTn id="69" presetID="1" presetClass="entr" presetSubtype="0" fill="hold" nodeType="withEffect">
                                   <p:stCondLst>
                                     <p:cond delay="0"/>
                                   </p:stCondLst>
@@ -9210,7 +9388,7 @@
                                           </p:stCondLst>
                                         </p:cTn>
                                         <p:tgtEl>
-                                          <p:spTgt spid="13"/>
+                                          <p:spTgt spid="42"/>
                                         </p:tgtEl>
                                         <p:attrNameLst>
                                           <p:attrName>style.visibility</p:attrName>
@@ -9237,7 +9415,52 @@
                                           </p:stCondLst>
                                         </p:cTn>
                                         <p:tgtEl>
-                                          <p:spTgt spid="21"/>
+                                          <p:spTgt spid="22"/>
+                                        </p:tgtEl>
+                                        <p:attrNameLst>
+                                          <p:attrName>style.visibility</p:attrName>
+                                        </p:attrNameLst>
+                                      </p:cBhvr>
+                                      <p:to>
+                                        <p:strVal val="visible"/>
+                                      </p:to>
+                                    </p:set>
+                                  </p:childTnLst>
+                                </p:cTn>
+                              </p:par>
+                            </p:childTnLst>
+                          </p:cTn>
+                        </p:par>
+                      </p:childTnLst>
+                    </p:cTn>
+                  </p:par>
+                  <p:par>
+                    <p:cTn id="73" fill="hold">
+                      <p:stCondLst>
+                        <p:cond delay="indefinite"/>
+                      </p:stCondLst>
+                      <p:childTnLst>
+                        <p:par>
+                          <p:cTn id="74" fill="hold">
+                            <p:stCondLst>
+                              <p:cond delay="0"/>
+                            </p:stCondLst>
+                            <p:childTnLst>
+                              <p:par>
+                                <p:cTn id="75" presetID="1" presetClass="entr" presetSubtype="0" fill="hold" nodeType="clickEffect">
+                                  <p:stCondLst>
+                                    <p:cond delay="0"/>
+                                  </p:stCondLst>
+                                  <p:childTnLst>
+                                    <p:set>
+                                      <p:cBhvr>
+                                        <p:cTn id="76" dur="1" fill="hold">
+                                          <p:stCondLst>
+                                            <p:cond delay="0"/>
+                                          </p:stCondLst>
+                                        </p:cTn>
+                                        <p:tgtEl>
+                                          <p:spTgt spid="53"/>
                                         </p:tgtEl>
                                         <p:attrNameLst>
                                           <p:attrName>style.visibility</p:attrName>
@@ -9251,61 +9474,7 @@
                                 </p:cTn>
                               </p:par>
                               <p:par>
-                                <p:cTn id="73" presetID="1" presetClass="entr" presetSubtype="0" fill="hold" grpId="0" nodeType="withEffect">
-                                  <p:stCondLst>
-                                    <p:cond delay="0"/>
-                                  </p:stCondLst>
-                                  <p:childTnLst>
-                                    <p:set>
-                                      <p:cBhvr>
-                                        <p:cTn id="74" dur="1" fill="hold">
-                                          <p:stCondLst>
-                                            <p:cond delay="0"/>
-                                          </p:stCondLst>
-                                        </p:cTn>
-                                        <p:tgtEl>
-                                          <p:spTgt spid="22"/>
-                                        </p:tgtEl>
-                                        <p:attrNameLst>
-                                          <p:attrName>style.visibility</p:attrName>
-                                        </p:attrNameLst>
-                                      </p:cBhvr>
-                                      <p:to>
-                                        <p:strVal val="visible"/>
-                                      </p:to>
-                                    </p:set>
-                                  </p:childTnLst>
-                                </p:cTn>
-                              </p:par>
-                              <p:par>
-                                <p:cTn id="75" presetID="1" presetClass="entr" presetSubtype="0" fill="hold" grpId="0" nodeType="withEffect">
-                                  <p:stCondLst>
-                                    <p:cond delay="0"/>
-                                  </p:stCondLst>
-                                  <p:childTnLst>
-                                    <p:set>
-                                      <p:cBhvr>
-                                        <p:cTn id="76" dur="1" fill="hold">
-                                          <p:stCondLst>
-                                            <p:cond delay="0"/>
-                                          </p:stCondLst>
-                                        </p:cTn>
-                                        <p:tgtEl>
-                                          <p:spTgt spid="40"/>
-                                        </p:tgtEl>
-                                        <p:attrNameLst>
-                                          <p:attrName>style.visibility</p:attrName>
-                                        </p:attrNameLst>
-                                      </p:cBhvr>
-                                      <p:to>
-                                        <p:strVal val="visible"/>
-                                      </p:to>
-                                    </p:set>
-                                  </p:childTnLst>
-                                </p:cTn>
-                              </p:par>
-                              <p:par>
-                                <p:cTn id="77" presetID="1" presetClass="entr" presetSubtype="0" fill="hold" nodeType="withEffect">
+                                <p:cTn id="77" presetID="1" presetClass="entr" presetSubtype="0" fill="hold" grpId="0" nodeType="withEffect">
                                   <p:stCondLst>
                                     <p:cond delay="0"/>
                                   </p:stCondLst>
@@ -9318,7 +9487,7 @@
                                           </p:stCondLst>
                                         </p:cTn>
                                         <p:tgtEl>
-                                          <p:spTgt spid="18"/>
+                                          <p:spTgt spid="21"/>
                                         </p:tgtEl>
                                         <p:attrNameLst>
                                           <p:attrName>style.visibility</p:attrName>
@@ -9345,7 +9514,371 @@
                                           </p:stCondLst>
                                         </p:cTn>
                                         <p:tgtEl>
+                                          <p:spTgt spid="25"/>
+                                        </p:tgtEl>
+                                        <p:attrNameLst>
+                                          <p:attrName>style.visibility</p:attrName>
+                                        </p:attrNameLst>
+                                      </p:cBhvr>
+                                      <p:to>
+                                        <p:strVal val="visible"/>
+                                      </p:to>
+                                    </p:set>
+                                  </p:childTnLst>
+                                </p:cTn>
+                              </p:par>
+                              <p:par>
+                                <p:cTn id="81" presetID="1" presetClass="entr" presetSubtype="0" fill="hold" grpId="0" nodeType="withEffect">
+                                  <p:stCondLst>
+                                    <p:cond delay="0"/>
+                                  </p:stCondLst>
+                                  <p:childTnLst>
+                                    <p:set>
+                                      <p:cBhvr>
+                                        <p:cTn id="82" dur="1" fill="hold">
+                                          <p:stCondLst>
+                                            <p:cond delay="0"/>
+                                          </p:stCondLst>
+                                        </p:cTn>
+                                        <p:tgtEl>
+                                          <p:spTgt spid="41"/>
+                                        </p:tgtEl>
+                                        <p:attrNameLst>
+                                          <p:attrName>style.visibility</p:attrName>
+                                        </p:attrNameLst>
+                                      </p:cBhvr>
+                                      <p:to>
+                                        <p:strVal val="visible"/>
+                                      </p:to>
+                                    </p:set>
+                                  </p:childTnLst>
+                                </p:cTn>
+                              </p:par>
+                              <p:par>
+                                <p:cTn id="83" presetID="1" presetClass="entr" presetSubtype="0" fill="hold" nodeType="withEffect">
+                                  <p:stCondLst>
+                                    <p:cond delay="0"/>
+                                  </p:stCondLst>
+                                  <p:childTnLst>
+                                    <p:set>
+                                      <p:cBhvr>
+                                        <p:cTn id="84" dur="1" fill="hold">
+                                          <p:stCondLst>
+                                            <p:cond delay="0"/>
+                                          </p:stCondLst>
+                                        </p:cTn>
+                                        <p:tgtEl>
+                                          <p:spTgt spid="18"/>
+                                        </p:tgtEl>
+                                        <p:attrNameLst>
+                                          <p:attrName>style.visibility</p:attrName>
+                                        </p:attrNameLst>
+                                      </p:cBhvr>
+                                      <p:to>
+                                        <p:strVal val="visible"/>
+                                      </p:to>
+                                    </p:set>
+                                  </p:childTnLst>
+                                </p:cTn>
+                              </p:par>
+                            </p:childTnLst>
+                          </p:cTn>
+                        </p:par>
+                      </p:childTnLst>
+                    </p:cTn>
+                  </p:par>
+                  <p:par>
+                    <p:cTn id="85" fill="hold">
+                      <p:stCondLst>
+                        <p:cond delay="indefinite"/>
+                      </p:stCondLst>
+                      <p:childTnLst>
+                        <p:par>
+                          <p:cTn id="86" fill="hold">
+                            <p:stCondLst>
+                              <p:cond delay="0"/>
+                            </p:stCondLst>
+                            <p:childTnLst>
+                              <p:par>
+                                <p:cTn id="87" presetID="1" presetClass="entr" presetSubtype="0" fill="hold" nodeType="clickEffect">
+                                  <p:stCondLst>
+                                    <p:cond delay="0"/>
+                                  </p:stCondLst>
+                                  <p:childTnLst>
+                                    <p:set>
+                                      <p:cBhvr>
+                                        <p:cTn id="88" dur="1" fill="hold">
+                                          <p:stCondLst>
+                                            <p:cond delay="0"/>
+                                          </p:stCondLst>
+                                        </p:cTn>
+                                        <p:tgtEl>
+                                          <p:spTgt spid="20"/>
+                                        </p:tgtEl>
+                                        <p:attrNameLst>
+                                          <p:attrName>style.visibility</p:attrName>
+                                        </p:attrNameLst>
+                                      </p:cBhvr>
+                                      <p:to>
+                                        <p:strVal val="visible"/>
+                                      </p:to>
+                                    </p:set>
+                                  </p:childTnLst>
+                                </p:cTn>
+                              </p:par>
+                              <p:par>
+                                <p:cTn id="89" presetID="1" presetClass="entr" presetSubtype="0" fill="hold" grpId="0" nodeType="withEffect">
+                                  <p:stCondLst>
+                                    <p:cond delay="0"/>
+                                  </p:stCondLst>
+                                  <p:childTnLst>
+                                    <p:set>
+                                      <p:cBhvr>
+                                        <p:cTn id="90" dur="1" fill="hold">
+                                          <p:stCondLst>
+                                            <p:cond delay="0"/>
+                                          </p:stCondLst>
+                                        </p:cTn>
+                                        <p:tgtEl>
+                                          <p:spTgt spid="43"/>
+                                        </p:tgtEl>
+                                        <p:attrNameLst>
+                                          <p:attrName>style.visibility</p:attrName>
+                                        </p:attrNameLst>
+                                      </p:cBhvr>
+                                      <p:to>
+                                        <p:strVal val="visible"/>
+                                      </p:to>
+                                    </p:set>
+                                  </p:childTnLst>
+                                </p:cTn>
+                              </p:par>
+                              <p:par>
+                                <p:cTn id="91" presetID="1" presetClass="entr" presetSubtype="0" fill="hold" nodeType="withEffect">
+                                  <p:stCondLst>
+                                    <p:cond delay="0"/>
+                                  </p:stCondLst>
+                                  <p:childTnLst>
+                                    <p:set>
+                                      <p:cBhvr>
+                                        <p:cTn id="92" dur="1" fill="hold">
+                                          <p:stCondLst>
+                                            <p:cond delay="0"/>
+                                          </p:stCondLst>
+                                        </p:cTn>
+                                        <p:tgtEl>
+                                          <p:spTgt spid="57"/>
+                                        </p:tgtEl>
+                                        <p:attrNameLst>
+                                          <p:attrName>style.visibility</p:attrName>
+                                        </p:attrNameLst>
+                                      </p:cBhvr>
+                                      <p:to>
+                                        <p:strVal val="visible"/>
+                                      </p:to>
+                                    </p:set>
+                                  </p:childTnLst>
+                                </p:cTn>
+                              </p:par>
+                              <p:par>
+                                <p:cTn id="93" presetID="1" presetClass="entr" presetSubtype="0" fill="hold" grpId="0" nodeType="withEffect">
+                                  <p:stCondLst>
+                                    <p:cond delay="0"/>
+                                  </p:stCondLst>
+                                  <p:childTnLst>
+                                    <p:set>
+                                      <p:cBhvr>
+                                        <p:cTn id="94" dur="1" fill="hold">
+                                          <p:stCondLst>
+                                            <p:cond delay="0"/>
+                                          </p:stCondLst>
+                                        </p:cTn>
+                                        <p:tgtEl>
                                           <p:spTgt spid="24"/>
+                                        </p:tgtEl>
+                                        <p:attrNameLst>
+                                          <p:attrName>style.visibility</p:attrName>
+                                        </p:attrNameLst>
+                                      </p:cBhvr>
+                                      <p:to>
+                                        <p:strVal val="visible"/>
+                                      </p:to>
+                                    </p:set>
+                                  </p:childTnLst>
+                                </p:cTn>
+                              </p:par>
+                            </p:childTnLst>
+                          </p:cTn>
+                        </p:par>
+                      </p:childTnLst>
+                    </p:cTn>
+                  </p:par>
+                  <p:par>
+                    <p:cTn id="95" fill="hold">
+                      <p:stCondLst>
+                        <p:cond delay="indefinite"/>
+                      </p:stCondLst>
+                      <p:childTnLst>
+                        <p:par>
+                          <p:cTn id="96" fill="hold">
+                            <p:stCondLst>
+                              <p:cond delay="0"/>
+                            </p:stCondLst>
+                            <p:childTnLst>
+                              <p:par>
+                                <p:cTn id="97" presetID="1" presetClass="entr" presetSubtype="0" fill="hold" grpId="0" nodeType="clickEffect">
+                                  <p:stCondLst>
+                                    <p:cond delay="0"/>
+                                  </p:stCondLst>
+                                  <p:childTnLst>
+                                    <p:set>
+                                      <p:cBhvr>
+                                        <p:cTn id="98" dur="1" fill="hold">
+                                          <p:stCondLst>
+                                            <p:cond delay="0"/>
+                                          </p:stCondLst>
+                                        </p:cTn>
+                                        <p:tgtEl>
+                                          <p:spTgt spid="26"/>
+                                        </p:tgtEl>
+                                        <p:attrNameLst>
+                                          <p:attrName>style.visibility</p:attrName>
+                                        </p:attrNameLst>
+                                      </p:cBhvr>
+                                      <p:to>
+                                        <p:strVal val="visible"/>
+                                      </p:to>
+                                    </p:set>
+                                  </p:childTnLst>
+                                </p:cTn>
+                              </p:par>
+                            </p:childTnLst>
+                          </p:cTn>
+                        </p:par>
+                      </p:childTnLst>
+                    </p:cTn>
+                  </p:par>
+                  <p:par>
+                    <p:cTn id="99" fill="hold">
+                      <p:stCondLst>
+                        <p:cond delay="indefinite"/>
+                      </p:stCondLst>
+                      <p:childTnLst>
+                        <p:par>
+                          <p:cTn id="100" fill="hold">
+                            <p:stCondLst>
+                              <p:cond delay="0"/>
+                            </p:stCondLst>
+                            <p:childTnLst>
+                              <p:par>
+                                <p:cTn id="101" presetID="1" presetClass="entr" presetSubtype="0" fill="hold" grpId="0" nodeType="clickEffect">
+                                  <p:stCondLst>
+                                    <p:cond delay="0"/>
+                                  </p:stCondLst>
+                                  <p:childTnLst>
+                                    <p:set>
+                                      <p:cBhvr>
+                                        <p:cTn id="102" dur="1" fill="hold">
+                                          <p:stCondLst>
+                                            <p:cond delay="0"/>
+                                          </p:stCondLst>
+                                        </p:cTn>
+                                        <p:tgtEl>
+                                          <p:spTgt spid="5"/>
+                                        </p:tgtEl>
+                                        <p:attrNameLst>
+                                          <p:attrName>style.visibility</p:attrName>
+                                        </p:attrNameLst>
+                                      </p:cBhvr>
+                                      <p:to>
+                                        <p:strVal val="visible"/>
+                                      </p:to>
+                                    </p:set>
+                                  </p:childTnLst>
+                                </p:cTn>
+                              </p:par>
+                            </p:childTnLst>
+                          </p:cTn>
+                        </p:par>
+                      </p:childTnLst>
+                    </p:cTn>
+                  </p:par>
+                  <p:par>
+                    <p:cTn id="103" fill="hold">
+                      <p:stCondLst>
+                        <p:cond delay="indefinite"/>
+                      </p:stCondLst>
+                      <p:childTnLst>
+                        <p:par>
+                          <p:cTn id="104" fill="hold">
+                            <p:stCondLst>
+                              <p:cond delay="0"/>
+                            </p:stCondLst>
+                            <p:childTnLst>
+                              <p:par>
+                                <p:cTn id="105" presetID="1" presetClass="entr" presetSubtype="0" fill="hold" grpId="0" nodeType="clickEffect">
+                                  <p:stCondLst>
+                                    <p:cond delay="0"/>
+                                  </p:stCondLst>
+                                  <p:childTnLst>
+                                    <p:set>
+                                      <p:cBhvr>
+                                        <p:cTn id="106" dur="1" fill="hold">
+                                          <p:stCondLst>
+                                            <p:cond delay="0"/>
+                                          </p:stCondLst>
+                                        </p:cTn>
+                                        <p:tgtEl>
+                                          <p:spTgt spid="7"/>
+                                        </p:tgtEl>
+                                        <p:attrNameLst>
+                                          <p:attrName>style.visibility</p:attrName>
+                                        </p:attrNameLst>
+                                      </p:cBhvr>
+                                      <p:to>
+                                        <p:strVal val="visible"/>
+                                      </p:to>
+                                    </p:set>
+                                  </p:childTnLst>
+                                </p:cTn>
+                              </p:par>
+                            </p:childTnLst>
+                          </p:cTn>
+                        </p:par>
+                      </p:childTnLst>
+                    </p:cTn>
+                  </p:par>
+                  <p:par>
+                    <p:cTn id="107" fill="hold">
+                      <p:stCondLst>
+                        <p:cond delay="indefinite"/>
+                      </p:stCondLst>
+                      <p:childTnLst>
+                        <p:par>
+                          <p:cTn id="108" fill="hold">
+                            <p:stCondLst>
+                              <p:cond delay="0"/>
+                            </p:stCondLst>
+                            <p:childTnLst>
+                              <p:par>
+                                <p:cTn id="109" presetID="1" presetClass="entr" presetSubtype="0" fill="hold" nodeType="clickEffect">
+                                  <p:stCondLst>
+                                    <p:cond delay="0"/>
+                                  </p:stCondLst>
+                                  <p:childTnLst>
+                                    <p:set>
+                                      <p:cBhvr>
+                                        <p:cTn id="110" dur="1" fill="hold">
+                                          <p:stCondLst>
+                                            <p:cond delay="0"/>
+                                          </p:stCondLst>
+                                        </p:cTn>
+                                        <p:tgtEl>
+                                          <p:spTgt spid="8">
+                                            <p:txEl>
+                                              <p:pRg st="0" end="0"/>
+                                            </p:txEl>
+                                          </p:spTgt>
                                         </p:tgtEl>
                                         <p:attrNameLst>
                                           <p:attrName>style.visibility</p:attrName>
@@ -9405,6 +9938,9 @@
       <p:bldP spid="22" grpId="0"/>
       <p:bldP spid="23" grpId="0"/>
       <p:bldP spid="24" grpId="0"/>
+      <p:bldP spid="26" grpId="0" animBg="1"/>
+      <p:bldP spid="5" grpId="0" animBg="1"/>
+      <p:bldP spid="7" grpId="0"/>
     </p:bldLst>
   </p:timing>
 </p:sld>

</xml_diff>

<commit_message>
Tag-2_5: GitOps Operators + Tools sowie Secrets hinzugefügt.
</commit_message>
<xml_diff>
--- a/slides/Tag-2_5-GitOps.pptx
+++ b/slides/Tag-2_5-GitOps.pptx
@@ -6,10 +6,10 @@
     <p:sldMasterId id="2147483649" r:id="rId2"/>
   </p:sldMasterIdLst>
   <p:notesMasterIdLst>
-    <p:notesMasterId r:id="rId23"/>
+    <p:notesMasterId r:id="rId28"/>
   </p:notesMasterIdLst>
   <p:handoutMasterIdLst>
-    <p:handoutMasterId r:id="rId24"/>
+    <p:handoutMasterId r:id="rId29"/>
   </p:handoutMasterIdLst>
   <p:sldIdLst>
     <p:sldId id="288" r:id="rId3"/>
@@ -31,7 +31,12 @@
     <p:sldId id="601" r:id="rId19"/>
     <p:sldId id="604" r:id="rId20"/>
     <p:sldId id="603" r:id="rId21"/>
-    <p:sldId id="598" r:id="rId22"/>
+    <p:sldId id="609" r:id="rId22"/>
+    <p:sldId id="605" r:id="rId23"/>
+    <p:sldId id="608" r:id="rId24"/>
+    <p:sldId id="606" r:id="rId25"/>
+    <p:sldId id="607" r:id="rId26"/>
+    <p:sldId id="598" r:id="rId27"/>
   </p:sldIdLst>
   <p:sldSz cx="9144000" cy="6858000" type="screen4x3"/>
   <p:notesSz cx="6784975" cy="9921875"/>
@@ -1511,7 +1516,93 @@
           <a:p>
             <a:r>
               <a:rPr lang="de-DE" dirty="0"/>
-              <a:t>Quelle: https://blog.kubesimplify.com/gitops-demystified</a:t>
+              <a:t>Quelle:</a:t>
+            </a:r>
+          </a:p>
+          <a:p>
+            <a:r>
+              <a:rPr lang="de-DE" dirty="0"/>
+              <a:t>https://github.com/weaveworks/awesome-gitops?tab=readme-ov-file</a:t>
+            </a:r>
+          </a:p>
+          <a:p>
+            <a:pPr marL="171450" indent="-171450">
+              <a:buFont typeface="Arial" panose="020B0604020202020204" pitchFamily="34" charset="0"/>
+              <a:buChar char="•"/>
+            </a:pPr>
+            <a:r>
+              <a:rPr lang="de-DE" dirty="0"/>
+              <a:t>https://github.com/argoproj/argo-cd</a:t>
+            </a:r>
+          </a:p>
+          <a:p>
+            <a:pPr marL="171450" indent="-171450">
+              <a:buFont typeface="Arial" panose="020B0604020202020204" pitchFamily="34" charset="0"/>
+              <a:buChar char="•"/>
+            </a:pPr>
+            <a:r>
+              <a:rPr lang="de-DE" dirty="0"/>
+              <a:t>https://github.com/fluxcd/flux2</a:t>
+            </a:r>
+          </a:p>
+          <a:p>
+            <a:pPr marL="171450" indent="-171450">
+              <a:buFont typeface="Arial" panose="020B0604020202020204" pitchFamily="34" charset="0"/>
+              <a:buChar char="•"/>
+            </a:pPr>
+            <a:r>
+              <a:rPr lang="de-DE" dirty="0"/>
+              <a:t>https://github.com/fluxcd/flagger</a:t>
+            </a:r>
+          </a:p>
+          <a:p>
+            <a:pPr marL="171450" indent="-171450">
+              <a:buFont typeface="Arial" panose="020B0604020202020204" pitchFamily="34" charset="0"/>
+              <a:buChar char="•"/>
+            </a:pPr>
+            <a:r>
+              <a:rPr lang="de-DE" dirty="0"/>
+              <a:t>https://jenkins-x.io/</a:t>
+            </a:r>
+          </a:p>
+          <a:p>
+            <a:pPr marL="171450" indent="-171450">
+              <a:buFont typeface="Arial" panose="020B0604020202020204" pitchFamily="34" charset="0"/>
+              <a:buChar char="•"/>
+            </a:pPr>
+            <a:r>
+              <a:rPr lang="de-DE" dirty="0"/>
+              <a:t>https://www.kubestack.com/</a:t>
+            </a:r>
+          </a:p>
+          <a:p>
+            <a:pPr marL="171450" indent="-171450">
+              <a:buFont typeface="Arial" panose="020B0604020202020204" pitchFamily="34" charset="0"/>
+              <a:buChar char="•"/>
+            </a:pPr>
+            <a:r>
+              <a:rPr lang="de-DE" dirty="0"/>
+              <a:t>https://werf.io/</a:t>
+            </a:r>
+          </a:p>
+          <a:p>
+            <a:pPr marL="171450" indent="-171450">
+              <a:buFont typeface="Arial" panose="020B0604020202020204" pitchFamily="34" charset="0"/>
+              <a:buChar char="•"/>
+            </a:pPr>
+            <a:r>
+              <a:rPr lang="de-DE" dirty="0"/>
+              <a:t>https://pipecd.dev/</a:t>
+            </a:r>
+          </a:p>
+          <a:p>
+            <a:pPr marL="171450" indent="-171450">
+              <a:buFont typeface="Arial" panose="020B0604020202020204" pitchFamily="34" charset="0"/>
+              <a:buChar char="•"/>
+            </a:pPr>
+            <a:r>
+              <a:rPr lang="de-DE" dirty="0"/>
+              <a:t>https://docs.gitlab.com/ee/user/clusters/agent/</a:t>
             </a:r>
           </a:p>
         </p:txBody>
@@ -1535,6 +1626,290 @@
               <a:rPr lang="de-DE" altLang="de-DE" smtClean="0"/>
               <a:pPr/>
               <a:t>20</a:t>
+            </a:fld>
+            <a:endParaRPr lang="de-DE" altLang="de-DE"/>
+          </a:p>
+        </p:txBody>
+      </p:sp>
+    </p:spTree>
+    <p:extLst>
+      <p:ext uri="{BB962C8B-B14F-4D97-AF65-F5344CB8AC3E}">
+        <p14:creationId xmlns:p14="http://schemas.microsoft.com/office/powerpoint/2010/main" val="3998937363"/>
+      </p:ext>
+    </p:extLst>
+  </p:cSld>
+  <p:clrMapOvr>
+    <a:masterClrMapping/>
+  </p:clrMapOvr>
+</p:notes>
+</file>
+
+<file path=ppt/notesSlides/notesSlide14.xml><?xml version="1.0" encoding="utf-8"?>
+<p:notes xmlns:a="http://schemas.openxmlformats.org/drawingml/2006/main" xmlns:r="http://schemas.openxmlformats.org/officeDocument/2006/relationships" xmlns:p="http://schemas.openxmlformats.org/presentationml/2006/main">
+  <p:cSld>
+    <p:spTree>
+      <p:nvGrpSpPr>
+        <p:cNvPr id="1" name=""/>
+        <p:cNvGrpSpPr/>
+        <p:nvPr/>
+      </p:nvGrpSpPr>
+      <p:grpSpPr>
+        <a:xfrm>
+          <a:off x="0" y="0"/>
+          <a:ext cx="0" cy="0"/>
+          <a:chOff x="0" y="0"/>
+          <a:chExt cx="0" cy="0"/>
+        </a:xfrm>
+      </p:grpSpPr>
+      <p:sp>
+        <p:nvSpPr>
+          <p:cNvPr id="2" name="Folienbildplatzhalter 1"/>
+          <p:cNvSpPr>
+            <a:spLocks noGrp="1" noRot="1" noChangeAspect="1"/>
+          </p:cNvSpPr>
+          <p:nvPr>
+            <p:ph type="sldImg"/>
+          </p:nvPr>
+        </p:nvSpPr>
+        <p:spPr/>
+      </p:sp>
+      <p:sp>
+        <p:nvSpPr>
+          <p:cNvPr id="3" name="Notizenplatzhalter 2"/>
+          <p:cNvSpPr>
+            <a:spLocks noGrp="1"/>
+          </p:cNvSpPr>
+          <p:nvPr>
+            <p:ph type="body" idx="1"/>
+          </p:nvPr>
+        </p:nvSpPr>
+        <p:spPr/>
+        <p:txBody>
+          <a:bodyPr/>
+          <a:lstStyle/>
+          <a:p>
+            <a:r>
+              <a:rPr lang="de-DE" dirty="0"/>
+              <a:t>Quelle</a:t>
+            </a:r>
+          </a:p>
+          <a:p>
+            <a:r>
+              <a:rPr lang="de-DE" dirty="0"/>
+              <a:t>Imgflip.com</a:t>
+            </a:r>
+          </a:p>
+          <a:p>
+            <a:endParaRPr lang="de-DE" dirty="0"/>
+          </a:p>
+          <a:p>
+            <a:r>
+              <a:rPr lang="de-DE" dirty="0"/>
+              <a:t>Side </a:t>
+            </a:r>
+            <a:r>
+              <a:rPr lang="de-DE" dirty="0" err="1"/>
+              <a:t>car</a:t>
+            </a:r>
+            <a:endParaRPr lang="de-DE" dirty="0"/>
+          </a:p>
+        </p:txBody>
+      </p:sp>
+      <p:sp>
+        <p:nvSpPr>
+          <p:cNvPr id="4" name="Foliennummernplatzhalter 3"/>
+          <p:cNvSpPr>
+            <a:spLocks noGrp="1"/>
+          </p:cNvSpPr>
+          <p:nvPr>
+            <p:ph type="sldNum" sz="quarter" idx="5"/>
+          </p:nvPr>
+        </p:nvSpPr>
+        <p:spPr/>
+        <p:txBody>
+          <a:bodyPr/>
+          <a:lstStyle/>
+          <a:p>
+            <a:fld id="{18182567-388C-4D33-8B7B-A651F195F118}" type="slidenum">
+              <a:rPr lang="de-DE" altLang="de-DE" smtClean="0"/>
+              <a:pPr/>
+              <a:t>21</a:t>
+            </a:fld>
+            <a:endParaRPr lang="de-DE" altLang="de-DE"/>
+          </a:p>
+        </p:txBody>
+      </p:sp>
+    </p:spTree>
+    <p:extLst>
+      <p:ext uri="{BB962C8B-B14F-4D97-AF65-F5344CB8AC3E}">
+        <p14:creationId xmlns:p14="http://schemas.microsoft.com/office/powerpoint/2010/main" val="1749284629"/>
+      </p:ext>
+    </p:extLst>
+  </p:cSld>
+  <p:clrMapOvr>
+    <a:masterClrMapping/>
+  </p:clrMapOvr>
+</p:notes>
+</file>
+
+<file path=ppt/notesSlides/notesSlide15.xml><?xml version="1.0" encoding="utf-8"?>
+<p:notes xmlns:a="http://schemas.openxmlformats.org/drawingml/2006/main" xmlns:r="http://schemas.openxmlformats.org/officeDocument/2006/relationships" xmlns:p="http://schemas.openxmlformats.org/presentationml/2006/main">
+  <p:cSld>
+    <p:spTree>
+      <p:nvGrpSpPr>
+        <p:cNvPr id="1" name=""/>
+        <p:cNvGrpSpPr/>
+        <p:nvPr/>
+      </p:nvGrpSpPr>
+      <p:grpSpPr>
+        <a:xfrm>
+          <a:off x="0" y="0"/>
+          <a:ext cx="0" cy="0"/>
+          <a:chOff x="0" y="0"/>
+          <a:chExt cx="0" cy="0"/>
+        </a:xfrm>
+      </p:grpSpPr>
+      <p:sp>
+        <p:nvSpPr>
+          <p:cNvPr id="2" name="Folienbildplatzhalter 1"/>
+          <p:cNvSpPr>
+            <a:spLocks noGrp="1" noRot="1" noChangeAspect="1"/>
+          </p:cNvSpPr>
+          <p:nvPr>
+            <p:ph type="sldImg"/>
+          </p:nvPr>
+        </p:nvSpPr>
+        <p:spPr/>
+      </p:sp>
+      <p:sp>
+        <p:nvSpPr>
+          <p:cNvPr id="3" name="Notizenplatzhalter 2"/>
+          <p:cNvSpPr>
+            <a:spLocks noGrp="1"/>
+          </p:cNvSpPr>
+          <p:nvPr>
+            <p:ph type="body" idx="1"/>
+          </p:nvPr>
+        </p:nvSpPr>
+        <p:spPr/>
+        <p:txBody>
+          <a:bodyPr/>
+          <a:lstStyle/>
+          <a:p>
+            <a:r>
+              <a:rPr lang="de-DE" dirty="0"/>
+              <a:t>https://kubernetes.io/docs/concepts/workloads/pods/sidecar-containers/</a:t>
+            </a:r>
+          </a:p>
+        </p:txBody>
+      </p:sp>
+      <p:sp>
+        <p:nvSpPr>
+          <p:cNvPr id="4" name="Foliennummernplatzhalter 3"/>
+          <p:cNvSpPr>
+            <a:spLocks noGrp="1"/>
+          </p:cNvSpPr>
+          <p:nvPr>
+            <p:ph type="sldNum" sz="quarter" idx="5"/>
+          </p:nvPr>
+        </p:nvSpPr>
+        <p:spPr/>
+        <p:txBody>
+          <a:bodyPr/>
+          <a:lstStyle/>
+          <a:p>
+            <a:fld id="{18182567-388C-4D33-8B7B-A651F195F118}" type="slidenum">
+              <a:rPr lang="de-DE" altLang="de-DE" smtClean="0"/>
+              <a:pPr/>
+              <a:t>22</a:t>
+            </a:fld>
+            <a:endParaRPr lang="de-DE" altLang="de-DE"/>
+          </a:p>
+        </p:txBody>
+      </p:sp>
+    </p:spTree>
+    <p:extLst>
+      <p:ext uri="{BB962C8B-B14F-4D97-AF65-F5344CB8AC3E}">
+        <p14:creationId xmlns:p14="http://schemas.microsoft.com/office/powerpoint/2010/main" val="3525946719"/>
+      </p:ext>
+    </p:extLst>
+  </p:cSld>
+  <p:clrMapOvr>
+    <a:masterClrMapping/>
+  </p:clrMapOvr>
+</p:notes>
+</file>
+
+<file path=ppt/notesSlides/notesSlide16.xml><?xml version="1.0" encoding="utf-8"?>
+<p:notes xmlns:a="http://schemas.openxmlformats.org/drawingml/2006/main" xmlns:r="http://schemas.openxmlformats.org/officeDocument/2006/relationships" xmlns:p="http://schemas.openxmlformats.org/presentationml/2006/main">
+  <p:cSld>
+    <p:spTree>
+      <p:nvGrpSpPr>
+        <p:cNvPr id="1" name=""/>
+        <p:cNvGrpSpPr/>
+        <p:nvPr/>
+      </p:nvGrpSpPr>
+      <p:grpSpPr>
+        <a:xfrm>
+          <a:off x="0" y="0"/>
+          <a:ext cx="0" cy="0"/>
+          <a:chOff x="0" y="0"/>
+          <a:chExt cx="0" cy="0"/>
+        </a:xfrm>
+      </p:grpSpPr>
+      <p:sp>
+        <p:nvSpPr>
+          <p:cNvPr id="2" name="Folienbildplatzhalter 1"/>
+          <p:cNvSpPr>
+            <a:spLocks noGrp="1" noRot="1" noChangeAspect="1"/>
+          </p:cNvSpPr>
+          <p:nvPr>
+            <p:ph type="sldImg"/>
+          </p:nvPr>
+        </p:nvSpPr>
+        <p:spPr/>
+      </p:sp>
+      <p:sp>
+        <p:nvSpPr>
+          <p:cNvPr id="3" name="Notizenplatzhalter 2"/>
+          <p:cNvSpPr>
+            <a:spLocks noGrp="1"/>
+          </p:cNvSpPr>
+          <p:nvPr>
+            <p:ph type="body" idx="1"/>
+          </p:nvPr>
+        </p:nvSpPr>
+        <p:spPr/>
+        <p:txBody>
+          <a:bodyPr/>
+          <a:lstStyle/>
+          <a:p>
+            <a:r>
+              <a:rPr lang="de-DE" dirty="0"/>
+              <a:t>Quelle: https://blog.kubesimplify.com/gitops-demystified</a:t>
+            </a:r>
+          </a:p>
+        </p:txBody>
+      </p:sp>
+      <p:sp>
+        <p:nvSpPr>
+          <p:cNvPr id="4" name="Foliennummernplatzhalter 3"/>
+          <p:cNvSpPr>
+            <a:spLocks noGrp="1"/>
+          </p:cNvSpPr>
+          <p:nvPr>
+            <p:ph type="sldNum" sz="quarter" idx="5"/>
+          </p:nvPr>
+        </p:nvSpPr>
+        <p:spPr/>
+        <p:txBody>
+          <a:bodyPr/>
+          <a:lstStyle/>
+          <a:p>
+            <a:fld id="{18182567-388C-4D33-8B7B-A651F195F118}" type="slidenum">
+              <a:rPr lang="de-DE" altLang="de-DE" smtClean="0"/>
+              <a:pPr/>
+              <a:t>25</a:t>
             </a:fld>
             <a:endParaRPr lang="de-DE" altLang="de-DE"/>
           </a:p>
@@ -3406,7 +3781,7 @@
               <a:pPr algn="ctr">
                 <a:defRPr/>
               </a:pPr>
-              <a:t>23.05.2024</a:t>
+              <a:t>24.05.2024</a:t>
             </a:fld>
             <a:endParaRPr lang="de-DE" sz="1000">
               <a:solidFill>
@@ -7225,19 +7600,19 @@
               <a:rPr lang="de-DE" dirty="0" err="1">
                 <a:sym typeface="Wingdings" panose="05000000000000000000" pitchFamily="2" charset="2"/>
               </a:rPr>
-              <a:t>continuous</a:t>
+              <a:t>Continuous</a:t>
             </a:r>
             <a:r>
               <a:rPr lang="de-DE" dirty="0">
                 <a:sym typeface="Wingdings" panose="05000000000000000000" pitchFamily="2" charset="2"/>
               </a:rPr>
-              <a:t> </a:t>
-            </a:r>
-            <a:r>
-              <a:rPr lang="de-DE" dirty="0" err="1">
+              <a:t> D</a:t>
+            </a:r>
+            <a:r>
+              <a:rPr lang="de-DE">
                 <a:sym typeface="Wingdings" panose="05000000000000000000" pitchFamily="2" charset="2"/>
               </a:rPr>
-              <a:t>deployment</a:t>
+              <a:t>eployment</a:t>
             </a:r>
             <a:r>
               <a:rPr lang="de-DE" dirty="0">
@@ -8392,6 +8767,989 @@
 </file>
 
 <file path=ppt/slides/slide20.xml><?xml version="1.0" encoding="utf-8"?>
+<p:sld xmlns:a="http://schemas.openxmlformats.org/drawingml/2006/main" xmlns:r="http://schemas.openxmlformats.org/officeDocument/2006/relationships" xmlns:p="http://schemas.openxmlformats.org/presentationml/2006/main">
+  <p:cSld>
+    <p:spTree>
+      <p:nvGrpSpPr>
+        <p:cNvPr id="1" name=""/>
+        <p:cNvGrpSpPr/>
+        <p:nvPr/>
+      </p:nvGrpSpPr>
+      <p:grpSpPr>
+        <a:xfrm>
+          <a:off x="0" y="0"/>
+          <a:ext cx="0" cy="0"/>
+          <a:chOff x="0" y="0"/>
+          <a:chExt cx="0" cy="0"/>
+        </a:xfrm>
+      </p:grpSpPr>
+      <p:sp>
+        <p:nvSpPr>
+          <p:cNvPr id="2" name="Titel 1">
+            <a:extLst>
+              <a:ext uri="{FF2B5EF4-FFF2-40B4-BE49-F238E27FC236}">
+                <a16:creationId xmlns:a16="http://schemas.microsoft.com/office/drawing/2014/main" id="{F9041593-6F1E-87C3-98D8-9EF6142A4F4C}"/>
+              </a:ext>
+            </a:extLst>
+          </p:cNvPr>
+          <p:cNvSpPr>
+            <a:spLocks noGrp="1"/>
+          </p:cNvSpPr>
+          <p:nvPr>
+            <p:ph type="title"/>
+          </p:nvPr>
+        </p:nvSpPr>
+        <p:spPr/>
+        <p:txBody>
+          <a:bodyPr/>
+          <a:lstStyle/>
+          <a:p>
+            <a:r>
+              <a:rPr lang="de-DE" dirty="0" err="1"/>
+              <a:t>GitOps</a:t>
+            </a:r>
+            <a:endParaRPr lang="de-DE" dirty="0"/>
+          </a:p>
+        </p:txBody>
+      </p:sp>
+      <p:sp>
+        <p:nvSpPr>
+          <p:cNvPr id="3" name="Inhaltsplatzhalter 2">
+            <a:extLst>
+              <a:ext uri="{FF2B5EF4-FFF2-40B4-BE49-F238E27FC236}">
+                <a16:creationId xmlns:a16="http://schemas.microsoft.com/office/drawing/2014/main" id="{8E5FB0BB-AC79-DFB4-A1E8-D4118C0EADF8}"/>
+              </a:ext>
+            </a:extLst>
+          </p:cNvPr>
+          <p:cNvSpPr>
+            <a:spLocks noGrp="1"/>
+          </p:cNvSpPr>
+          <p:nvPr>
+            <p:ph idx="1"/>
+          </p:nvPr>
+        </p:nvSpPr>
+        <p:spPr/>
+        <p:txBody>
+          <a:bodyPr/>
+          <a:lstStyle/>
+          <a:p>
+            <a:pPr marL="0" indent="0">
+              <a:buNone/>
+            </a:pPr>
+            <a:r>
+              <a:rPr lang="de-DE" b="1" dirty="0" err="1"/>
+              <a:t>GitOps</a:t>
+            </a:r>
+            <a:r>
+              <a:rPr lang="de-DE" b="1" dirty="0"/>
+              <a:t> Operators / Tools</a:t>
+            </a:r>
+          </a:p>
+          <a:p>
+            <a:pPr algn="l">
+              <a:buFont typeface="Arial" panose="020B0604020202020204" pitchFamily="34" charset="0"/>
+              <a:buChar char="•"/>
+            </a:pPr>
+            <a:r>
+              <a:rPr lang="en-US" sz="2000" b="0" i="0" u="sng" dirty="0" err="1">
+                <a:solidFill>
+                  <a:srgbClr val="1F2328"/>
+                </a:solidFill>
+                <a:effectLst/>
+                <a:latin typeface="-apple-system"/>
+                <a:hlinkClick r:id="rId3"/>
+              </a:rPr>
+              <a:t>ArgoCD</a:t>
+            </a:r>
+            <a:r>
+              <a:rPr lang="en-US" sz="2000" b="0" i="0" dirty="0">
+                <a:solidFill>
+                  <a:srgbClr val="1F2328"/>
+                </a:solidFill>
+                <a:effectLst/>
+                <a:latin typeface="-apple-system"/>
+              </a:rPr>
+              <a:t> - Declarative continuous deployment for Kubernetes</a:t>
+            </a:r>
+            <a:endParaRPr lang="de-DE" sz="2000" b="0" i="0" dirty="0">
+              <a:solidFill>
+                <a:srgbClr val="1F2328"/>
+              </a:solidFill>
+              <a:effectLst/>
+              <a:latin typeface="-apple-system"/>
+            </a:endParaRPr>
+          </a:p>
+          <a:p>
+            <a:pPr algn="l">
+              <a:buFont typeface="Arial" panose="020B0604020202020204" pitchFamily="34" charset="0"/>
+              <a:buChar char="•"/>
+            </a:pPr>
+            <a:r>
+              <a:rPr lang="en-US" sz="2000" b="0" i="0" u="sng" dirty="0">
+                <a:solidFill>
+                  <a:srgbClr val="1F2328"/>
+                </a:solidFill>
+                <a:effectLst/>
+                <a:latin typeface="-apple-system"/>
+                <a:hlinkClick r:id="rId4"/>
+              </a:rPr>
+              <a:t>Flux</a:t>
+            </a:r>
+            <a:r>
+              <a:rPr lang="en-US" sz="2000" b="0" i="0" dirty="0">
+                <a:solidFill>
+                  <a:srgbClr val="1F2328"/>
+                </a:solidFill>
+                <a:effectLst/>
+                <a:latin typeface="-apple-system"/>
+              </a:rPr>
+              <a:t> - Open and extensible continuous delivery solution for Kubernetes. Powered by </a:t>
+            </a:r>
+            <a:r>
+              <a:rPr lang="en-US" sz="2000" b="0" i="0" dirty="0" err="1">
+                <a:solidFill>
+                  <a:srgbClr val="1F2328"/>
+                </a:solidFill>
+                <a:effectLst/>
+                <a:latin typeface="-apple-system"/>
+              </a:rPr>
+              <a:t>GitOps</a:t>
+            </a:r>
+            <a:r>
+              <a:rPr lang="en-US" sz="2000" b="0" i="0" dirty="0">
+                <a:solidFill>
+                  <a:srgbClr val="1F2328"/>
+                </a:solidFill>
+                <a:effectLst/>
+                <a:latin typeface="-apple-system"/>
+              </a:rPr>
+              <a:t> Toolkit</a:t>
+            </a:r>
+          </a:p>
+          <a:p>
+            <a:pPr>
+              <a:buFont typeface="Arial" panose="020B0604020202020204" pitchFamily="34" charset="0"/>
+              <a:buChar char="•"/>
+            </a:pPr>
+            <a:r>
+              <a:rPr lang="en-US" sz="2000" b="0" i="0" u="sng" dirty="0">
+                <a:solidFill>
+                  <a:srgbClr val="1F2328"/>
+                </a:solidFill>
+                <a:effectLst/>
+                <a:latin typeface="-apple-system"/>
+                <a:hlinkClick r:id="rId5"/>
+              </a:rPr>
+              <a:t>Flagger</a:t>
+            </a:r>
+            <a:r>
+              <a:rPr lang="en-US" sz="2000" b="0" i="0" dirty="0">
+                <a:solidFill>
+                  <a:srgbClr val="1F2328"/>
+                </a:solidFill>
+                <a:effectLst/>
+                <a:latin typeface="-apple-system"/>
+              </a:rPr>
+              <a:t> - Progressive delivery Kubernetes operator (Canary, A/B testing and Blue/Green deployments automation)</a:t>
+            </a:r>
+            <a:endParaRPr lang="en-US" sz="2000" dirty="0">
+              <a:solidFill>
+                <a:srgbClr val="1F2328"/>
+              </a:solidFill>
+              <a:latin typeface="-apple-system"/>
+            </a:endParaRPr>
+          </a:p>
+          <a:p>
+            <a:pPr algn="l">
+              <a:buFont typeface="Arial" panose="020B0604020202020204" pitchFamily="34" charset="0"/>
+              <a:buChar char="•"/>
+            </a:pPr>
+            <a:r>
+              <a:rPr lang="en-US" sz="2000" b="0" i="0" u="sng" dirty="0">
+                <a:solidFill>
+                  <a:srgbClr val="1F2328"/>
+                </a:solidFill>
+                <a:effectLst/>
+                <a:latin typeface="-apple-system"/>
+                <a:hlinkClick r:id="rId6"/>
+              </a:rPr>
+              <a:t>Jenkins X</a:t>
+            </a:r>
+            <a:r>
+              <a:rPr lang="en-US" sz="2000" b="0" i="0" dirty="0">
+                <a:solidFill>
+                  <a:srgbClr val="1F2328"/>
+                </a:solidFill>
+                <a:effectLst/>
+                <a:latin typeface="-apple-system"/>
+              </a:rPr>
+              <a:t> - a CI/CD platform for Kubernetes that provides pipeline automation, built-in </a:t>
+            </a:r>
+            <a:r>
+              <a:rPr lang="en-US" sz="2000" b="0" i="0" dirty="0" err="1">
+                <a:solidFill>
+                  <a:srgbClr val="1F2328"/>
+                </a:solidFill>
+                <a:effectLst/>
+                <a:latin typeface="-apple-system"/>
+              </a:rPr>
+              <a:t>GitOps</a:t>
+            </a:r>
+            <a:r>
+              <a:rPr lang="en-US" sz="2000" b="0" i="0" dirty="0">
+                <a:solidFill>
+                  <a:srgbClr val="1F2328"/>
+                </a:solidFill>
+                <a:effectLst/>
+                <a:latin typeface="-apple-system"/>
+              </a:rPr>
+              <a:t> and preview environments</a:t>
+            </a:r>
+          </a:p>
+          <a:p>
+            <a:pPr algn="l">
+              <a:buFont typeface="Arial" panose="020B0604020202020204" pitchFamily="34" charset="0"/>
+              <a:buChar char="•"/>
+            </a:pPr>
+            <a:r>
+              <a:rPr lang="en-US" sz="2000" b="0" i="0" u="sng" dirty="0">
+                <a:solidFill>
+                  <a:srgbClr val="1F2328"/>
+                </a:solidFill>
+                <a:effectLst/>
+                <a:latin typeface="-apple-system"/>
+                <a:hlinkClick r:id="rId7"/>
+              </a:rPr>
+              <a:t>Werf</a:t>
+            </a:r>
+            <a:r>
+              <a:rPr lang="en-US" sz="2000" b="0" i="0" dirty="0">
+                <a:solidFill>
+                  <a:srgbClr val="1F2328"/>
+                </a:solidFill>
+                <a:effectLst/>
+                <a:latin typeface="-apple-system"/>
+              </a:rPr>
+              <a:t> - </a:t>
+            </a:r>
+            <a:r>
+              <a:rPr lang="en-US" sz="2000" b="0" i="0" dirty="0" err="1">
+                <a:solidFill>
+                  <a:srgbClr val="1F2328"/>
+                </a:solidFill>
+                <a:effectLst/>
+                <a:latin typeface="-apple-system"/>
+              </a:rPr>
+              <a:t>GitOps</a:t>
+            </a:r>
+            <a:r>
+              <a:rPr lang="en-US" sz="2000" b="0" i="0" dirty="0">
+                <a:solidFill>
+                  <a:srgbClr val="1F2328"/>
+                </a:solidFill>
+                <a:effectLst/>
+                <a:latin typeface="-apple-system"/>
+              </a:rPr>
+              <a:t> tool with advanced features to build images and deploy them to Kubernetes (integrates with any existing CI system)</a:t>
+            </a:r>
+            <a:endParaRPr lang="en-US" sz="2000" dirty="0">
+              <a:solidFill>
+                <a:srgbClr val="1F2328"/>
+              </a:solidFill>
+              <a:latin typeface="-apple-system"/>
+            </a:endParaRPr>
+          </a:p>
+          <a:p>
+            <a:pPr algn="l">
+              <a:buFont typeface="Arial" panose="020B0604020202020204" pitchFamily="34" charset="0"/>
+              <a:buChar char="•"/>
+            </a:pPr>
+            <a:r>
+              <a:rPr lang="en-US" sz="2000" b="0" i="0" u="sng" dirty="0" err="1">
+                <a:solidFill>
+                  <a:srgbClr val="1F2328"/>
+                </a:solidFill>
+                <a:effectLst/>
+                <a:latin typeface="-apple-system"/>
+                <a:hlinkClick r:id="rId8"/>
+              </a:rPr>
+              <a:t>PipeCD</a:t>
+            </a:r>
+            <a:r>
+              <a:rPr lang="en-US" sz="2000" b="0" i="0" dirty="0">
+                <a:solidFill>
+                  <a:srgbClr val="1F2328"/>
+                </a:solidFill>
+                <a:effectLst/>
+                <a:latin typeface="-apple-system"/>
+              </a:rPr>
+              <a:t> - Continuous Delivery for Declarative Kubernetes, Serverless and Infrastructure Applications</a:t>
+            </a:r>
+          </a:p>
+          <a:p>
+            <a:pPr algn="l">
+              <a:buFont typeface="Arial" panose="020B0604020202020204" pitchFamily="34" charset="0"/>
+              <a:buChar char="•"/>
+            </a:pPr>
+            <a:r>
+              <a:rPr lang="en-US" sz="2000" dirty="0">
+                <a:solidFill>
+                  <a:srgbClr val="1F2328"/>
+                </a:solidFill>
+                <a:latin typeface="-apple-system"/>
+                <a:hlinkClick r:id="rId9"/>
+              </a:rPr>
+              <a:t>GitLab K8s Agent </a:t>
+            </a:r>
+            <a:r>
+              <a:rPr lang="en-US" sz="2000" dirty="0">
+                <a:solidFill>
+                  <a:srgbClr val="1F2328"/>
+                </a:solidFill>
+                <a:latin typeface="-apple-system"/>
+              </a:rPr>
+              <a:t>- Connecting a Kubernetes cluster with GitLab</a:t>
+            </a:r>
+            <a:endParaRPr lang="en-US" sz="2000" b="0" i="0" dirty="0">
+              <a:solidFill>
+                <a:srgbClr val="1F2328"/>
+              </a:solidFill>
+              <a:effectLst/>
+              <a:latin typeface="-apple-system"/>
+            </a:endParaRPr>
+          </a:p>
+          <a:p>
+            <a:pPr algn="l">
+              <a:buFont typeface="Arial" panose="020B0604020202020204" pitchFamily="34" charset="0"/>
+              <a:buChar char="•"/>
+            </a:pPr>
+            <a:endParaRPr lang="en-US" dirty="0">
+              <a:solidFill>
+                <a:srgbClr val="1F2328"/>
+              </a:solidFill>
+              <a:latin typeface="-apple-system"/>
+            </a:endParaRPr>
+          </a:p>
+          <a:p>
+            <a:pPr algn="l">
+              <a:buFont typeface="Arial" panose="020B0604020202020204" pitchFamily="34" charset="0"/>
+              <a:buChar char="•"/>
+            </a:pPr>
+            <a:endParaRPr lang="en-US" b="0" i="0" dirty="0">
+              <a:solidFill>
+                <a:srgbClr val="1F2328"/>
+              </a:solidFill>
+              <a:effectLst/>
+              <a:latin typeface="-apple-system"/>
+            </a:endParaRPr>
+          </a:p>
+        </p:txBody>
+      </p:sp>
+    </p:spTree>
+    <p:extLst>
+      <p:ext uri="{BB962C8B-B14F-4D97-AF65-F5344CB8AC3E}">
+        <p14:creationId xmlns:p14="http://schemas.microsoft.com/office/powerpoint/2010/main" val="499359274"/>
+      </p:ext>
+    </p:extLst>
+  </p:cSld>
+  <p:clrMapOvr>
+    <a:masterClrMapping/>
+  </p:clrMapOvr>
+</p:sld>
+</file>
+
+<file path=ppt/slides/slide21.xml><?xml version="1.0" encoding="utf-8"?>
+<p:sld xmlns:a="http://schemas.openxmlformats.org/drawingml/2006/main" xmlns:r="http://schemas.openxmlformats.org/officeDocument/2006/relationships" xmlns:p="http://schemas.openxmlformats.org/presentationml/2006/main">
+  <p:cSld>
+    <p:spTree>
+      <p:nvGrpSpPr>
+        <p:cNvPr id="1" name=""/>
+        <p:cNvGrpSpPr/>
+        <p:nvPr/>
+      </p:nvGrpSpPr>
+      <p:grpSpPr>
+        <a:xfrm>
+          <a:off x="0" y="0"/>
+          <a:ext cx="0" cy="0"/>
+          <a:chOff x="0" y="0"/>
+          <a:chExt cx="0" cy="0"/>
+        </a:xfrm>
+      </p:grpSpPr>
+      <p:sp>
+        <p:nvSpPr>
+          <p:cNvPr id="2" name="Titel 1">
+            <a:extLst>
+              <a:ext uri="{FF2B5EF4-FFF2-40B4-BE49-F238E27FC236}">
+                <a16:creationId xmlns:a16="http://schemas.microsoft.com/office/drawing/2014/main" id="{6852D978-9DF5-1E6A-F50B-0CA32EA8DAC7}"/>
+              </a:ext>
+            </a:extLst>
+          </p:cNvPr>
+          <p:cNvSpPr>
+            <a:spLocks noGrp="1"/>
+          </p:cNvSpPr>
+          <p:nvPr>
+            <p:ph type="title"/>
+          </p:nvPr>
+        </p:nvSpPr>
+        <p:spPr/>
+        <p:txBody>
+          <a:bodyPr/>
+          <a:lstStyle/>
+          <a:p>
+            <a:r>
+              <a:rPr lang="de-DE" dirty="0" err="1"/>
+              <a:t>GitOps</a:t>
+            </a:r>
+            <a:endParaRPr lang="de-DE" dirty="0"/>
+          </a:p>
+        </p:txBody>
+      </p:sp>
+      <p:pic>
+        <p:nvPicPr>
+          <p:cNvPr id="5" name="Inhaltsplatzhalter 4">
+            <a:extLst>
+              <a:ext uri="{FF2B5EF4-FFF2-40B4-BE49-F238E27FC236}">
+                <a16:creationId xmlns:a16="http://schemas.microsoft.com/office/drawing/2014/main" id="{37FD0FEF-8FFD-7132-377A-BD8E8097BBE0}"/>
+              </a:ext>
+            </a:extLst>
+          </p:cNvPr>
+          <p:cNvPicPr>
+            <a:picLocks noGrp="1" noChangeAspect="1"/>
+          </p:cNvPicPr>
+          <p:nvPr>
+            <p:ph idx="1"/>
+          </p:nvPr>
+        </p:nvPicPr>
+        <p:blipFill>
+          <a:blip r:embed="rId3">
+            <a:extLst>
+              <a:ext uri="{28A0092B-C50C-407E-A947-70E740481C1C}">
+                <a14:useLocalDpi xmlns:a14="http://schemas.microsoft.com/office/drawing/2010/main" val="0"/>
+              </a:ext>
+            </a:extLst>
+          </a:blip>
+          <a:stretch>
+            <a:fillRect/>
+          </a:stretch>
+        </p:blipFill>
+        <p:spPr>
+          <a:xfrm>
+            <a:off x="332581" y="1300162"/>
+            <a:ext cx="8458200" cy="4762500"/>
+          </a:xfrm>
+        </p:spPr>
+      </p:pic>
+    </p:spTree>
+    <p:extLst>
+      <p:ext uri="{BB962C8B-B14F-4D97-AF65-F5344CB8AC3E}">
+        <p14:creationId xmlns:p14="http://schemas.microsoft.com/office/powerpoint/2010/main" val="3210427694"/>
+      </p:ext>
+    </p:extLst>
+  </p:cSld>
+  <p:clrMapOvr>
+    <a:masterClrMapping/>
+  </p:clrMapOvr>
+</p:sld>
+</file>
+
+<file path=ppt/slides/slide22.xml><?xml version="1.0" encoding="utf-8"?>
+<p:sld xmlns:a="http://schemas.openxmlformats.org/drawingml/2006/main" xmlns:r="http://schemas.openxmlformats.org/officeDocument/2006/relationships" xmlns:p="http://schemas.openxmlformats.org/presentationml/2006/main">
+  <p:cSld>
+    <p:spTree>
+      <p:nvGrpSpPr>
+        <p:cNvPr id="1" name=""/>
+        <p:cNvGrpSpPr/>
+        <p:nvPr/>
+      </p:nvGrpSpPr>
+      <p:grpSpPr>
+        <a:xfrm>
+          <a:off x="0" y="0"/>
+          <a:ext cx="0" cy="0"/>
+          <a:chOff x="0" y="0"/>
+          <a:chExt cx="0" cy="0"/>
+        </a:xfrm>
+      </p:grpSpPr>
+      <p:sp>
+        <p:nvSpPr>
+          <p:cNvPr id="2" name="Titel 1">
+            <a:extLst>
+              <a:ext uri="{FF2B5EF4-FFF2-40B4-BE49-F238E27FC236}">
+                <a16:creationId xmlns:a16="http://schemas.microsoft.com/office/drawing/2014/main" id="{6852D978-9DF5-1E6A-F50B-0CA32EA8DAC7}"/>
+              </a:ext>
+            </a:extLst>
+          </p:cNvPr>
+          <p:cNvSpPr>
+            <a:spLocks noGrp="1"/>
+          </p:cNvSpPr>
+          <p:nvPr>
+            <p:ph type="title"/>
+          </p:nvPr>
+        </p:nvSpPr>
+        <p:spPr/>
+        <p:txBody>
+          <a:bodyPr/>
+          <a:lstStyle/>
+          <a:p>
+            <a:r>
+              <a:rPr lang="de-DE" dirty="0" err="1"/>
+              <a:t>GitOps</a:t>
+            </a:r>
+            <a:endParaRPr lang="de-DE" dirty="0"/>
+          </a:p>
+        </p:txBody>
+      </p:sp>
+      <p:sp>
+        <p:nvSpPr>
+          <p:cNvPr id="3" name="Inhaltsplatzhalter 2">
+            <a:extLst>
+              <a:ext uri="{FF2B5EF4-FFF2-40B4-BE49-F238E27FC236}">
+                <a16:creationId xmlns:a16="http://schemas.microsoft.com/office/drawing/2014/main" id="{81753C8B-5EF0-E49E-1FFB-0330FD2A3542}"/>
+              </a:ext>
+            </a:extLst>
+          </p:cNvPr>
+          <p:cNvSpPr>
+            <a:spLocks noGrp="1"/>
+          </p:cNvSpPr>
+          <p:nvPr>
+            <p:ph idx="1"/>
+          </p:nvPr>
+        </p:nvSpPr>
+        <p:spPr/>
+        <p:txBody>
+          <a:bodyPr/>
+          <a:lstStyle/>
+          <a:p>
+            <a:pPr marL="0" indent="0">
+              <a:buNone/>
+            </a:pPr>
+            <a:r>
+              <a:rPr lang="de-DE" b="1" dirty="0"/>
+              <a:t>Secrets</a:t>
+            </a:r>
+          </a:p>
+          <a:p>
+            <a:pPr>
+              <a:buFont typeface="Arial" panose="020B0604020202020204" pitchFamily="34" charset="0"/>
+              <a:buChar char="•"/>
+            </a:pPr>
+            <a:r>
+              <a:rPr lang="de-DE" dirty="0"/>
+              <a:t>Bei </a:t>
+            </a:r>
+            <a:r>
+              <a:rPr lang="de-DE" dirty="0" err="1"/>
+              <a:t>CIOps</a:t>
+            </a:r>
+            <a:r>
+              <a:rPr lang="de-DE" dirty="0"/>
+              <a:t> oft im CI Server hinterlegt…</a:t>
+            </a:r>
+          </a:p>
+          <a:p>
+            <a:pPr>
+              <a:buFont typeface="Arial" panose="020B0604020202020204" pitchFamily="34" charset="0"/>
+              <a:buChar char="•"/>
+            </a:pPr>
+            <a:r>
+              <a:rPr lang="de-DE" dirty="0">
+                <a:sym typeface="Wingdings" panose="05000000000000000000" pitchFamily="2" charset="2"/>
+              </a:rPr>
+              <a:t>Secrets im Repository speichern</a:t>
+            </a:r>
+          </a:p>
+          <a:p>
+            <a:pPr lvl="1">
+              <a:buFont typeface="Arial" panose="020B0604020202020204" pitchFamily="34" charset="0"/>
+              <a:buChar char="•"/>
+            </a:pPr>
+            <a:r>
+              <a:rPr lang="de-DE" dirty="0" err="1">
+                <a:sym typeface="Wingdings" panose="05000000000000000000" pitchFamily="2" charset="2"/>
+              </a:rPr>
+              <a:t>encrypted</a:t>
+            </a:r>
+            <a:r>
+              <a:rPr lang="de-DE" dirty="0">
+                <a:sym typeface="Wingdings" panose="05000000000000000000" pitchFamily="2" charset="2"/>
+              </a:rPr>
+              <a:t>/</a:t>
+            </a:r>
+            <a:r>
+              <a:rPr lang="de-DE" dirty="0" err="1">
+                <a:sym typeface="Wingdings" panose="05000000000000000000" pitchFamily="2" charset="2"/>
+              </a:rPr>
+              <a:t>sealed</a:t>
+            </a:r>
+            <a:r>
+              <a:rPr lang="de-DE" dirty="0">
+                <a:sym typeface="Wingdings" panose="05000000000000000000" pitchFamily="2" charset="2"/>
+              </a:rPr>
+              <a:t>!</a:t>
+            </a:r>
+          </a:p>
+          <a:p>
+            <a:pPr>
+              <a:buFont typeface="Arial" panose="020B0604020202020204" pitchFamily="34" charset="0"/>
+              <a:buChar char="•"/>
+            </a:pPr>
+            <a:r>
+              <a:rPr lang="de-DE" dirty="0">
+                <a:sym typeface="Wingdings" panose="05000000000000000000" pitchFamily="2" charset="2"/>
+              </a:rPr>
+              <a:t>Secret im Key Management System (KMS) speichern</a:t>
+            </a:r>
+          </a:p>
+          <a:p>
+            <a:pPr lvl="1">
+              <a:buFont typeface="Arial" panose="020B0604020202020204" pitchFamily="34" charset="0"/>
+              <a:buChar char="•"/>
+            </a:pPr>
+            <a:r>
+              <a:rPr lang="de-DE" dirty="0">
+                <a:sym typeface="Wingdings" panose="05000000000000000000" pitchFamily="2" charset="2"/>
+              </a:rPr>
+              <a:t>Verschiedene KMS</a:t>
+            </a:r>
+          </a:p>
+          <a:p>
+            <a:pPr lvl="2">
+              <a:buFont typeface="Arial" panose="020B0604020202020204" pitchFamily="34" charset="0"/>
+              <a:buChar char="•"/>
+            </a:pPr>
+            <a:r>
+              <a:rPr lang="de-DE" dirty="0">
+                <a:sym typeface="Wingdings" panose="05000000000000000000" pitchFamily="2" charset="2"/>
+              </a:rPr>
+              <a:t>Proprietär – </a:t>
+            </a:r>
+            <a:r>
+              <a:rPr lang="de-DE" dirty="0" err="1">
+                <a:sym typeface="Wingdings" panose="05000000000000000000" pitchFamily="2" charset="2"/>
+              </a:rPr>
+              <a:t>idR</a:t>
+            </a:r>
+            <a:r>
+              <a:rPr lang="de-DE" dirty="0">
+                <a:sym typeface="Wingdings" panose="05000000000000000000" pitchFamily="2" charset="2"/>
+              </a:rPr>
+              <a:t>. Cloud-Anbieter (AWS, Azure, Google, …)</a:t>
+            </a:r>
+          </a:p>
+          <a:p>
+            <a:pPr lvl="2">
+              <a:buFont typeface="Arial" panose="020B0604020202020204" pitchFamily="34" charset="0"/>
+              <a:buChar char="•"/>
+            </a:pPr>
+            <a:r>
+              <a:rPr lang="de-DE" dirty="0" err="1">
+                <a:sym typeface="Wingdings" panose="05000000000000000000" pitchFamily="2" charset="2"/>
+              </a:rPr>
+              <a:t>Hashicrop</a:t>
+            </a:r>
+            <a:r>
+              <a:rPr lang="de-DE" dirty="0">
+                <a:sym typeface="Wingdings" panose="05000000000000000000" pitchFamily="2" charset="2"/>
+              </a:rPr>
+              <a:t> </a:t>
+            </a:r>
+            <a:r>
+              <a:rPr lang="de-DE" dirty="0" err="1">
+                <a:sym typeface="Wingdings" panose="05000000000000000000" pitchFamily="2" charset="2"/>
+              </a:rPr>
+              <a:t>Vault</a:t>
+            </a:r>
+            <a:endParaRPr lang="de-DE" dirty="0">
+              <a:sym typeface="Wingdings" panose="05000000000000000000" pitchFamily="2" charset="2"/>
+            </a:endParaRPr>
+          </a:p>
+          <a:p>
+            <a:pPr lvl="1">
+              <a:buFont typeface="Arial" panose="020B0604020202020204" pitchFamily="34" charset="0"/>
+              <a:buChar char="•"/>
+            </a:pPr>
+            <a:r>
+              <a:rPr lang="de-DE" dirty="0" err="1">
+                <a:sym typeface="Wingdings" panose="05000000000000000000" pitchFamily="2" charset="2"/>
+              </a:rPr>
+              <a:t>Kubernetes</a:t>
+            </a:r>
+            <a:r>
+              <a:rPr lang="de-DE" dirty="0">
+                <a:sym typeface="Wingdings" panose="05000000000000000000" pitchFamily="2" charset="2"/>
+              </a:rPr>
+              <a:t> Integration</a:t>
+            </a:r>
+          </a:p>
+          <a:p>
+            <a:pPr lvl="2">
+              <a:buFont typeface="Arial" panose="020B0604020202020204" pitchFamily="34" charset="0"/>
+              <a:buChar char="•"/>
+            </a:pPr>
+            <a:r>
+              <a:rPr lang="de-DE" dirty="0">
+                <a:sym typeface="Wingdings" panose="05000000000000000000" pitchFamily="2" charset="2"/>
+              </a:rPr>
+              <a:t>Operator, Container Storage Interface (CSI) Driver, Sidecar (</a:t>
+            </a:r>
+            <a:r>
+              <a:rPr lang="de-DE" dirty="0" err="1">
+                <a:sym typeface="Wingdings" panose="05000000000000000000" pitchFamily="2" charset="2"/>
+              </a:rPr>
+              <a:t>Injector</a:t>
+            </a:r>
+            <a:r>
+              <a:rPr lang="de-DE" dirty="0">
+                <a:sym typeface="Wingdings" panose="05000000000000000000" pitchFamily="2" charset="2"/>
+              </a:rPr>
+              <a:t>), Helm/</a:t>
+            </a:r>
+            <a:r>
+              <a:rPr lang="de-DE" dirty="0" err="1">
+                <a:sym typeface="Wingdings" panose="05000000000000000000" pitchFamily="2" charset="2"/>
+              </a:rPr>
+              <a:t>Kustomize</a:t>
+            </a:r>
+            <a:r>
+              <a:rPr lang="de-DE" dirty="0">
+                <a:sym typeface="Wingdings" panose="05000000000000000000" pitchFamily="2" charset="2"/>
+              </a:rPr>
+              <a:t> </a:t>
+            </a:r>
+            <a:r>
+              <a:rPr lang="de-DE" dirty="0" err="1">
+                <a:sym typeface="Wingdings" panose="05000000000000000000" pitchFamily="2" charset="2"/>
+              </a:rPr>
+              <a:t>plugin</a:t>
+            </a:r>
+            <a:r>
+              <a:rPr lang="de-DE" dirty="0">
+                <a:sym typeface="Wingdings" panose="05000000000000000000" pitchFamily="2" charset="2"/>
+              </a:rPr>
+              <a:t>, </a:t>
+            </a:r>
+            <a:r>
+              <a:rPr lang="de-DE" dirty="0" err="1">
+                <a:sym typeface="Wingdings" panose="05000000000000000000" pitchFamily="2" charset="2"/>
+              </a:rPr>
+              <a:t>GitOps</a:t>
+            </a:r>
+            <a:r>
+              <a:rPr lang="de-DE" dirty="0">
+                <a:sym typeface="Wingdings" panose="05000000000000000000" pitchFamily="2" charset="2"/>
+              </a:rPr>
+              <a:t> Operator: nativer Support oder Plugin</a:t>
+            </a:r>
+          </a:p>
+          <a:p>
+            <a:pPr lvl="1">
+              <a:buFont typeface="Arial" panose="020B0604020202020204" pitchFamily="34" charset="0"/>
+              <a:buChar char="•"/>
+            </a:pPr>
+            <a:endParaRPr lang="de-DE" dirty="0">
+              <a:sym typeface="Wingdings" panose="05000000000000000000" pitchFamily="2" charset="2"/>
+            </a:endParaRPr>
+          </a:p>
+        </p:txBody>
+      </p:sp>
+    </p:spTree>
+    <p:extLst>
+      <p:ext uri="{BB962C8B-B14F-4D97-AF65-F5344CB8AC3E}">
+        <p14:creationId xmlns:p14="http://schemas.microsoft.com/office/powerpoint/2010/main" val="3284561798"/>
+      </p:ext>
+    </p:extLst>
+  </p:cSld>
+  <p:clrMapOvr>
+    <a:masterClrMapping/>
+  </p:clrMapOvr>
+</p:sld>
+</file>
+
+<file path=ppt/slides/slide23.xml><?xml version="1.0" encoding="utf-8"?>
+<p:sld xmlns:a="http://schemas.openxmlformats.org/drawingml/2006/main" xmlns:r="http://schemas.openxmlformats.org/officeDocument/2006/relationships" xmlns:p="http://schemas.openxmlformats.org/presentationml/2006/main">
+  <p:cSld>
+    <p:spTree>
+      <p:nvGrpSpPr>
+        <p:cNvPr id="1" name=""/>
+        <p:cNvGrpSpPr/>
+        <p:nvPr/>
+      </p:nvGrpSpPr>
+      <p:grpSpPr>
+        <a:xfrm>
+          <a:off x="0" y="0"/>
+          <a:ext cx="0" cy="0"/>
+          <a:chOff x="0" y="0"/>
+          <a:chExt cx="0" cy="0"/>
+        </a:xfrm>
+      </p:grpSpPr>
+      <p:sp>
+        <p:nvSpPr>
+          <p:cNvPr id="2" name="Titel 1">
+            <a:extLst>
+              <a:ext uri="{FF2B5EF4-FFF2-40B4-BE49-F238E27FC236}">
+                <a16:creationId xmlns:a16="http://schemas.microsoft.com/office/drawing/2014/main" id="{6852D978-9DF5-1E6A-F50B-0CA32EA8DAC7}"/>
+              </a:ext>
+            </a:extLst>
+          </p:cNvPr>
+          <p:cNvSpPr>
+            <a:spLocks noGrp="1"/>
+          </p:cNvSpPr>
+          <p:nvPr>
+            <p:ph type="title"/>
+          </p:nvPr>
+        </p:nvSpPr>
+        <p:spPr/>
+        <p:txBody>
+          <a:bodyPr/>
+          <a:lstStyle/>
+          <a:p>
+            <a:r>
+              <a:rPr lang="de-DE" dirty="0" err="1"/>
+              <a:t>GitOps</a:t>
+            </a:r>
+            <a:endParaRPr lang="de-DE" dirty="0"/>
+          </a:p>
+        </p:txBody>
+      </p:sp>
+      <p:sp>
+        <p:nvSpPr>
+          <p:cNvPr id="3" name="Inhaltsplatzhalter 2">
+            <a:extLst>
+              <a:ext uri="{FF2B5EF4-FFF2-40B4-BE49-F238E27FC236}">
+                <a16:creationId xmlns:a16="http://schemas.microsoft.com/office/drawing/2014/main" id="{81753C8B-5EF0-E49E-1FFB-0330FD2A3542}"/>
+              </a:ext>
+            </a:extLst>
+          </p:cNvPr>
+          <p:cNvSpPr>
+            <a:spLocks noGrp="1"/>
+          </p:cNvSpPr>
+          <p:nvPr>
+            <p:ph idx="1"/>
+          </p:nvPr>
+        </p:nvSpPr>
+        <p:spPr/>
+        <p:txBody>
+          <a:bodyPr/>
+          <a:lstStyle/>
+          <a:p>
+            <a:pPr marL="0" indent="0">
+              <a:buNone/>
+            </a:pPr>
+            <a:r>
+              <a:rPr lang="de-DE" dirty="0"/>
+              <a:t>Einsatzbereiche</a:t>
+            </a:r>
+          </a:p>
+        </p:txBody>
+      </p:sp>
+    </p:spTree>
+    <p:extLst>
+      <p:ext uri="{BB962C8B-B14F-4D97-AF65-F5344CB8AC3E}">
+        <p14:creationId xmlns:p14="http://schemas.microsoft.com/office/powerpoint/2010/main" val="350845558"/>
+      </p:ext>
+    </p:extLst>
+  </p:cSld>
+  <p:clrMapOvr>
+    <a:masterClrMapping/>
+  </p:clrMapOvr>
+</p:sld>
+</file>
+
+<file path=ppt/slides/slide24.xml><?xml version="1.0" encoding="utf-8"?>
+<p:sld xmlns:a="http://schemas.openxmlformats.org/drawingml/2006/main" xmlns:r="http://schemas.openxmlformats.org/officeDocument/2006/relationships" xmlns:p="http://schemas.openxmlformats.org/presentationml/2006/main">
+  <p:cSld>
+    <p:spTree>
+      <p:nvGrpSpPr>
+        <p:cNvPr id="1" name=""/>
+        <p:cNvGrpSpPr/>
+        <p:nvPr/>
+      </p:nvGrpSpPr>
+      <p:grpSpPr>
+        <a:xfrm>
+          <a:off x="0" y="0"/>
+          <a:ext cx="0" cy="0"/>
+          <a:chOff x="0" y="0"/>
+          <a:chExt cx="0" cy="0"/>
+        </a:xfrm>
+      </p:grpSpPr>
+      <p:sp>
+        <p:nvSpPr>
+          <p:cNvPr id="2" name="Titel 1">
+            <a:extLst>
+              <a:ext uri="{FF2B5EF4-FFF2-40B4-BE49-F238E27FC236}">
+                <a16:creationId xmlns:a16="http://schemas.microsoft.com/office/drawing/2014/main" id="{6852D978-9DF5-1E6A-F50B-0CA32EA8DAC7}"/>
+              </a:ext>
+            </a:extLst>
+          </p:cNvPr>
+          <p:cNvSpPr>
+            <a:spLocks noGrp="1"/>
+          </p:cNvSpPr>
+          <p:nvPr>
+            <p:ph type="title"/>
+          </p:nvPr>
+        </p:nvSpPr>
+        <p:spPr/>
+        <p:txBody>
+          <a:bodyPr/>
+          <a:lstStyle/>
+          <a:p>
+            <a:r>
+              <a:rPr lang="de-DE" dirty="0" err="1"/>
+              <a:t>GitOps</a:t>
+            </a:r>
+            <a:endParaRPr lang="de-DE" dirty="0"/>
+          </a:p>
+        </p:txBody>
+      </p:sp>
+      <p:sp>
+        <p:nvSpPr>
+          <p:cNvPr id="3" name="Inhaltsplatzhalter 2">
+            <a:extLst>
+              <a:ext uri="{FF2B5EF4-FFF2-40B4-BE49-F238E27FC236}">
+                <a16:creationId xmlns:a16="http://schemas.microsoft.com/office/drawing/2014/main" id="{81753C8B-5EF0-E49E-1FFB-0330FD2A3542}"/>
+              </a:ext>
+            </a:extLst>
+          </p:cNvPr>
+          <p:cNvSpPr>
+            <a:spLocks noGrp="1"/>
+          </p:cNvSpPr>
+          <p:nvPr>
+            <p:ph idx="1"/>
+          </p:nvPr>
+        </p:nvSpPr>
+        <p:spPr/>
+        <p:txBody>
+          <a:bodyPr/>
+          <a:lstStyle/>
+          <a:p>
+            <a:pPr marL="0" indent="0">
+              <a:buNone/>
+            </a:pPr>
+            <a:r>
+              <a:rPr lang="de-DE" dirty="0"/>
+              <a:t>Best </a:t>
+            </a:r>
+            <a:r>
+              <a:rPr lang="de-DE" dirty="0" err="1"/>
+              <a:t>Practises</a:t>
+            </a:r>
+            <a:endParaRPr lang="de-DE" dirty="0"/>
+          </a:p>
+        </p:txBody>
+      </p:sp>
+    </p:spTree>
+    <p:extLst>
+      <p:ext uri="{BB962C8B-B14F-4D97-AF65-F5344CB8AC3E}">
+        <p14:creationId xmlns:p14="http://schemas.microsoft.com/office/powerpoint/2010/main" val="3958068818"/>
+      </p:ext>
+    </p:extLst>
+  </p:cSld>
+  <p:clrMapOvr>
+    <a:masterClrMapping/>
+  </p:clrMapOvr>
+</p:sld>
+</file>
+
+<file path=ppt/slides/slide25.xml><?xml version="1.0" encoding="utf-8"?>
 <p:sld xmlns:a="http://schemas.openxmlformats.org/drawingml/2006/main" xmlns:r="http://schemas.openxmlformats.org/officeDocument/2006/relationships" xmlns:p="http://schemas.openxmlformats.org/presentationml/2006/main">
   <p:cSld>
     <p:spTree>

</xml_diff>

<commit_message>
Tag-2_5: Kubernetes mit Kubernetes betreiben: Management Cluster und Target Cluster(s)
</commit_message>
<xml_diff>
--- a/slides/Tag-2_5-GitOps.pptx
+++ b/slides/Tag-2_5-GitOps.pptx
@@ -6,10 +6,10 @@
     <p:sldMasterId id="2147483649" r:id="rId2"/>
   </p:sldMasterIdLst>
   <p:notesMasterIdLst>
-    <p:notesMasterId r:id="rId28"/>
+    <p:notesMasterId r:id="rId30"/>
   </p:notesMasterIdLst>
   <p:handoutMasterIdLst>
-    <p:handoutMasterId r:id="rId29"/>
+    <p:handoutMasterId r:id="rId31"/>
   </p:handoutMasterIdLst>
   <p:sldIdLst>
     <p:sldId id="288" r:id="rId3"/>
@@ -34,9 +34,11 @@
     <p:sldId id="609" r:id="rId22"/>
     <p:sldId id="605" r:id="rId23"/>
     <p:sldId id="608" r:id="rId24"/>
-    <p:sldId id="606" r:id="rId25"/>
-    <p:sldId id="607" r:id="rId26"/>
-    <p:sldId id="598" r:id="rId27"/>
+    <p:sldId id="610" r:id="rId25"/>
+    <p:sldId id="611" r:id="rId26"/>
+    <p:sldId id="606" r:id="rId27"/>
+    <p:sldId id="607" r:id="rId28"/>
+    <p:sldId id="598" r:id="rId29"/>
   </p:sldIdLst>
   <p:sldSz cx="9144000" cy="6858000" type="screen4x3"/>
   <p:notesSz cx="6784975" cy="9921875"/>
@@ -1884,10 +1886,7 @@
           <a:bodyPr/>
           <a:lstStyle/>
           <a:p>
-            <a:r>
-              <a:rPr lang="de-DE" dirty="0"/>
-              <a:t>Quelle: https://blog.kubesimplify.com/gitops-demystified</a:t>
-            </a:r>
+            <a:endParaRPr lang="de-DE" dirty="0"/>
           </a:p>
         </p:txBody>
       </p:sp>
@@ -1909,7 +1908,425 @@
             <a:fld id="{18182567-388C-4D33-8B7B-A651F195F118}" type="slidenum">
               <a:rPr lang="de-DE" altLang="de-DE" smtClean="0"/>
               <a:pPr/>
-              <a:t>25</a:t>
+              <a:t>23</a:t>
+            </a:fld>
+            <a:endParaRPr lang="de-DE" altLang="de-DE"/>
+          </a:p>
+        </p:txBody>
+      </p:sp>
+    </p:spTree>
+    <p:extLst>
+      <p:ext uri="{BB962C8B-B14F-4D97-AF65-F5344CB8AC3E}">
+        <p14:creationId xmlns:p14="http://schemas.microsoft.com/office/powerpoint/2010/main" val="2745888912"/>
+      </p:ext>
+    </p:extLst>
+  </p:cSld>
+  <p:clrMapOvr>
+    <a:masterClrMapping/>
+  </p:clrMapOvr>
+</p:notes>
+</file>
+
+<file path=ppt/notesSlides/notesSlide17.xml><?xml version="1.0" encoding="utf-8"?>
+<p:notes xmlns:a="http://schemas.openxmlformats.org/drawingml/2006/main" xmlns:r="http://schemas.openxmlformats.org/officeDocument/2006/relationships" xmlns:p="http://schemas.openxmlformats.org/presentationml/2006/main">
+  <p:cSld>
+    <p:spTree>
+      <p:nvGrpSpPr>
+        <p:cNvPr id="1" name=""/>
+        <p:cNvGrpSpPr/>
+        <p:nvPr/>
+      </p:nvGrpSpPr>
+      <p:grpSpPr>
+        <a:xfrm>
+          <a:off x="0" y="0"/>
+          <a:ext cx="0" cy="0"/>
+          <a:chOff x="0" y="0"/>
+          <a:chExt cx="0" cy="0"/>
+        </a:xfrm>
+      </p:grpSpPr>
+      <p:sp>
+        <p:nvSpPr>
+          <p:cNvPr id="2" name="Folienbildplatzhalter 1"/>
+          <p:cNvSpPr>
+            <a:spLocks noGrp="1" noRot="1" noChangeAspect="1"/>
+          </p:cNvSpPr>
+          <p:nvPr>
+            <p:ph type="sldImg"/>
+          </p:nvPr>
+        </p:nvSpPr>
+        <p:spPr/>
+      </p:sp>
+      <p:sp>
+        <p:nvSpPr>
+          <p:cNvPr id="3" name="Notizenplatzhalter 2"/>
+          <p:cNvSpPr>
+            <a:spLocks noGrp="1"/>
+          </p:cNvSpPr>
+          <p:nvPr>
+            <p:ph type="body" idx="1"/>
+          </p:nvPr>
+        </p:nvSpPr>
+        <p:spPr/>
+        <p:txBody>
+          <a:bodyPr/>
+          <a:lstStyle/>
+          <a:p>
+            <a:r>
+              <a:rPr lang="de-DE" dirty="0" err="1"/>
+              <a:t>Infra</a:t>
+            </a:r>
+            <a:r>
+              <a:rPr lang="de-DE" dirty="0"/>
+              <a:t> </a:t>
+            </a:r>
+            <a:r>
+              <a:rPr lang="de-DE" dirty="0" err="1"/>
+              <a:t>operator</a:t>
+            </a:r>
+            <a:endParaRPr lang="de-DE" dirty="0"/>
+          </a:p>
+          <a:p>
+            <a:r>
+              <a:rPr lang="de-DE" dirty="0"/>
+              <a:t>- stellt die deklarativen </a:t>
+            </a:r>
+            <a:r>
+              <a:rPr lang="de-DE" dirty="0" err="1"/>
+              <a:t>beschreibungen</a:t>
+            </a:r>
+            <a:r>
+              <a:rPr lang="de-DE" dirty="0"/>
+              <a:t> für </a:t>
+            </a:r>
+            <a:r>
+              <a:rPr lang="de-DE" dirty="0" err="1"/>
+              <a:t>infrastruktur</a:t>
+            </a:r>
+            <a:r>
+              <a:rPr lang="de-DE" dirty="0"/>
+              <a:t> bereit</a:t>
+            </a:r>
+          </a:p>
+          <a:p>
+            <a:r>
+              <a:rPr lang="de-DE" dirty="0"/>
+              <a:t>- sogenannte Custom </a:t>
+            </a:r>
+            <a:r>
+              <a:rPr lang="de-DE" dirty="0" err="1"/>
+              <a:t>Resource</a:t>
+            </a:r>
+            <a:r>
+              <a:rPr lang="de-DE" dirty="0"/>
+              <a:t> (CR) </a:t>
+            </a:r>
+            <a:r>
+              <a:rPr lang="de-DE" dirty="0" err="1"/>
+              <a:t>definitions</a:t>
+            </a:r>
+            <a:endParaRPr lang="de-DE" dirty="0"/>
+          </a:p>
+          <a:p>
+            <a:r>
+              <a:rPr lang="de-DE" dirty="0"/>
+              <a:t>- auf diese CRs </a:t>
+            </a:r>
+            <a:r>
+              <a:rPr lang="de-DE" dirty="0" err="1"/>
+              <a:t>watched</a:t>
+            </a:r>
+            <a:r>
+              <a:rPr lang="de-DE" dirty="0"/>
+              <a:t> der Infra-Operator beim API-Server</a:t>
+            </a:r>
+          </a:p>
+          <a:p>
+            <a:endParaRPr lang="de-DE" dirty="0"/>
+          </a:p>
+          <a:p>
+            <a:r>
+              <a:rPr lang="de-DE" dirty="0"/>
+              <a:t>Kube-Controller bleibt? Nein. </a:t>
+            </a:r>
+            <a:r>
+              <a:rPr lang="de-DE" dirty="0" err="1"/>
+              <a:t>GitOps</a:t>
+            </a:r>
+            <a:r>
+              <a:rPr lang="de-DE" dirty="0"/>
+              <a:t>-Operator/Controller!</a:t>
+            </a:r>
+          </a:p>
+          <a:p>
+            <a:endParaRPr lang="de-DE" dirty="0"/>
+          </a:p>
+          <a:p>
+            <a:r>
+              <a:rPr lang="de-DE" dirty="0" err="1"/>
+              <a:t>GitOps</a:t>
+            </a:r>
+            <a:r>
+              <a:rPr lang="de-DE" dirty="0"/>
+              <a:t>-Operator</a:t>
+            </a:r>
+          </a:p>
+          <a:p>
+            <a:r>
+              <a:rPr lang="de-DE" dirty="0"/>
+              <a:t>- pullt aus dem Cloud-Infrastruktur-Repo (</a:t>
+            </a:r>
+            <a:r>
+              <a:rPr lang="de-DE" dirty="0" err="1"/>
+              <a:t>git</a:t>
+            </a:r>
+            <a:r>
+              <a:rPr lang="de-DE" dirty="0"/>
+              <a:t>)</a:t>
+            </a:r>
+          </a:p>
+          <a:p>
+            <a:r>
+              <a:rPr lang="de-DE" dirty="0"/>
+              <a:t>- dann werden die </a:t>
+            </a:r>
+            <a:r>
+              <a:rPr lang="de-DE" dirty="0" err="1"/>
+              <a:t>resourcen</a:t>
+            </a:r>
+            <a:r>
+              <a:rPr lang="de-DE" dirty="0"/>
+              <a:t> auf den API-Server </a:t>
+            </a:r>
+            <a:r>
+              <a:rPr lang="de-DE" dirty="0" err="1"/>
+              <a:t>applied</a:t>
+            </a:r>
+            <a:endParaRPr lang="de-DE" dirty="0"/>
+          </a:p>
+          <a:p>
+            <a:r>
+              <a:rPr lang="de-DE" dirty="0"/>
+              <a:t>- und von dort aus geht es dann zum Infra-Operator und dieser setzt die (ggf. neuen) CRs dann um</a:t>
+            </a:r>
+          </a:p>
+          <a:p>
+            <a:endParaRPr lang="de-DE" dirty="0"/>
+          </a:p>
+          <a:p>
+            <a:r>
+              <a:rPr lang="de-DE" dirty="0" err="1"/>
+              <a:t>Infra</a:t>
+            </a:r>
+            <a:r>
+              <a:rPr lang="de-DE" dirty="0"/>
+              <a:t> Operator</a:t>
+            </a:r>
+          </a:p>
+          <a:p>
+            <a:r>
+              <a:rPr lang="de-DE" dirty="0"/>
+              <a:t>- umsetzen in irgendeine Cloud Plattform (= </a:t>
+            </a:r>
+            <a:r>
+              <a:rPr lang="de-DE" dirty="0" err="1"/>
+              <a:t>Infra</a:t>
+            </a:r>
+            <a:r>
+              <a:rPr lang="de-DE" dirty="0"/>
+              <a:t> </a:t>
+            </a:r>
+            <a:r>
+              <a:rPr lang="de-DE" dirty="0" err="1"/>
+              <a:t>providers</a:t>
+            </a:r>
+            <a:r>
+              <a:rPr lang="de-DE" dirty="0"/>
+              <a:t> oder auch „bare </a:t>
+            </a:r>
+            <a:r>
+              <a:rPr lang="de-DE" dirty="0" err="1"/>
+              <a:t>metal</a:t>
+            </a:r>
+            <a:r>
+              <a:rPr lang="de-DE" dirty="0"/>
+              <a:t>“ also physischer Server </a:t>
+            </a:r>
+            <a:r>
+              <a:rPr lang="de-DE" dirty="0">
+                <a:sym typeface="Wingdings" panose="05000000000000000000" pitchFamily="2" charset="2"/>
+              </a:rPr>
+              <a:t></a:t>
+            </a:r>
+            <a:r>
+              <a:rPr lang="de-DE" dirty="0"/>
+              <a:t>)</a:t>
+            </a:r>
+          </a:p>
+          <a:p>
+            <a:endParaRPr lang="de-DE" dirty="0"/>
+          </a:p>
+          <a:p>
+            <a:r>
+              <a:rPr lang="de-DE" dirty="0"/>
+              <a:t>Am „Ende“ haben wir dann unsere Target Cluster</a:t>
+            </a:r>
+          </a:p>
+          <a:p>
+            <a:r>
+              <a:rPr lang="de-DE" dirty="0"/>
+              <a:t>Und auf diese kann der </a:t>
+            </a:r>
+            <a:r>
+              <a:rPr lang="de-DE" dirty="0" err="1"/>
+              <a:t>GitOps</a:t>
+            </a:r>
+            <a:r>
+              <a:rPr lang="de-DE" dirty="0"/>
+              <a:t>-Operator auch Anwendungen/Software deployen</a:t>
+            </a:r>
+          </a:p>
+          <a:p>
+            <a:endParaRPr lang="de-DE" dirty="0"/>
+          </a:p>
+          <a:p>
+            <a:endParaRPr lang="de-DE" dirty="0"/>
+          </a:p>
+          <a:p>
+            <a:endParaRPr lang="de-DE" dirty="0"/>
+          </a:p>
+          <a:p>
+            <a:r>
+              <a:rPr lang="de-DE" dirty="0" err="1"/>
+              <a:t>Infra</a:t>
+            </a:r>
+            <a:r>
+              <a:rPr lang="de-DE" dirty="0"/>
+              <a:t> </a:t>
+            </a:r>
+            <a:r>
+              <a:rPr lang="de-DE" dirty="0" err="1"/>
+              <a:t>operator</a:t>
+            </a:r>
+            <a:r>
+              <a:rPr lang="de-DE" dirty="0"/>
+              <a:t>…?</a:t>
+            </a:r>
+          </a:p>
+          <a:p>
+            <a:r>
+              <a:rPr lang="de-DE" dirty="0"/>
+              <a:t>https://github.com/openstack-k8s-operators/infra-operator</a:t>
+            </a:r>
+          </a:p>
+        </p:txBody>
+      </p:sp>
+      <p:sp>
+        <p:nvSpPr>
+          <p:cNvPr id="4" name="Foliennummernplatzhalter 3"/>
+          <p:cNvSpPr>
+            <a:spLocks noGrp="1"/>
+          </p:cNvSpPr>
+          <p:nvPr>
+            <p:ph type="sldNum" sz="quarter" idx="5"/>
+          </p:nvPr>
+        </p:nvSpPr>
+        <p:spPr/>
+        <p:txBody>
+          <a:bodyPr/>
+          <a:lstStyle/>
+          <a:p>
+            <a:fld id="{18182567-388C-4D33-8B7B-A651F195F118}" type="slidenum">
+              <a:rPr lang="de-DE" altLang="de-DE" smtClean="0"/>
+              <a:pPr/>
+              <a:t>24</a:t>
+            </a:fld>
+            <a:endParaRPr lang="de-DE" altLang="de-DE"/>
+          </a:p>
+        </p:txBody>
+      </p:sp>
+    </p:spTree>
+    <p:extLst>
+      <p:ext uri="{BB962C8B-B14F-4D97-AF65-F5344CB8AC3E}">
+        <p14:creationId xmlns:p14="http://schemas.microsoft.com/office/powerpoint/2010/main" val="1843041313"/>
+      </p:ext>
+    </p:extLst>
+  </p:cSld>
+  <p:clrMapOvr>
+    <a:masterClrMapping/>
+  </p:clrMapOvr>
+</p:notes>
+</file>
+
+<file path=ppt/notesSlides/notesSlide18.xml><?xml version="1.0" encoding="utf-8"?>
+<p:notes xmlns:a="http://schemas.openxmlformats.org/drawingml/2006/main" xmlns:r="http://schemas.openxmlformats.org/officeDocument/2006/relationships" xmlns:p="http://schemas.openxmlformats.org/presentationml/2006/main">
+  <p:cSld>
+    <p:spTree>
+      <p:nvGrpSpPr>
+        <p:cNvPr id="1" name=""/>
+        <p:cNvGrpSpPr/>
+        <p:nvPr/>
+      </p:nvGrpSpPr>
+      <p:grpSpPr>
+        <a:xfrm>
+          <a:off x="0" y="0"/>
+          <a:ext cx="0" cy="0"/>
+          <a:chOff x="0" y="0"/>
+          <a:chExt cx="0" cy="0"/>
+        </a:xfrm>
+      </p:grpSpPr>
+      <p:sp>
+        <p:nvSpPr>
+          <p:cNvPr id="2" name="Folienbildplatzhalter 1"/>
+          <p:cNvSpPr>
+            <a:spLocks noGrp="1" noRot="1" noChangeAspect="1"/>
+          </p:cNvSpPr>
+          <p:nvPr>
+            <p:ph type="sldImg"/>
+          </p:nvPr>
+        </p:nvSpPr>
+        <p:spPr/>
+      </p:sp>
+      <p:sp>
+        <p:nvSpPr>
+          <p:cNvPr id="3" name="Notizenplatzhalter 2"/>
+          <p:cNvSpPr>
+            <a:spLocks noGrp="1"/>
+          </p:cNvSpPr>
+          <p:nvPr>
+            <p:ph type="body" idx="1"/>
+          </p:nvPr>
+        </p:nvSpPr>
+        <p:spPr/>
+        <p:txBody>
+          <a:bodyPr/>
+          <a:lstStyle/>
+          <a:p>
+            <a:r>
+              <a:rPr lang="de-DE" dirty="0"/>
+              <a:t>Quelle: https://blog.kubesimplify.com/gitops-demystified</a:t>
+            </a:r>
+          </a:p>
+        </p:txBody>
+      </p:sp>
+      <p:sp>
+        <p:nvSpPr>
+          <p:cNvPr id="4" name="Foliennummernplatzhalter 3"/>
+          <p:cNvSpPr>
+            <a:spLocks noGrp="1"/>
+          </p:cNvSpPr>
+          <p:nvPr>
+            <p:ph type="sldNum" sz="quarter" idx="5"/>
+          </p:nvPr>
+        </p:nvSpPr>
+        <p:spPr/>
+        <p:txBody>
+          <a:bodyPr/>
+          <a:lstStyle/>
+          <a:p>
+            <a:fld id="{18182567-388C-4D33-8B7B-A651F195F118}" type="slidenum">
+              <a:rPr lang="de-DE" altLang="de-DE" smtClean="0"/>
+              <a:pPr/>
+              <a:t>27</a:t>
             </a:fld>
             <a:endParaRPr lang="de-DE" altLang="de-DE"/>
           </a:p>
@@ -9586,7 +10003,7 @@
           <p:cNvPr id="2" name="Titel 1">
             <a:extLst>
               <a:ext uri="{FF2B5EF4-FFF2-40B4-BE49-F238E27FC236}">
-                <a16:creationId xmlns:a16="http://schemas.microsoft.com/office/drawing/2014/main" id="{6852D978-9DF5-1E6A-F50B-0CA32EA8DAC7}"/>
+                <a16:creationId xmlns:a16="http://schemas.microsoft.com/office/drawing/2014/main" id="{2EA1C9C2-ED2C-62DC-7793-31665F24E533}"/>
               </a:ext>
             </a:extLst>
           </p:cNvPr>
@@ -9615,7 +10032,7 @@
           <p:cNvPr id="3" name="Inhaltsplatzhalter 2">
             <a:extLst>
               <a:ext uri="{FF2B5EF4-FFF2-40B4-BE49-F238E27FC236}">
-                <a16:creationId xmlns:a16="http://schemas.microsoft.com/office/drawing/2014/main" id="{81753C8B-5EF0-E49E-1FFB-0330FD2A3542}"/>
+                <a16:creationId xmlns:a16="http://schemas.microsoft.com/office/drawing/2014/main" id="{6CB23FE7-6FB4-E1AA-AE31-C3989D90FF6B}"/>
               </a:ext>
             </a:extLst>
           </p:cNvPr>
@@ -9635,26 +10052,3967 @@
               <a:buNone/>
             </a:pPr>
             <a:r>
+              <a:rPr lang="de-DE" b="1" dirty="0"/>
+              <a:t>Einsatzbereiche</a:t>
+            </a:r>
+          </a:p>
+          <a:p>
+            <a:pPr>
+              <a:buFont typeface="Arial" panose="020B0604020202020204" pitchFamily="34" charset="0"/>
+              <a:buChar char="•"/>
+            </a:pPr>
+            <a:r>
               <a:rPr lang="de-DE" dirty="0"/>
-              <a:t>Einsatzbereiche</a:t>
+              <a:t>Gesamte Cloud-Infrastruktur mit </a:t>
+            </a:r>
+            <a:r>
+              <a:rPr lang="de-DE" dirty="0" err="1"/>
+              <a:t>GitOps</a:t>
+            </a:r>
+            <a:r>
+              <a:rPr lang="de-DE" dirty="0"/>
+              <a:t> betreiben!</a:t>
+            </a:r>
+          </a:p>
+          <a:p>
+            <a:pPr>
+              <a:buFont typeface="Arial" panose="020B0604020202020204" pitchFamily="34" charset="0"/>
+              <a:buChar char="•"/>
+            </a:pPr>
+            <a:r>
+              <a:rPr lang="de-DE" dirty="0" err="1"/>
+              <a:t>Kubernetes</a:t>
+            </a:r>
+            <a:r>
+              <a:rPr lang="de-DE" dirty="0"/>
+              <a:t> Cluster mit… sich selbst betreiben?</a:t>
+            </a:r>
+          </a:p>
+          <a:p>
+            <a:pPr marL="0" indent="0">
+              <a:buNone/>
+            </a:pPr>
+            <a:endParaRPr lang="de-DE" dirty="0"/>
+          </a:p>
+          <a:p>
+            <a:pPr marL="0" indent="0">
+              <a:buNone/>
+            </a:pPr>
+            <a:endParaRPr lang="de-DE" dirty="0"/>
+          </a:p>
+          <a:p>
+            <a:pPr marL="0" indent="0">
+              <a:buNone/>
+            </a:pPr>
+            <a:endParaRPr lang="de-DE" dirty="0"/>
+          </a:p>
+          <a:p>
+            <a:pPr marL="0" indent="0">
+              <a:buNone/>
+            </a:pPr>
+            <a:endParaRPr lang="de-DE" dirty="0"/>
+          </a:p>
+          <a:p>
+            <a:pPr marL="0" indent="0">
+              <a:buNone/>
+            </a:pPr>
+            <a:endParaRPr lang="de-DE" dirty="0"/>
+          </a:p>
+          <a:p>
+            <a:pPr marL="0" indent="0">
+              <a:buNone/>
+            </a:pPr>
+            <a:endParaRPr lang="de-DE" dirty="0"/>
+          </a:p>
+          <a:p>
+            <a:pPr marL="0" indent="0">
+              <a:buNone/>
+            </a:pPr>
+            <a:endParaRPr lang="de-DE" dirty="0"/>
+          </a:p>
+          <a:p>
+            <a:pPr marL="0" indent="0">
+              <a:buNone/>
+            </a:pPr>
+            <a:endParaRPr lang="de-DE" dirty="0"/>
+          </a:p>
+          <a:p>
+            <a:pPr marL="0" indent="0">
+              <a:buNone/>
+            </a:pPr>
+            <a:r>
+              <a:rPr lang="de-DE" dirty="0"/>
+              <a:t>Im </a:t>
+            </a:r>
+            <a:r>
+              <a:rPr lang="de-DE" u="sng" dirty="0"/>
+              <a:t>Management Cluster</a:t>
+            </a:r>
+            <a:r>
+              <a:rPr lang="de-DE" dirty="0"/>
+              <a:t> </a:t>
+            </a:r>
+            <a:r>
+              <a:rPr lang="de-DE" dirty="0">
+                <a:sym typeface="Wingdings" panose="05000000000000000000" pitchFamily="2" charset="2"/>
+              </a:rPr>
+              <a:t> </a:t>
+            </a:r>
+            <a:r>
+              <a:rPr lang="de-DE" dirty="0" err="1"/>
+              <a:t>GitOps</a:t>
+            </a:r>
+            <a:r>
+              <a:rPr lang="de-DE" dirty="0"/>
+              <a:t> umsetzen</a:t>
             </a:r>
           </a:p>
         </p:txBody>
       </p:sp>
+      <p:sp>
+        <p:nvSpPr>
+          <p:cNvPr id="4" name="Rechteck: abgerundete Ecken 3">
+            <a:extLst>
+              <a:ext uri="{FF2B5EF4-FFF2-40B4-BE49-F238E27FC236}">
+                <a16:creationId xmlns:a16="http://schemas.microsoft.com/office/drawing/2014/main" id="{97150DA4-3242-2D50-EBFA-D5B28D12A026}"/>
+              </a:ext>
+            </a:extLst>
+          </p:cNvPr>
+          <p:cNvSpPr/>
+          <p:nvPr/>
+        </p:nvSpPr>
+        <p:spPr bwMode="auto">
+          <a:xfrm>
+            <a:off x="2238271" y="2374646"/>
+            <a:ext cx="2880320" cy="1260840"/>
+          </a:xfrm>
+          <a:prstGeom prst="roundRect">
+            <a:avLst/>
+          </a:prstGeom>
+          <a:solidFill>
+            <a:srgbClr val="DDEEE8"/>
+          </a:solidFill>
+          <a:ln w="12700" cap="flat" cmpd="sng" algn="ctr">
+            <a:solidFill>
+              <a:schemeClr val="bg1"/>
+            </a:solidFill>
+            <a:prstDash val="solid"/>
+            <a:round/>
+            <a:headEnd type="none" w="sm" len="sm"/>
+            <a:tailEnd type="none" w="sm" len="sm"/>
+          </a:ln>
+          <a:effectLst/>
+        </p:spPr>
+        <p:txBody>
+          <a:bodyPr vert="horz" wrap="square" lIns="91440" tIns="45720" rIns="91440" bIns="45720" numCol="1" rtlCol="0" anchor="t" anchorCtr="0" compatLnSpc="1">
+            <a:prstTxWarp prst="textNoShape">
+              <a:avLst/>
+            </a:prstTxWarp>
+          </a:bodyPr>
+          <a:lstStyle/>
+          <a:p>
+            <a:pPr marL="0" marR="0" indent="0" algn="l" defTabSz="914400" rtl="0" eaLnBrk="0" fontAlgn="base" latinLnBrk="0" hangingPunct="0">
+              <a:lnSpc>
+                <a:spcPct val="100000"/>
+              </a:lnSpc>
+              <a:spcBef>
+                <a:spcPct val="0"/>
+              </a:spcBef>
+              <a:spcAft>
+                <a:spcPct val="0"/>
+              </a:spcAft>
+              <a:buClrTx/>
+              <a:buSzTx/>
+              <a:buFontTx/>
+              <a:buNone/>
+              <a:tabLst/>
+            </a:pPr>
+            <a:endParaRPr kumimoji="0" lang="de-DE" sz="2400" b="0" i="0" u="none" strike="noStrike" cap="none" normalizeH="0" baseline="0">
+              <a:ln>
+                <a:noFill/>
+              </a:ln>
+              <a:solidFill>
+                <a:schemeClr val="tx1"/>
+              </a:solidFill>
+              <a:effectLst/>
+              <a:latin typeface="Times New Roman" pitchFamily="18" charset="0"/>
+            </a:endParaRPr>
+          </a:p>
+        </p:txBody>
+      </p:sp>
+      <p:sp>
+        <p:nvSpPr>
+          <p:cNvPr id="5" name="Rechteck: abgerundete Ecken 4">
+            <a:extLst>
+              <a:ext uri="{FF2B5EF4-FFF2-40B4-BE49-F238E27FC236}">
+                <a16:creationId xmlns:a16="http://schemas.microsoft.com/office/drawing/2014/main" id="{D9F60EB9-9778-B7F7-E809-503EE97F237F}"/>
+              </a:ext>
+            </a:extLst>
+          </p:cNvPr>
+          <p:cNvSpPr/>
+          <p:nvPr/>
+        </p:nvSpPr>
+        <p:spPr bwMode="auto">
+          <a:xfrm>
+            <a:off x="539552" y="2404720"/>
+            <a:ext cx="877480" cy="1200694"/>
+          </a:xfrm>
+          <a:prstGeom prst="roundRect">
+            <a:avLst/>
+          </a:prstGeom>
+          <a:solidFill>
+            <a:srgbClr val="DDEEE8"/>
+          </a:solidFill>
+          <a:ln w="12700" cap="flat" cmpd="sng" algn="ctr">
+            <a:solidFill>
+              <a:schemeClr val="bg1"/>
+            </a:solidFill>
+            <a:prstDash val="solid"/>
+            <a:round/>
+            <a:headEnd type="none" w="sm" len="sm"/>
+            <a:tailEnd type="none" w="sm" len="sm"/>
+          </a:ln>
+          <a:effectLst/>
+        </p:spPr>
+        <p:txBody>
+          <a:bodyPr vert="horz" wrap="square" lIns="91440" tIns="45720" rIns="91440" bIns="45720" numCol="1" rtlCol="0" anchor="t" anchorCtr="0" compatLnSpc="1">
+            <a:prstTxWarp prst="textNoShape">
+              <a:avLst/>
+            </a:prstTxWarp>
+          </a:bodyPr>
+          <a:lstStyle/>
+          <a:p>
+            <a:pPr marL="0" marR="0" indent="0" algn="l" defTabSz="914400" rtl="0" eaLnBrk="0" fontAlgn="base" latinLnBrk="0" hangingPunct="0">
+              <a:lnSpc>
+                <a:spcPct val="100000"/>
+              </a:lnSpc>
+              <a:spcBef>
+                <a:spcPct val="0"/>
+              </a:spcBef>
+              <a:spcAft>
+                <a:spcPct val="0"/>
+              </a:spcAft>
+              <a:buClrTx/>
+              <a:buSzTx/>
+              <a:buFontTx/>
+              <a:buNone/>
+              <a:tabLst/>
+            </a:pPr>
+            <a:endParaRPr kumimoji="0" lang="de-DE" sz="2400" b="0" i="0" u="none" strike="noStrike" cap="none" normalizeH="0" baseline="0" dirty="0">
+              <a:ln>
+                <a:noFill/>
+              </a:ln>
+              <a:solidFill>
+                <a:schemeClr val="tx1"/>
+              </a:solidFill>
+              <a:effectLst/>
+              <a:latin typeface="Times New Roman" pitchFamily="18" charset="0"/>
+            </a:endParaRPr>
+          </a:p>
+          <a:p>
+            <a:pPr marL="0" marR="0" indent="0" algn="l" defTabSz="914400" rtl="0" eaLnBrk="0" fontAlgn="base" latinLnBrk="0" hangingPunct="0">
+              <a:lnSpc>
+                <a:spcPct val="100000"/>
+              </a:lnSpc>
+              <a:spcBef>
+                <a:spcPct val="0"/>
+              </a:spcBef>
+              <a:spcAft>
+                <a:spcPct val="0"/>
+              </a:spcAft>
+              <a:buClrTx/>
+              <a:buSzTx/>
+              <a:buFontTx/>
+              <a:buNone/>
+              <a:tabLst/>
+            </a:pPr>
+            <a:endParaRPr lang="de-DE" dirty="0"/>
+          </a:p>
+          <a:p>
+            <a:pPr marL="0" marR="0" indent="0" algn="ctr" defTabSz="914400" rtl="0" eaLnBrk="0" fontAlgn="base" latinLnBrk="0" hangingPunct="0">
+              <a:lnSpc>
+                <a:spcPct val="100000"/>
+              </a:lnSpc>
+              <a:spcBef>
+                <a:spcPct val="0"/>
+              </a:spcBef>
+              <a:spcAft>
+                <a:spcPct val="0"/>
+              </a:spcAft>
+              <a:buClrTx/>
+              <a:buSzTx/>
+              <a:buFontTx/>
+              <a:buNone/>
+              <a:tabLst/>
+            </a:pPr>
+            <a:r>
+              <a:rPr lang="de-DE" sz="900" dirty="0">
+                <a:latin typeface="+mj-lt"/>
+              </a:rPr>
+              <a:t>Cloud </a:t>
+            </a:r>
+            <a:r>
+              <a:rPr lang="de-DE" sz="900" dirty="0" err="1">
+                <a:latin typeface="+mj-lt"/>
+              </a:rPr>
+              <a:t>Infra</a:t>
+            </a:r>
+            <a:r>
+              <a:rPr lang="de-DE" sz="900" dirty="0">
+                <a:latin typeface="+mj-lt"/>
+              </a:rPr>
+              <a:t> Repo</a:t>
+            </a:r>
+          </a:p>
+        </p:txBody>
+      </p:sp>
+      <p:pic>
+        <p:nvPicPr>
+          <p:cNvPr id="8" name="Grafik 7">
+            <a:extLst>
+              <a:ext uri="{FF2B5EF4-FFF2-40B4-BE49-F238E27FC236}">
+                <a16:creationId xmlns:a16="http://schemas.microsoft.com/office/drawing/2014/main" id="{F5AAC6B2-D9AC-4D34-D6F9-625FC7BF2EB3}"/>
+              </a:ext>
+            </a:extLst>
+          </p:cNvPr>
+          <p:cNvPicPr>
+            <a:picLocks noChangeAspect="1"/>
+          </p:cNvPicPr>
+          <p:nvPr/>
+        </p:nvPicPr>
+        <p:blipFill>
+          <a:blip r:embed="rId3">
+            <a:extLst>
+              <a:ext uri="{28A0092B-C50C-407E-A947-70E740481C1C}">
+                <a14:useLocalDpi xmlns:a14="http://schemas.microsoft.com/office/drawing/2010/main" val="0"/>
+              </a:ext>
+            </a:extLst>
+          </a:blip>
+          <a:stretch>
+            <a:fillRect/>
+          </a:stretch>
+        </p:blipFill>
+        <p:spPr>
+          <a:xfrm>
+            <a:off x="690332" y="2517319"/>
+            <a:ext cx="585415" cy="585415"/>
+          </a:xfrm>
+          <a:prstGeom prst="rect">
+            <a:avLst/>
+          </a:prstGeom>
+        </p:spPr>
+      </p:pic>
+      <p:pic>
+        <p:nvPicPr>
+          <p:cNvPr id="9" name="Grafik 8">
+            <a:extLst>
+              <a:ext uri="{FF2B5EF4-FFF2-40B4-BE49-F238E27FC236}">
+                <a16:creationId xmlns:a16="http://schemas.microsoft.com/office/drawing/2014/main" id="{8C4DB27A-B2E8-BDD5-BD5F-791EADB3DFF9}"/>
+              </a:ext>
+            </a:extLst>
+          </p:cNvPr>
+          <p:cNvPicPr>
+            <a:picLocks noChangeAspect="1"/>
+          </p:cNvPicPr>
+          <p:nvPr/>
+        </p:nvPicPr>
+        <p:blipFill>
+          <a:blip r:embed="rId4">
+            <a:extLst>
+              <a:ext uri="{28A0092B-C50C-407E-A947-70E740481C1C}">
+                <a14:useLocalDpi xmlns:a14="http://schemas.microsoft.com/office/drawing/2010/main" val="0"/>
+              </a:ext>
+            </a:extLst>
+          </a:blip>
+          <a:stretch>
+            <a:fillRect/>
+          </a:stretch>
+        </p:blipFill>
+        <p:spPr>
+          <a:xfrm>
+            <a:off x="3284414" y="2424186"/>
+            <a:ext cx="788034" cy="788034"/>
+          </a:xfrm>
+          <a:prstGeom prst="rect">
+            <a:avLst/>
+          </a:prstGeom>
+        </p:spPr>
+      </p:pic>
+      <p:sp>
+        <p:nvSpPr>
+          <p:cNvPr id="13" name="Textfeld 12">
+            <a:extLst>
+              <a:ext uri="{FF2B5EF4-FFF2-40B4-BE49-F238E27FC236}">
+                <a16:creationId xmlns:a16="http://schemas.microsoft.com/office/drawing/2014/main" id="{B545B88F-7186-7465-C028-FD59B6E086E4}"/>
+              </a:ext>
+            </a:extLst>
+          </p:cNvPr>
+          <p:cNvSpPr txBox="1"/>
+          <p:nvPr/>
+        </p:nvSpPr>
+        <p:spPr bwMode="auto">
+          <a:xfrm>
+            <a:off x="2991886" y="3146344"/>
+            <a:ext cx="1373090" cy="230832"/>
+          </a:xfrm>
+          <a:prstGeom prst="rect">
+            <a:avLst/>
+          </a:prstGeom>
+          <a:noFill/>
+          <a:ln w="9525">
+            <a:noFill/>
+            <a:miter lim="800000"/>
+            <a:headEnd/>
+            <a:tailEnd/>
+          </a:ln>
+        </p:spPr>
+        <p:txBody>
+          <a:bodyPr wrap="square" rtlCol="0" anchor="ctr">
+            <a:spAutoFit/>
+          </a:bodyPr>
+          <a:lstStyle/>
+          <a:p>
+            <a:pPr algn="ctr" eaLnBrk="1" hangingPunct="1"/>
+            <a:r>
+              <a:rPr lang="de-DE" sz="900" dirty="0">
+                <a:latin typeface="Arial" charset="0"/>
+              </a:rPr>
+              <a:t>Management Cluster</a:t>
+            </a:r>
+          </a:p>
+        </p:txBody>
+      </p:sp>
+      <p:cxnSp>
+        <p:nvCxnSpPr>
+          <p:cNvPr id="16" name="Verbinder: gewinkelt 15">
+            <a:extLst>
+              <a:ext uri="{FF2B5EF4-FFF2-40B4-BE49-F238E27FC236}">
+                <a16:creationId xmlns:a16="http://schemas.microsoft.com/office/drawing/2014/main" id="{CF416C9C-1C29-C746-CC0C-E80AE4E375BE}"/>
+              </a:ext>
+            </a:extLst>
+          </p:cNvPr>
+          <p:cNvCxnSpPr>
+            <a:cxnSpLocks/>
+            <a:stCxn id="4" idx="1"/>
+            <a:endCxn id="5" idx="3"/>
+          </p:cNvCxnSpPr>
+          <p:nvPr/>
+        </p:nvCxnSpPr>
+        <p:spPr bwMode="auto">
+          <a:xfrm rot="10800000" flipV="1">
+            <a:off x="1417033" y="3005065"/>
+            <a:ext cx="821239" cy="1"/>
+          </a:xfrm>
+          <a:prstGeom prst="bentConnector3">
+            <a:avLst/>
+          </a:prstGeom>
+          <a:solidFill>
+            <a:schemeClr val="accent1"/>
+          </a:solidFill>
+          <a:ln w="12700" cap="flat" cmpd="sng" algn="ctr">
+            <a:solidFill>
+              <a:schemeClr val="tx1"/>
+            </a:solidFill>
+            <a:prstDash val="solid"/>
+            <a:round/>
+            <a:headEnd type="none" w="sm" len="sm"/>
+            <a:tailEnd type="triangle"/>
+          </a:ln>
+          <a:effectLst/>
+        </p:spPr>
+      </p:cxnSp>
+      <p:sp>
+        <p:nvSpPr>
+          <p:cNvPr id="30" name="Rechteck: abgerundete Ecken 29">
+            <a:extLst>
+              <a:ext uri="{FF2B5EF4-FFF2-40B4-BE49-F238E27FC236}">
+                <a16:creationId xmlns:a16="http://schemas.microsoft.com/office/drawing/2014/main" id="{1DE9A58C-41E1-C692-1653-7F1FAE400113}"/>
+              </a:ext>
+            </a:extLst>
+          </p:cNvPr>
+          <p:cNvSpPr/>
+          <p:nvPr/>
+        </p:nvSpPr>
+        <p:spPr bwMode="auto">
+          <a:xfrm>
+            <a:off x="7574573" y="4153581"/>
+            <a:ext cx="877480" cy="1200694"/>
+          </a:xfrm>
+          <a:prstGeom prst="roundRect">
+            <a:avLst/>
+          </a:prstGeom>
+          <a:solidFill>
+            <a:srgbClr val="DDEEE8"/>
+          </a:solidFill>
+          <a:ln w="12700" cap="flat" cmpd="sng" algn="ctr">
+            <a:solidFill>
+              <a:schemeClr val="bg1"/>
+            </a:solidFill>
+            <a:prstDash val="solid"/>
+            <a:round/>
+            <a:headEnd type="none" w="sm" len="sm"/>
+            <a:tailEnd type="none" w="sm" len="sm"/>
+          </a:ln>
+          <a:effectLst/>
+        </p:spPr>
+        <p:txBody>
+          <a:bodyPr vert="horz" wrap="square" lIns="91440" tIns="45720" rIns="91440" bIns="45720" numCol="1" rtlCol="0" anchor="t" anchorCtr="0" compatLnSpc="1">
+            <a:prstTxWarp prst="textNoShape">
+              <a:avLst/>
+            </a:prstTxWarp>
+          </a:bodyPr>
+          <a:lstStyle/>
+          <a:p>
+            <a:pPr marL="0" marR="0" indent="0" algn="l" defTabSz="914400" rtl="0" eaLnBrk="0" fontAlgn="base" latinLnBrk="0" hangingPunct="0">
+              <a:lnSpc>
+                <a:spcPct val="100000"/>
+              </a:lnSpc>
+              <a:spcBef>
+                <a:spcPct val="0"/>
+              </a:spcBef>
+              <a:spcAft>
+                <a:spcPct val="0"/>
+              </a:spcAft>
+              <a:buClrTx/>
+              <a:buSzTx/>
+              <a:buFontTx/>
+              <a:buNone/>
+              <a:tabLst/>
+            </a:pPr>
+            <a:endParaRPr kumimoji="0" lang="de-DE" sz="2400" b="0" i="0" u="none" strike="noStrike" cap="none" normalizeH="0" baseline="0" dirty="0">
+              <a:ln>
+                <a:noFill/>
+              </a:ln>
+              <a:solidFill>
+                <a:schemeClr val="tx1"/>
+              </a:solidFill>
+              <a:effectLst/>
+              <a:latin typeface="Times New Roman" pitchFamily="18" charset="0"/>
+            </a:endParaRPr>
+          </a:p>
+          <a:p>
+            <a:pPr marL="0" marR="0" indent="0" algn="l" defTabSz="914400" rtl="0" eaLnBrk="0" fontAlgn="base" latinLnBrk="0" hangingPunct="0">
+              <a:lnSpc>
+                <a:spcPct val="100000"/>
+              </a:lnSpc>
+              <a:spcBef>
+                <a:spcPct val="0"/>
+              </a:spcBef>
+              <a:spcAft>
+                <a:spcPct val="0"/>
+              </a:spcAft>
+              <a:buClrTx/>
+              <a:buSzTx/>
+              <a:buFontTx/>
+              <a:buNone/>
+              <a:tabLst/>
+            </a:pPr>
+            <a:endParaRPr lang="de-DE" dirty="0"/>
+          </a:p>
+          <a:p>
+            <a:pPr marL="0" marR="0" indent="0" algn="ctr" defTabSz="914400" rtl="0" eaLnBrk="0" fontAlgn="base" latinLnBrk="0" hangingPunct="0">
+              <a:lnSpc>
+                <a:spcPct val="100000"/>
+              </a:lnSpc>
+              <a:spcBef>
+                <a:spcPct val="0"/>
+              </a:spcBef>
+              <a:spcAft>
+                <a:spcPct val="0"/>
+              </a:spcAft>
+              <a:buClrTx/>
+              <a:buSzTx/>
+              <a:buFontTx/>
+              <a:buNone/>
+              <a:tabLst/>
+            </a:pPr>
+            <a:r>
+              <a:rPr lang="de-DE" sz="900" dirty="0">
+                <a:latin typeface="+mj-lt"/>
+              </a:rPr>
+              <a:t>Target Cluster</a:t>
+            </a:r>
+          </a:p>
+        </p:txBody>
+      </p:sp>
+      <p:sp>
+        <p:nvSpPr>
+          <p:cNvPr id="32" name="Rechteck: abgerundete Ecken 31">
+            <a:extLst>
+              <a:ext uri="{FF2B5EF4-FFF2-40B4-BE49-F238E27FC236}">
+                <a16:creationId xmlns:a16="http://schemas.microsoft.com/office/drawing/2014/main" id="{0E6216CB-1582-93EC-ACE5-898A63AA7898}"/>
+              </a:ext>
+            </a:extLst>
+          </p:cNvPr>
+          <p:cNvSpPr/>
+          <p:nvPr/>
+        </p:nvSpPr>
+        <p:spPr bwMode="auto">
+          <a:xfrm>
+            <a:off x="5098625" y="4149080"/>
+            <a:ext cx="877480" cy="1200694"/>
+          </a:xfrm>
+          <a:prstGeom prst="roundRect">
+            <a:avLst/>
+          </a:prstGeom>
+          <a:solidFill>
+            <a:srgbClr val="DDEEE8"/>
+          </a:solidFill>
+          <a:ln w="12700" cap="flat" cmpd="sng" algn="ctr">
+            <a:solidFill>
+              <a:schemeClr val="bg1"/>
+            </a:solidFill>
+            <a:prstDash val="solid"/>
+            <a:round/>
+            <a:headEnd type="none" w="sm" len="sm"/>
+            <a:tailEnd type="none" w="sm" len="sm"/>
+          </a:ln>
+          <a:effectLst/>
+        </p:spPr>
+        <p:txBody>
+          <a:bodyPr vert="horz" wrap="square" lIns="91440" tIns="45720" rIns="91440" bIns="45720" numCol="1" rtlCol="0" anchor="t" anchorCtr="0" compatLnSpc="1">
+            <a:prstTxWarp prst="textNoShape">
+              <a:avLst/>
+            </a:prstTxWarp>
+          </a:bodyPr>
+          <a:lstStyle/>
+          <a:p>
+            <a:pPr marL="0" marR="0" indent="0" algn="l" defTabSz="914400" rtl="0" eaLnBrk="0" fontAlgn="base" latinLnBrk="0" hangingPunct="0">
+              <a:lnSpc>
+                <a:spcPct val="100000"/>
+              </a:lnSpc>
+              <a:spcBef>
+                <a:spcPct val="0"/>
+              </a:spcBef>
+              <a:spcAft>
+                <a:spcPct val="0"/>
+              </a:spcAft>
+              <a:buClrTx/>
+              <a:buSzTx/>
+              <a:buFontTx/>
+              <a:buNone/>
+              <a:tabLst/>
+            </a:pPr>
+            <a:endParaRPr kumimoji="0" lang="de-DE" sz="2400" b="0" i="0" u="none" strike="noStrike" cap="none" normalizeH="0" baseline="0" dirty="0">
+              <a:ln>
+                <a:noFill/>
+              </a:ln>
+              <a:solidFill>
+                <a:schemeClr val="tx1"/>
+              </a:solidFill>
+              <a:effectLst/>
+              <a:latin typeface="Times New Roman" pitchFamily="18" charset="0"/>
+            </a:endParaRPr>
+          </a:p>
+          <a:p>
+            <a:pPr marL="0" marR="0" indent="0" algn="l" defTabSz="914400" rtl="0" eaLnBrk="0" fontAlgn="base" latinLnBrk="0" hangingPunct="0">
+              <a:lnSpc>
+                <a:spcPct val="100000"/>
+              </a:lnSpc>
+              <a:spcBef>
+                <a:spcPct val="0"/>
+              </a:spcBef>
+              <a:spcAft>
+                <a:spcPct val="0"/>
+              </a:spcAft>
+              <a:buClrTx/>
+              <a:buSzTx/>
+              <a:buFontTx/>
+              <a:buNone/>
+              <a:tabLst/>
+            </a:pPr>
+            <a:endParaRPr lang="de-DE" dirty="0"/>
+          </a:p>
+          <a:p>
+            <a:pPr marL="0" marR="0" indent="0" algn="ctr" defTabSz="914400" rtl="0" eaLnBrk="0" fontAlgn="base" latinLnBrk="0" hangingPunct="0">
+              <a:lnSpc>
+                <a:spcPct val="100000"/>
+              </a:lnSpc>
+              <a:spcBef>
+                <a:spcPct val="0"/>
+              </a:spcBef>
+              <a:spcAft>
+                <a:spcPct val="0"/>
+              </a:spcAft>
+              <a:buClrTx/>
+              <a:buSzTx/>
+              <a:buFontTx/>
+              <a:buNone/>
+              <a:tabLst/>
+            </a:pPr>
+            <a:r>
+              <a:rPr lang="de-DE" sz="900" dirty="0">
+                <a:latin typeface="+mj-lt"/>
+              </a:rPr>
+              <a:t>Target Cluster</a:t>
+            </a:r>
+          </a:p>
+        </p:txBody>
+      </p:sp>
+      <p:sp>
+        <p:nvSpPr>
+          <p:cNvPr id="34" name="Rechteck: abgerundete Ecken 33">
+            <a:extLst>
+              <a:ext uri="{FF2B5EF4-FFF2-40B4-BE49-F238E27FC236}">
+                <a16:creationId xmlns:a16="http://schemas.microsoft.com/office/drawing/2014/main" id="{3529D06A-EE5C-C75A-CC1D-91A8A6FBEBA3}"/>
+              </a:ext>
+            </a:extLst>
+          </p:cNvPr>
+          <p:cNvSpPr/>
+          <p:nvPr/>
+        </p:nvSpPr>
+        <p:spPr bwMode="auto">
+          <a:xfrm>
+            <a:off x="6339455" y="4149080"/>
+            <a:ext cx="877480" cy="1200694"/>
+          </a:xfrm>
+          <a:prstGeom prst="roundRect">
+            <a:avLst/>
+          </a:prstGeom>
+          <a:solidFill>
+            <a:srgbClr val="DDEEE8"/>
+          </a:solidFill>
+          <a:ln w="12700" cap="flat" cmpd="sng" algn="ctr">
+            <a:solidFill>
+              <a:schemeClr val="bg1"/>
+            </a:solidFill>
+            <a:prstDash val="solid"/>
+            <a:round/>
+            <a:headEnd type="none" w="sm" len="sm"/>
+            <a:tailEnd type="none" w="sm" len="sm"/>
+          </a:ln>
+          <a:effectLst/>
+        </p:spPr>
+        <p:txBody>
+          <a:bodyPr vert="horz" wrap="square" lIns="91440" tIns="45720" rIns="91440" bIns="45720" numCol="1" rtlCol="0" anchor="t" anchorCtr="0" compatLnSpc="1">
+            <a:prstTxWarp prst="textNoShape">
+              <a:avLst/>
+            </a:prstTxWarp>
+          </a:bodyPr>
+          <a:lstStyle/>
+          <a:p>
+            <a:pPr marL="0" marR="0" indent="0" algn="l" defTabSz="914400" rtl="0" eaLnBrk="0" fontAlgn="base" latinLnBrk="0" hangingPunct="0">
+              <a:lnSpc>
+                <a:spcPct val="100000"/>
+              </a:lnSpc>
+              <a:spcBef>
+                <a:spcPct val="0"/>
+              </a:spcBef>
+              <a:spcAft>
+                <a:spcPct val="0"/>
+              </a:spcAft>
+              <a:buClrTx/>
+              <a:buSzTx/>
+              <a:buFontTx/>
+              <a:buNone/>
+              <a:tabLst/>
+            </a:pPr>
+            <a:endParaRPr kumimoji="0" lang="de-DE" sz="2400" b="0" i="0" u="none" strike="noStrike" cap="none" normalizeH="0" baseline="0" dirty="0">
+              <a:ln>
+                <a:noFill/>
+              </a:ln>
+              <a:solidFill>
+                <a:schemeClr val="tx1"/>
+              </a:solidFill>
+              <a:effectLst/>
+              <a:latin typeface="Times New Roman" pitchFamily="18" charset="0"/>
+            </a:endParaRPr>
+          </a:p>
+          <a:p>
+            <a:pPr marL="0" marR="0" indent="0" algn="l" defTabSz="914400" rtl="0" eaLnBrk="0" fontAlgn="base" latinLnBrk="0" hangingPunct="0">
+              <a:lnSpc>
+                <a:spcPct val="100000"/>
+              </a:lnSpc>
+              <a:spcBef>
+                <a:spcPct val="0"/>
+              </a:spcBef>
+              <a:spcAft>
+                <a:spcPct val="0"/>
+              </a:spcAft>
+              <a:buClrTx/>
+              <a:buSzTx/>
+              <a:buFontTx/>
+              <a:buNone/>
+              <a:tabLst/>
+            </a:pPr>
+            <a:endParaRPr lang="de-DE" dirty="0"/>
+          </a:p>
+          <a:p>
+            <a:pPr marL="0" marR="0" indent="0" algn="ctr" defTabSz="914400" rtl="0" eaLnBrk="0" fontAlgn="base" latinLnBrk="0" hangingPunct="0">
+              <a:lnSpc>
+                <a:spcPct val="100000"/>
+              </a:lnSpc>
+              <a:spcBef>
+                <a:spcPct val="0"/>
+              </a:spcBef>
+              <a:spcAft>
+                <a:spcPct val="0"/>
+              </a:spcAft>
+              <a:buClrTx/>
+              <a:buSzTx/>
+              <a:buFontTx/>
+              <a:buNone/>
+              <a:tabLst/>
+            </a:pPr>
+            <a:r>
+              <a:rPr lang="de-DE" sz="900" dirty="0">
+                <a:latin typeface="+mj-lt"/>
+              </a:rPr>
+              <a:t>Target Cluster</a:t>
+            </a:r>
+          </a:p>
+        </p:txBody>
+      </p:sp>
+      <p:pic>
+        <p:nvPicPr>
+          <p:cNvPr id="36" name="Grafik 35">
+            <a:extLst>
+              <a:ext uri="{FF2B5EF4-FFF2-40B4-BE49-F238E27FC236}">
+                <a16:creationId xmlns:a16="http://schemas.microsoft.com/office/drawing/2014/main" id="{0BFD3B55-FADB-AFCB-F795-545AF7B53009}"/>
+              </a:ext>
+            </a:extLst>
+          </p:cNvPr>
+          <p:cNvPicPr>
+            <a:picLocks noChangeAspect="1"/>
+          </p:cNvPicPr>
+          <p:nvPr/>
+        </p:nvPicPr>
+        <p:blipFill>
+          <a:blip r:embed="rId4">
+            <a:extLst>
+              <a:ext uri="{28A0092B-C50C-407E-A947-70E740481C1C}">
+                <a14:useLocalDpi xmlns:a14="http://schemas.microsoft.com/office/drawing/2010/main" val="0"/>
+              </a:ext>
+            </a:extLst>
+          </a:blip>
+          <a:stretch>
+            <a:fillRect/>
+          </a:stretch>
+        </p:blipFill>
+        <p:spPr>
+          <a:xfrm>
+            <a:off x="5146204" y="4149080"/>
+            <a:ext cx="788034" cy="788034"/>
+          </a:xfrm>
+          <a:prstGeom prst="rect">
+            <a:avLst/>
+          </a:prstGeom>
+        </p:spPr>
+      </p:pic>
+      <p:pic>
+        <p:nvPicPr>
+          <p:cNvPr id="37" name="Grafik 36">
+            <a:extLst>
+              <a:ext uri="{FF2B5EF4-FFF2-40B4-BE49-F238E27FC236}">
+                <a16:creationId xmlns:a16="http://schemas.microsoft.com/office/drawing/2014/main" id="{C5662002-1B71-2554-AF10-643A38F858F6}"/>
+              </a:ext>
+            </a:extLst>
+          </p:cNvPr>
+          <p:cNvPicPr>
+            <a:picLocks noChangeAspect="1"/>
+          </p:cNvPicPr>
+          <p:nvPr/>
+        </p:nvPicPr>
+        <p:blipFill>
+          <a:blip r:embed="rId4">
+            <a:extLst>
+              <a:ext uri="{28A0092B-C50C-407E-A947-70E740481C1C}">
+                <a14:useLocalDpi xmlns:a14="http://schemas.microsoft.com/office/drawing/2010/main" val="0"/>
+              </a:ext>
+            </a:extLst>
+          </a:blip>
+          <a:stretch>
+            <a:fillRect/>
+          </a:stretch>
+        </p:blipFill>
+        <p:spPr>
+          <a:xfrm>
+            <a:off x="6384178" y="4149080"/>
+            <a:ext cx="788034" cy="788034"/>
+          </a:xfrm>
+          <a:prstGeom prst="rect">
+            <a:avLst/>
+          </a:prstGeom>
+        </p:spPr>
+      </p:pic>
+      <p:pic>
+        <p:nvPicPr>
+          <p:cNvPr id="38" name="Grafik 37">
+            <a:extLst>
+              <a:ext uri="{FF2B5EF4-FFF2-40B4-BE49-F238E27FC236}">
+                <a16:creationId xmlns:a16="http://schemas.microsoft.com/office/drawing/2014/main" id="{096B2622-6BD9-0114-51D7-10CBEF015B8A}"/>
+              </a:ext>
+            </a:extLst>
+          </p:cNvPr>
+          <p:cNvPicPr>
+            <a:picLocks noChangeAspect="1"/>
+          </p:cNvPicPr>
+          <p:nvPr/>
+        </p:nvPicPr>
+        <p:blipFill>
+          <a:blip r:embed="rId4">
+            <a:extLst>
+              <a:ext uri="{28A0092B-C50C-407E-A947-70E740481C1C}">
+                <a14:useLocalDpi xmlns:a14="http://schemas.microsoft.com/office/drawing/2010/main" val="0"/>
+              </a:ext>
+            </a:extLst>
+          </a:blip>
+          <a:stretch>
+            <a:fillRect/>
+          </a:stretch>
+        </p:blipFill>
+        <p:spPr>
+          <a:xfrm>
+            <a:off x="7624525" y="4149080"/>
+            <a:ext cx="788034" cy="788034"/>
+          </a:xfrm>
+          <a:prstGeom prst="rect">
+            <a:avLst/>
+          </a:prstGeom>
+        </p:spPr>
+      </p:pic>
+      <p:cxnSp>
+        <p:nvCxnSpPr>
+          <p:cNvPr id="50" name="Verbinder: gewinkelt 49">
+            <a:extLst>
+              <a:ext uri="{FF2B5EF4-FFF2-40B4-BE49-F238E27FC236}">
+                <a16:creationId xmlns:a16="http://schemas.microsoft.com/office/drawing/2014/main" id="{0BF2F403-E707-C985-20A4-5B378BF43752}"/>
+              </a:ext>
+            </a:extLst>
+          </p:cNvPr>
+          <p:cNvCxnSpPr>
+            <a:cxnSpLocks/>
+            <a:stCxn id="4" idx="3"/>
+            <a:endCxn id="36" idx="0"/>
+          </p:cNvCxnSpPr>
+          <p:nvPr/>
+        </p:nvCxnSpPr>
+        <p:spPr bwMode="auto">
+          <a:xfrm>
+            <a:off x="5118591" y="3005066"/>
+            <a:ext cx="421630" cy="1144014"/>
+          </a:xfrm>
+          <a:prstGeom prst="bentConnector2">
+            <a:avLst/>
+          </a:prstGeom>
+          <a:solidFill>
+            <a:schemeClr val="accent1"/>
+          </a:solidFill>
+          <a:ln w="12700" cap="flat" cmpd="sng" algn="ctr">
+            <a:solidFill>
+              <a:schemeClr val="tx1"/>
+            </a:solidFill>
+            <a:prstDash val="solid"/>
+            <a:round/>
+            <a:headEnd type="none" w="sm" len="sm"/>
+            <a:tailEnd type="triangle"/>
+          </a:ln>
+          <a:effectLst/>
+        </p:spPr>
+      </p:cxnSp>
+      <p:cxnSp>
+        <p:nvCxnSpPr>
+          <p:cNvPr id="52" name="Verbinder: gewinkelt 51">
+            <a:extLst>
+              <a:ext uri="{FF2B5EF4-FFF2-40B4-BE49-F238E27FC236}">
+                <a16:creationId xmlns:a16="http://schemas.microsoft.com/office/drawing/2014/main" id="{E86ACFE9-27A7-6A15-FBA1-E8FA0963289E}"/>
+              </a:ext>
+            </a:extLst>
+          </p:cNvPr>
+          <p:cNvCxnSpPr>
+            <a:endCxn id="38" idx="0"/>
+          </p:cNvCxnSpPr>
+          <p:nvPr/>
+        </p:nvCxnSpPr>
+        <p:spPr bwMode="auto">
+          <a:xfrm>
+            <a:off x="5118591" y="3005065"/>
+            <a:ext cx="2899951" cy="1144015"/>
+          </a:xfrm>
+          <a:prstGeom prst="bentConnector2">
+            <a:avLst/>
+          </a:prstGeom>
+          <a:solidFill>
+            <a:schemeClr val="accent1"/>
+          </a:solidFill>
+          <a:ln w="12700" cap="flat" cmpd="sng" algn="ctr">
+            <a:solidFill>
+              <a:schemeClr val="tx1"/>
+            </a:solidFill>
+            <a:prstDash val="solid"/>
+            <a:round/>
+            <a:headEnd type="none" w="sm" len="sm"/>
+            <a:tailEnd type="triangle"/>
+          </a:ln>
+          <a:effectLst/>
+        </p:spPr>
+      </p:cxnSp>
+      <p:cxnSp>
+        <p:nvCxnSpPr>
+          <p:cNvPr id="54" name="Verbinder: gewinkelt 53">
+            <a:extLst>
+              <a:ext uri="{FF2B5EF4-FFF2-40B4-BE49-F238E27FC236}">
+                <a16:creationId xmlns:a16="http://schemas.microsoft.com/office/drawing/2014/main" id="{34FE958A-909C-D682-D3B5-505FD1CB548D}"/>
+              </a:ext>
+            </a:extLst>
+          </p:cNvPr>
+          <p:cNvCxnSpPr>
+            <a:stCxn id="4" idx="3"/>
+            <a:endCxn id="37" idx="0"/>
+          </p:cNvCxnSpPr>
+          <p:nvPr/>
+        </p:nvCxnSpPr>
+        <p:spPr bwMode="auto">
+          <a:xfrm>
+            <a:off x="5118591" y="3005066"/>
+            <a:ext cx="1659604" cy="1144014"/>
+          </a:xfrm>
+          <a:prstGeom prst="bentConnector2">
+            <a:avLst/>
+          </a:prstGeom>
+          <a:solidFill>
+            <a:schemeClr val="accent1"/>
+          </a:solidFill>
+          <a:ln w="12700" cap="flat" cmpd="sng" algn="ctr">
+            <a:solidFill>
+              <a:schemeClr val="tx1"/>
+            </a:solidFill>
+            <a:prstDash val="solid"/>
+            <a:round/>
+            <a:headEnd type="none" w="sm" len="sm"/>
+            <a:tailEnd type="triangle"/>
+          </a:ln>
+          <a:effectLst/>
+        </p:spPr>
+      </p:cxnSp>
     </p:spTree>
     <p:extLst>
       <p:ext uri="{BB962C8B-B14F-4D97-AF65-F5344CB8AC3E}">
-        <p14:creationId xmlns:p14="http://schemas.microsoft.com/office/powerpoint/2010/main" val="350845558"/>
+        <p14:creationId xmlns:p14="http://schemas.microsoft.com/office/powerpoint/2010/main" val="4192907276"/>
       </p:ext>
     </p:extLst>
   </p:cSld>
   <p:clrMapOvr>
     <a:masterClrMapping/>
   </p:clrMapOvr>
+  <p:timing>
+    <p:tnLst>
+      <p:par>
+        <p:cTn id="1" dur="indefinite" restart="never" nodeType="tmRoot">
+          <p:childTnLst>
+            <p:seq concurrent="1" nextAc="seek">
+              <p:cTn id="2" dur="indefinite" nodeType="mainSeq">
+                <p:childTnLst>
+                  <p:par>
+                    <p:cTn id="3" fill="hold">
+                      <p:stCondLst>
+                        <p:cond delay="indefinite"/>
+                        <p:cond evt="onBegin" delay="0">
+                          <p:tn val="2"/>
+                        </p:cond>
+                      </p:stCondLst>
+                      <p:childTnLst>
+                        <p:par>
+                          <p:cTn id="4" fill="hold">
+                            <p:stCondLst>
+                              <p:cond delay="0"/>
+                            </p:stCondLst>
+                            <p:childTnLst>
+                              <p:par>
+                                <p:cTn id="5" presetID="1" presetClass="entr" presetSubtype="0" fill="hold" grpId="0" nodeType="withEffect">
+                                  <p:stCondLst>
+                                    <p:cond delay="0"/>
+                                  </p:stCondLst>
+                                  <p:childTnLst>
+                                    <p:set>
+                                      <p:cBhvr>
+                                        <p:cTn id="6" dur="1" fill="hold">
+                                          <p:stCondLst>
+                                            <p:cond delay="0"/>
+                                          </p:stCondLst>
+                                        </p:cTn>
+                                        <p:tgtEl>
+                                          <p:spTgt spid="5"/>
+                                        </p:tgtEl>
+                                        <p:attrNameLst>
+                                          <p:attrName>style.visibility</p:attrName>
+                                        </p:attrNameLst>
+                                      </p:cBhvr>
+                                      <p:to>
+                                        <p:strVal val="visible"/>
+                                      </p:to>
+                                    </p:set>
+                                  </p:childTnLst>
+                                </p:cTn>
+                              </p:par>
+                              <p:par>
+                                <p:cTn id="7" presetID="1" presetClass="entr" presetSubtype="0" fill="hold" nodeType="withEffect">
+                                  <p:stCondLst>
+                                    <p:cond delay="0"/>
+                                  </p:stCondLst>
+                                  <p:childTnLst>
+                                    <p:set>
+                                      <p:cBhvr>
+                                        <p:cTn id="8" dur="1" fill="hold">
+                                          <p:stCondLst>
+                                            <p:cond delay="0"/>
+                                          </p:stCondLst>
+                                        </p:cTn>
+                                        <p:tgtEl>
+                                          <p:spTgt spid="8"/>
+                                        </p:tgtEl>
+                                        <p:attrNameLst>
+                                          <p:attrName>style.visibility</p:attrName>
+                                        </p:attrNameLst>
+                                      </p:cBhvr>
+                                      <p:to>
+                                        <p:strVal val="visible"/>
+                                      </p:to>
+                                    </p:set>
+                                  </p:childTnLst>
+                                </p:cTn>
+                              </p:par>
+                            </p:childTnLst>
+                          </p:cTn>
+                        </p:par>
+                      </p:childTnLst>
+                    </p:cTn>
+                  </p:par>
+                  <p:par>
+                    <p:cTn id="9" fill="hold">
+                      <p:stCondLst>
+                        <p:cond delay="indefinite"/>
+                      </p:stCondLst>
+                      <p:childTnLst>
+                        <p:par>
+                          <p:cTn id="10" fill="hold">
+                            <p:stCondLst>
+                              <p:cond delay="0"/>
+                            </p:stCondLst>
+                            <p:childTnLst>
+                              <p:par>
+                                <p:cTn id="11" presetID="1" presetClass="entr" presetSubtype="0" fill="hold" nodeType="clickEffect">
+                                  <p:stCondLst>
+                                    <p:cond delay="0"/>
+                                  </p:stCondLst>
+                                  <p:childTnLst>
+                                    <p:set>
+                                      <p:cBhvr>
+                                        <p:cTn id="12" dur="1" fill="hold">
+                                          <p:stCondLst>
+                                            <p:cond delay="0"/>
+                                          </p:stCondLst>
+                                        </p:cTn>
+                                        <p:tgtEl>
+                                          <p:spTgt spid="16"/>
+                                        </p:tgtEl>
+                                        <p:attrNameLst>
+                                          <p:attrName>style.visibility</p:attrName>
+                                        </p:attrNameLst>
+                                      </p:cBhvr>
+                                      <p:to>
+                                        <p:strVal val="visible"/>
+                                      </p:to>
+                                    </p:set>
+                                  </p:childTnLst>
+                                </p:cTn>
+                              </p:par>
+                              <p:par>
+                                <p:cTn id="13" presetID="1" presetClass="entr" presetSubtype="0" fill="hold" grpId="0" nodeType="withEffect">
+                                  <p:stCondLst>
+                                    <p:cond delay="0"/>
+                                  </p:stCondLst>
+                                  <p:childTnLst>
+                                    <p:set>
+                                      <p:cBhvr>
+                                        <p:cTn id="14" dur="1" fill="hold">
+                                          <p:stCondLst>
+                                            <p:cond delay="0"/>
+                                          </p:stCondLst>
+                                        </p:cTn>
+                                        <p:tgtEl>
+                                          <p:spTgt spid="4"/>
+                                        </p:tgtEl>
+                                        <p:attrNameLst>
+                                          <p:attrName>style.visibility</p:attrName>
+                                        </p:attrNameLst>
+                                      </p:cBhvr>
+                                      <p:to>
+                                        <p:strVal val="visible"/>
+                                      </p:to>
+                                    </p:set>
+                                  </p:childTnLst>
+                                </p:cTn>
+                              </p:par>
+                              <p:par>
+                                <p:cTn id="15" presetID="1" presetClass="entr" presetSubtype="0" fill="hold" grpId="0" nodeType="withEffect">
+                                  <p:stCondLst>
+                                    <p:cond delay="0"/>
+                                  </p:stCondLst>
+                                  <p:childTnLst>
+                                    <p:set>
+                                      <p:cBhvr>
+                                        <p:cTn id="16" dur="1" fill="hold">
+                                          <p:stCondLst>
+                                            <p:cond delay="0"/>
+                                          </p:stCondLst>
+                                        </p:cTn>
+                                        <p:tgtEl>
+                                          <p:spTgt spid="13"/>
+                                        </p:tgtEl>
+                                        <p:attrNameLst>
+                                          <p:attrName>style.visibility</p:attrName>
+                                        </p:attrNameLst>
+                                      </p:cBhvr>
+                                      <p:to>
+                                        <p:strVal val="visible"/>
+                                      </p:to>
+                                    </p:set>
+                                  </p:childTnLst>
+                                </p:cTn>
+                              </p:par>
+                              <p:par>
+                                <p:cTn id="17" presetID="1" presetClass="entr" presetSubtype="0" fill="hold" nodeType="withEffect">
+                                  <p:stCondLst>
+                                    <p:cond delay="0"/>
+                                  </p:stCondLst>
+                                  <p:childTnLst>
+                                    <p:set>
+                                      <p:cBhvr>
+                                        <p:cTn id="18" dur="1" fill="hold">
+                                          <p:stCondLst>
+                                            <p:cond delay="0"/>
+                                          </p:stCondLst>
+                                        </p:cTn>
+                                        <p:tgtEl>
+                                          <p:spTgt spid="9"/>
+                                        </p:tgtEl>
+                                        <p:attrNameLst>
+                                          <p:attrName>style.visibility</p:attrName>
+                                        </p:attrNameLst>
+                                      </p:cBhvr>
+                                      <p:to>
+                                        <p:strVal val="visible"/>
+                                      </p:to>
+                                    </p:set>
+                                  </p:childTnLst>
+                                </p:cTn>
+                              </p:par>
+                              <p:par>
+                                <p:cTn id="19" presetID="1" presetClass="entr" presetSubtype="0" fill="hold" grpId="0" nodeType="withEffect">
+                                  <p:stCondLst>
+                                    <p:cond delay="0"/>
+                                  </p:stCondLst>
+                                  <p:childTnLst>
+                                    <p:set>
+                                      <p:cBhvr>
+                                        <p:cTn id="20" dur="1" fill="hold">
+                                          <p:stCondLst>
+                                            <p:cond delay="0"/>
+                                          </p:stCondLst>
+                                        </p:cTn>
+                                        <p:tgtEl>
+                                          <p:spTgt spid="30"/>
+                                        </p:tgtEl>
+                                        <p:attrNameLst>
+                                          <p:attrName>style.visibility</p:attrName>
+                                        </p:attrNameLst>
+                                      </p:cBhvr>
+                                      <p:to>
+                                        <p:strVal val="visible"/>
+                                      </p:to>
+                                    </p:set>
+                                  </p:childTnLst>
+                                </p:cTn>
+                              </p:par>
+                              <p:par>
+                                <p:cTn id="21" presetID="1" presetClass="entr" presetSubtype="0" fill="hold" grpId="0" nodeType="withEffect">
+                                  <p:stCondLst>
+                                    <p:cond delay="0"/>
+                                  </p:stCondLst>
+                                  <p:childTnLst>
+                                    <p:set>
+                                      <p:cBhvr>
+                                        <p:cTn id="22" dur="1" fill="hold">
+                                          <p:stCondLst>
+                                            <p:cond delay="0"/>
+                                          </p:stCondLst>
+                                        </p:cTn>
+                                        <p:tgtEl>
+                                          <p:spTgt spid="32"/>
+                                        </p:tgtEl>
+                                        <p:attrNameLst>
+                                          <p:attrName>style.visibility</p:attrName>
+                                        </p:attrNameLst>
+                                      </p:cBhvr>
+                                      <p:to>
+                                        <p:strVal val="visible"/>
+                                      </p:to>
+                                    </p:set>
+                                  </p:childTnLst>
+                                </p:cTn>
+                              </p:par>
+                              <p:par>
+                                <p:cTn id="23" presetID="1" presetClass="entr" presetSubtype="0" fill="hold" grpId="0" nodeType="withEffect">
+                                  <p:stCondLst>
+                                    <p:cond delay="0"/>
+                                  </p:stCondLst>
+                                  <p:childTnLst>
+                                    <p:set>
+                                      <p:cBhvr>
+                                        <p:cTn id="24" dur="1" fill="hold">
+                                          <p:stCondLst>
+                                            <p:cond delay="0"/>
+                                          </p:stCondLst>
+                                        </p:cTn>
+                                        <p:tgtEl>
+                                          <p:spTgt spid="34"/>
+                                        </p:tgtEl>
+                                        <p:attrNameLst>
+                                          <p:attrName>style.visibility</p:attrName>
+                                        </p:attrNameLst>
+                                      </p:cBhvr>
+                                      <p:to>
+                                        <p:strVal val="visible"/>
+                                      </p:to>
+                                    </p:set>
+                                  </p:childTnLst>
+                                </p:cTn>
+                              </p:par>
+                              <p:par>
+                                <p:cTn id="25" presetID="1" presetClass="entr" presetSubtype="0" fill="hold" nodeType="withEffect">
+                                  <p:stCondLst>
+                                    <p:cond delay="0"/>
+                                  </p:stCondLst>
+                                  <p:childTnLst>
+                                    <p:set>
+                                      <p:cBhvr>
+                                        <p:cTn id="26" dur="1" fill="hold">
+                                          <p:stCondLst>
+                                            <p:cond delay="0"/>
+                                          </p:stCondLst>
+                                        </p:cTn>
+                                        <p:tgtEl>
+                                          <p:spTgt spid="36"/>
+                                        </p:tgtEl>
+                                        <p:attrNameLst>
+                                          <p:attrName>style.visibility</p:attrName>
+                                        </p:attrNameLst>
+                                      </p:cBhvr>
+                                      <p:to>
+                                        <p:strVal val="visible"/>
+                                      </p:to>
+                                    </p:set>
+                                  </p:childTnLst>
+                                </p:cTn>
+                              </p:par>
+                              <p:par>
+                                <p:cTn id="27" presetID="1" presetClass="entr" presetSubtype="0" fill="hold" nodeType="withEffect">
+                                  <p:stCondLst>
+                                    <p:cond delay="0"/>
+                                  </p:stCondLst>
+                                  <p:childTnLst>
+                                    <p:set>
+                                      <p:cBhvr>
+                                        <p:cTn id="28" dur="1" fill="hold">
+                                          <p:stCondLst>
+                                            <p:cond delay="0"/>
+                                          </p:stCondLst>
+                                        </p:cTn>
+                                        <p:tgtEl>
+                                          <p:spTgt spid="37"/>
+                                        </p:tgtEl>
+                                        <p:attrNameLst>
+                                          <p:attrName>style.visibility</p:attrName>
+                                        </p:attrNameLst>
+                                      </p:cBhvr>
+                                      <p:to>
+                                        <p:strVal val="visible"/>
+                                      </p:to>
+                                    </p:set>
+                                  </p:childTnLst>
+                                </p:cTn>
+                              </p:par>
+                              <p:par>
+                                <p:cTn id="29" presetID="1" presetClass="entr" presetSubtype="0" fill="hold" nodeType="withEffect">
+                                  <p:stCondLst>
+                                    <p:cond delay="0"/>
+                                  </p:stCondLst>
+                                  <p:childTnLst>
+                                    <p:set>
+                                      <p:cBhvr>
+                                        <p:cTn id="30" dur="1" fill="hold">
+                                          <p:stCondLst>
+                                            <p:cond delay="0"/>
+                                          </p:stCondLst>
+                                        </p:cTn>
+                                        <p:tgtEl>
+                                          <p:spTgt spid="38"/>
+                                        </p:tgtEl>
+                                        <p:attrNameLst>
+                                          <p:attrName>style.visibility</p:attrName>
+                                        </p:attrNameLst>
+                                      </p:cBhvr>
+                                      <p:to>
+                                        <p:strVal val="visible"/>
+                                      </p:to>
+                                    </p:set>
+                                  </p:childTnLst>
+                                </p:cTn>
+                              </p:par>
+                            </p:childTnLst>
+                          </p:cTn>
+                        </p:par>
+                      </p:childTnLst>
+                    </p:cTn>
+                  </p:par>
+                </p:childTnLst>
+              </p:cTn>
+              <p:prevCondLst>
+                <p:cond evt="onPrev" delay="0">
+                  <p:tgtEl>
+                    <p:sldTgt/>
+                  </p:tgtEl>
+                </p:cond>
+              </p:prevCondLst>
+              <p:nextCondLst>
+                <p:cond evt="onNext" delay="0">
+                  <p:tgtEl>
+                    <p:sldTgt/>
+                  </p:tgtEl>
+                </p:cond>
+              </p:nextCondLst>
+            </p:seq>
+          </p:childTnLst>
+        </p:cTn>
+      </p:par>
+    </p:tnLst>
+    <p:bldLst>
+      <p:bldP spid="4" grpId="0" animBg="1"/>
+      <p:bldP spid="5" grpId="0" animBg="1"/>
+      <p:bldP spid="13" grpId="0"/>
+      <p:bldP spid="30" grpId="0" animBg="1"/>
+      <p:bldP spid="32" grpId="0" animBg="1"/>
+      <p:bldP spid="34" grpId="0" animBg="1"/>
+    </p:bldLst>
+  </p:timing>
 </p:sld>
 </file>
 
 <file path=ppt/slides/slide24.xml><?xml version="1.0" encoding="utf-8"?>
+<p:sld xmlns:a="http://schemas.openxmlformats.org/drawingml/2006/main" xmlns:r="http://schemas.openxmlformats.org/officeDocument/2006/relationships" xmlns:p="http://schemas.openxmlformats.org/presentationml/2006/main">
+  <p:cSld>
+    <p:spTree>
+      <p:nvGrpSpPr>
+        <p:cNvPr id="1" name=""/>
+        <p:cNvGrpSpPr/>
+        <p:nvPr/>
+      </p:nvGrpSpPr>
+      <p:grpSpPr>
+        <a:xfrm>
+          <a:off x="0" y="0"/>
+          <a:ext cx="0" cy="0"/>
+          <a:chOff x="0" y="0"/>
+          <a:chExt cx="0" cy="0"/>
+        </a:xfrm>
+      </p:grpSpPr>
+      <p:sp>
+        <p:nvSpPr>
+          <p:cNvPr id="2" name="Titel 1">
+            <a:extLst>
+              <a:ext uri="{FF2B5EF4-FFF2-40B4-BE49-F238E27FC236}">
+                <a16:creationId xmlns:a16="http://schemas.microsoft.com/office/drawing/2014/main" id="{25716F7C-23E1-4109-0B22-8C31484F62E7}"/>
+              </a:ext>
+            </a:extLst>
+          </p:cNvPr>
+          <p:cNvSpPr>
+            <a:spLocks noGrp="1"/>
+          </p:cNvSpPr>
+          <p:nvPr>
+            <p:ph type="title"/>
+          </p:nvPr>
+        </p:nvSpPr>
+        <p:spPr/>
+        <p:txBody>
+          <a:bodyPr/>
+          <a:lstStyle/>
+          <a:p>
+            <a:r>
+              <a:rPr lang="de-DE" dirty="0" err="1"/>
+              <a:t>GitOps</a:t>
+            </a:r>
+            <a:endParaRPr lang="de-DE" dirty="0"/>
+          </a:p>
+        </p:txBody>
+      </p:sp>
+      <p:sp>
+        <p:nvSpPr>
+          <p:cNvPr id="3" name="Inhaltsplatzhalter 2">
+            <a:extLst>
+              <a:ext uri="{FF2B5EF4-FFF2-40B4-BE49-F238E27FC236}">
+                <a16:creationId xmlns:a16="http://schemas.microsoft.com/office/drawing/2014/main" id="{FCF9A17C-309A-CA52-D65F-F23973D0B59E}"/>
+              </a:ext>
+            </a:extLst>
+          </p:cNvPr>
+          <p:cNvSpPr>
+            <a:spLocks noGrp="1"/>
+          </p:cNvSpPr>
+          <p:nvPr>
+            <p:ph idx="1"/>
+          </p:nvPr>
+        </p:nvSpPr>
+        <p:spPr/>
+        <p:txBody>
+          <a:bodyPr/>
+          <a:lstStyle/>
+          <a:p>
+            <a:pPr marL="0" indent="0">
+              <a:buNone/>
+            </a:pPr>
+            <a:r>
+              <a:rPr lang="de-DE" b="1" dirty="0"/>
+              <a:t>… im Management Cluster</a:t>
+            </a:r>
+          </a:p>
+        </p:txBody>
+      </p:sp>
+      <p:sp>
+        <p:nvSpPr>
+          <p:cNvPr id="4" name="Rechteck: abgerundete Ecken 3">
+            <a:extLst>
+              <a:ext uri="{FF2B5EF4-FFF2-40B4-BE49-F238E27FC236}">
+                <a16:creationId xmlns:a16="http://schemas.microsoft.com/office/drawing/2014/main" id="{D1E32D07-1985-5E47-64E3-11D47AC11BFC}"/>
+              </a:ext>
+            </a:extLst>
+          </p:cNvPr>
+          <p:cNvSpPr/>
+          <p:nvPr/>
+        </p:nvSpPr>
+        <p:spPr bwMode="auto">
+          <a:xfrm>
+            <a:off x="2483768" y="1772816"/>
+            <a:ext cx="5256584" cy="2448272"/>
+          </a:xfrm>
+          <a:prstGeom prst="roundRect">
+            <a:avLst/>
+          </a:prstGeom>
+          <a:solidFill>
+            <a:srgbClr val="DDEEE8"/>
+          </a:solidFill>
+          <a:ln w="12700" cap="flat" cmpd="sng" algn="ctr">
+            <a:solidFill>
+              <a:schemeClr val="bg1"/>
+            </a:solidFill>
+            <a:prstDash val="solid"/>
+            <a:round/>
+            <a:headEnd type="none" w="sm" len="sm"/>
+            <a:tailEnd type="none" w="sm" len="sm"/>
+          </a:ln>
+          <a:effectLst/>
+        </p:spPr>
+        <p:txBody>
+          <a:bodyPr vert="horz" wrap="square" lIns="91440" tIns="45720" rIns="91440" bIns="45720" numCol="1" rtlCol="0" anchor="t" anchorCtr="0" compatLnSpc="1">
+            <a:prstTxWarp prst="textNoShape">
+              <a:avLst/>
+            </a:prstTxWarp>
+          </a:bodyPr>
+          <a:lstStyle/>
+          <a:p>
+            <a:pPr marL="0" marR="0" indent="0" algn="l" defTabSz="914400" rtl="0" eaLnBrk="0" fontAlgn="base" latinLnBrk="0" hangingPunct="0">
+              <a:lnSpc>
+                <a:spcPct val="100000"/>
+              </a:lnSpc>
+              <a:spcBef>
+                <a:spcPct val="0"/>
+              </a:spcBef>
+              <a:spcAft>
+                <a:spcPct val="0"/>
+              </a:spcAft>
+              <a:buClrTx/>
+              <a:buSzTx/>
+              <a:buFontTx/>
+              <a:buNone/>
+              <a:tabLst/>
+            </a:pPr>
+            <a:endParaRPr kumimoji="0" lang="de-DE" sz="2400" b="0" i="0" u="none" strike="noStrike" cap="none" normalizeH="0" baseline="0">
+              <a:ln>
+                <a:noFill/>
+              </a:ln>
+              <a:solidFill>
+                <a:schemeClr val="tx1"/>
+              </a:solidFill>
+              <a:effectLst/>
+              <a:latin typeface="Times New Roman" pitchFamily="18" charset="0"/>
+            </a:endParaRPr>
+          </a:p>
+        </p:txBody>
+      </p:sp>
+      <p:sp>
+        <p:nvSpPr>
+          <p:cNvPr id="5" name="Rechteck: abgerundete Ecken 4">
+            <a:extLst>
+              <a:ext uri="{FF2B5EF4-FFF2-40B4-BE49-F238E27FC236}">
+                <a16:creationId xmlns:a16="http://schemas.microsoft.com/office/drawing/2014/main" id="{5CC707D6-A80F-96A9-05D0-1919CC735579}"/>
+              </a:ext>
+            </a:extLst>
+          </p:cNvPr>
+          <p:cNvSpPr/>
+          <p:nvPr/>
+        </p:nvSpPr>
+        <p:spPr bwMode="auto">
+          <a:xfrm>
+            <a:off x="623061" y="2884049"/>
+            <a:ext cx="877480" cy="1200694"/>
+          </a:xfrm>
+          <a:prstGeom prst="roundRect">
+            <a:avLst/>
+          </a:prstGeom>
+          <a:solidFill>
+            <a:srgbClr val="DDEEE8"/>
+          </a:solidFill>
+          <a:ln w="12700" cap="flat" cmpd="sng" algn="ctr">
+            <a:solidFill>
+              <a:schemeClr val="bg1"/>
+            </a:solidFill>
+            <a:prstDash val="solid"/>
+            <a:round/>
+            <a:headEnd type="none" w="sm" len="sm"/>
+            <a:tailEnd type="none" w="sm" len="sm"/>
+          </a:ln>
+          <a:effectLst/>
+        </p:spPr>
+        <p:txBody>
+          <a:bodyPr vert="horz" wrap="square" lIns="91440" tIns="45720" rIns="91440" bIns="45720" numCol="1" rtlCol="0" anchor="t" anchorCtr="0" compatLnSpc="1">
+            <a:prstTxWarp prst="textNoShape">
+              <a:avLst/>
+            </a:prstTxWarp>
+          </a:bodyPr>
+          <a:lstStyle/>
+          <a:p>
+            <a:pPr marL="0" marR="0" indent="0" algn="l" defTabSz="914400" rtl="0" eaLnBrk="0" fontAlgn="base" latinLnBrk="0" hangingPunct="0">
+              <a:lnSpc>
+                <a:spcPct val="100000"/>
+              </a:lnSpc>
+              <a:spcBef>
+                <a:spcPct val="0"/>
+              </a:spcBef>
+              <a:spcAft>
+                <a:spcPct val="0"/>
+              </a:spcAft>
+              <a:buClrTx/>
+              <a:buSzTx/>
+              <a:buFontTx/>
+              <a:buNone/>
+              <a:tabLst/>
+            </a:pPr>
+            <a:endParaRPr kumimoji="0" lang="de-DE" sz="2400" b="0" i="0" u="none" strike="noStrike" cap="none" normalizeH="0" baseline="0" dirty="0">
+              <a:ln>
+                <a:noFill/>
+              </a:ln>
+              <a:solidFill>
+                <a:schemeClr val="tx1"/>
+              </a:solidFill>
+              <a:effectLst/>
+              <a:latin typeface="Times New Roman" pitchFamily="18" charset="0"/>
+            </a:endParaRPr>
+          </a:p>
+          <a:p>
+            <a:pPr marL="0" marR="0" indent="0" algn="l" defTabSz="914400" rtl="0" eaLnBrk="0" fontAlgn="base" latinLnBrk="0" hangingPunct="0">
+              <a:lnSpc>
+                <a:spcPct val="100000"/>
+              </a:lnSpc>
+              <a:spcBef>
+                <a:spcPct val="0"/>
+              </a:spcBef>
+              <a:spcAft>
+                <a:spcPct val="0"/>
+              </a:spcAft>
+              <a:buClrTx/>
+              <a:buSzTx/>
+              <a:buFontTx/>
+              <a:buNone/>
+              <a:tabLst/>
+            </a:pPr>
+            <a:endParaRPr lang="de-DE" dirty="0"/>
+          </a:p>
+          <a:p>
+            <a:pPr marL="0" marR="0" indent="0" algn="ctr" defTabSz="914400" rtl="0" eaLnBrk="0" fontAlgn="base" latinLnBrk="0" hangingPunct="0">
+              <a:lnSpc>
+                <a:spcPct val="100000"/>
+              </a:lnSpc>
+              <a:spcBef>
+                <a:spcPct val="0"/>
+              </a:spcBef>
+              <a:spcAft>
+                <a:spcPct val="0"/>
+              </a:spcAft>
+              <a:buClrTx/>
+              <a:buSzTx/>
+              <a:buFontTx/>
+              <a:buNone/>
+              <a:tabLst/>
+            </a:pPr>
+            <a:r>
+              <a:rPr lang="de-DE" sz="900" dirty="0">
+                <a:latin typeface="+mj-lt"/>
+              </a:rPr>
+              <a:t>Cloud </a:t>
+            </a:r>
+            <a:r>
+              <a:rPr lang="de-DE" sz="900" dirty="0" err="1">
+                <a:latin typeface="+mj-lt"/>
+              </a:rPr>
+              <a:t>Infra</a:t>
+            </a:r>
+            <a:r>
+              <a:rPr lang="de-DE" sz="900" dirty="0">
+                <a:latin typeface="+mj-lt"/>
+              </a:rPr>
+              <a:t> Repo</a:t>
+            </a:r>
+          </a:p>
+        </p:txBody>
+      </p:sp>
+      <p:pic>
+        <p:nvPicPr>
+          <p:cNvPr id="6" name="Grafik 5">
+            <a:extLst>
+              <a:ext uri="{FF2B5EF4-FFF2-40B4-BE49-F238E27FC236}">
+                <a16:creationId xmlns:a16="http://schemas.microsoft.com/office/drawing/2014/main" id="{8F57BB9A-7F00-ECD6-203B-FB6F99999BDD}"/>
+              </a:ext>
+            </a:extLst>
+          </p:cNvPr>
+          <p:cNvPicPr>
+            <a:picLocks noChangeAspect="1"/>
+          </p:cNvPicPr>
+          <p:nvPr/>
+        </p:nvPicPr>
+        <p:blipFill>
+          <a:blip r:embed="rId3">
+            <a:extLst>
+              <a:ext uri="{28A0092B-C50C-407E-A947-70E740481C1C}">
+                <a14:useLocalDpi xmlns:a14="http://schemas.microsoft.com/office/drawing/2010/main" val="0"/>
+              </a:ext>
+            </a:extLst>
+          </a:blip>
+          <a:stretch>
+            <a:fillRect/>
+          </a:stretch>
+        </p:blipFill>
+        <p:spPr>
+          <a:xfrm>
+            <a:off x="773841" y="2996648"/>
+            <a:ext cx="585415" cy="585415"/>
+          </a:xfrm>
+          <a:prstGeom prst="rect">
+            <a:avLst/>
+          </a:prstGeom>
+        </p:spPr>
+      </p:pic>
+      <p:pic>
+        <p:nvPicPr>
+          <p:cNvPr id="7" name="Grafik 6">
+            <a:extLst>
+              <a:ext uri="{FF2B5EF4-FFF2-40B4-BE49-F238E27FC236}">
+                <a16:creationId xmlns:a16="http://schemas.microsoft.com/office/drawing/2014/main" id="{674CE08F-4AA9-A66F-298A-41E2E1A61FF1}"/>
+              </a:ext>
+            </a:extLst>
+          </p:cNvPr>
+          <p:cNvPicPr>
+            <a:picLocks noChangeAspect="1"/>
+          </p:cNvPicPr>
+          <p:nvPr/>
+        </p:nvPicPr>
+        <p:blipFill>
+          <a:blip r:embed="rId4">
+            <a:extLst>
+              <a:ext uri="{28A0092B-C50C-407E-A947-70E740481C1C}">
+                <a14:useLocalDpi xmlns:a14="http://schemas.microsoft.com/office/drawing/2010/main" val="0"/>
+              </a:ext>
+            </a:extLst>
+          </a:blip>
+          <a:stretch>
+            <a:fillRect/>
+          </a:stretch>
+        </p:blipFill>
+        <p:spPr>
+          <a:xfrm>
+            <a:off x="3529911" y="1822356"/>
+            <a:ext cx="788034" cy="788034"/>
+          </a:xfrm>
+          <a:prstGeom prst="rect">
+            <a:avLst/>
+          </a:prstGeom>
+        </p:spPr>
+      </p:pic>
+      <p:sp>
+        <p:nvSpPr>
+          <p:cNvPr id="8" name="Textfeld 7">
+            <a:extLst>
+              <a:ext uri="{FF2B5EF4-FFF2-40B4-BE49-F238E27FC236}">
+                <a16:creationId xmlns:a16="http://schemas.microsoft.com/office/drawing/2014/main" id="{3E59DB06-0CE0-FC12-864B-F309E8C8915C}"/>
+              </a:ext>
+            </a:extLst>
+          </p:cNvPr>
+          <p:cNvSpPr txBox="1"/>
+          <p:nvPr/>
+        </p:nvSpPr>
+        <p:spPr bwMode="auto">
+          <a:xfrm>
+            <a:off x="3237383" y="2544514"/>
+            <a:ext cx="1373090" cy="230832"/>
+          </a:xfrm>
+          <a:prstGeom prst="rect">
+            <a:avLst/>
+          </a:prstGeom>
+          <a:noFill/>
+          <a:ln w="9525">
+            <a:noFill/>
+            <a:miter lim="800000"/>
+            <a:headEnd/>
+            <a:tailEnd/>
+          </a:ln>
+        </p:spPr>
+        <p:txBody>
+          <a:bodyPr wrap="square" rtlCol="0" anchor="ctr">
+            <a:spAutoFit/>
+          </a:bodyPr>
+          <a:lstStyle/>
+          <a:p>
+            <a:pPr algn="ctr" eaLnBrk="1" hangingPunct="1"/>
+            <a:r>
+              <a:rPr lang="de-DE" sz="900" dirty="0">
+                <a:latin typeface="Arial" charset="0"/>
+              </a:rPr>
+              <a:t>Management Cluster</a:t>
+            </a:r>
+          </a:p>
+        </p:txBody>
+      </p:sp>
+      <p:cxnSp>
+        <p:nvCxnSpPr>
+          <p:cNvPr id="9" name="Verbinder: gewinkelt 8">
+            <a:extLst>
+              <a:ext uri="{FF2B5EF4-FFF2-40B4-BE49-F238E27FC236}">
+                <a16:creationId xmlns:a16="http://schemas.microsoft.com/office/drawing/2014/main" id="{51A34764-F6CD-DDBC-045A-B4479D1FE986}"/>
+              </a:ext>
+            </a:extLst>
+          </p:cNvPr>
+          <p:cNvCxnSpPr>
+            <a:cxnSpLocks/>
+            <a:stCxn id="26" idx="1"/>
+            <a:endCxn id="5" idx="3"/>
+          </p:cNvCxnSpPr>
+          <p:nvPr/>
+        </p:nvCxnSpPr>
+        <p:spPr bwMode="auto">
+          <a:xfrm rot="10800000">
+            <a:off x="1500542" y="3484397"/>
+            <a:ext cx="1179139" cy="2003"/>
+          </a:xfrm>
+          <a:prstGeom prst="bentConnector3">
+            <a:avLst/>
+          </a:prstGeom>
+          <a:solidFill>
+            <a:schemeClr val="accent1"/>
+          </a:solidFill>
+          <a:ln w="12700" cap="flat" cmpd="sng" algn="ctr">
+            <a:solidFill>
+              <a:schemeClr val="tx1"/>
+            </a:solidFill>
+            <a:prstDash val="solid"/>
+            <a:round/>
+            <a:headEnd type="none" w="sm" len="sm"/>
+            <a:tailEnd type="triangle"/>
+          </a:ln>
+          <a:effectLst/>
+        </p:spPr>
+      </p:cxnSp>
+      <p:sp>
+        <p:nvSpPr>
+          <p:cNvPr id="11" name="Rechteck: abgerundete Ecken 10">
+            <a:extLst>
+              <a:ext uri="{FF2B5EF4-FFF2-40B4-BE49-F238E27FC236}">
+                <a16:creationId xmlns:a16="http://schemas.microsoft.com/office/drawing/2014/main" id="{50DCAF8F-EB4F-08A0-18B5-3962AEF6E31F}"/>
+              </a:ext>
+            </a:extLst>
+          </p:cNvPr>
+          <p:cNvSpPr/>
+          <p:nvPr/>
+        </p:nvSpPr>
+        <p:spPr bwMode="auto">
+          <a:xfrm>
+            <a:off x="3849840" y="4797152"/>
+            <a:ext cx="877480" cy="1200694"/>
+          </a:xfrm>
+          <a:prstGeom prst="roundRect">
+            <a:avLst/>
+          </a:prstGeom>
+          <a:solidFill>
+            <a:srgbClr val="DDEEE8"/>
+          </a:solidFill>
+          <a:ln w="12700" cap="flat" cmpd="sng" algn="ctr">
+            <a:solidFill>
+              <a:schemeClr val="bg1"/>
+            </a:solidFill>
+            <a:prstDash val="solid"/>
+            <a:round/>
+            <a:headEnd type="none" w="sm" len="sm"/>
+            <a:tailEnd type="none" w="sm" len="sm"/>
+          </a:ln>
+          <a:effectLst/>
+        </p:spPr>
+        <p:txBody>
+          <a:bodyPr vert="horz" wrap="square" lIns="91440" tIns="45720" rIns="91440" bIns="45720" numCol="1" rtlCol="0" anchor="t" anchorCtr="0" compatLnSpc="1">
+            <a:prstTxWarp prst="textNoShape">
+              <a:avLst/>
+            </a:prstTxWarp>
+          </a:bodyPr>
+          <a:lstStyle/>
+          <a:p>
+            <a:pPr marL="0" marR="0" indent="0" algn="l" defTabSz="914400" rtl="0" eaLnBrk="0" fontAlgn="base" latinLnBrk="0" hangingPunct="0">
+              <a:lnSpc>
+                <a:spcPct val="100000"/>
+              </a:lnSpc>
+              <a:spcBef>
+                <a:spcPct val="0"/>
+              </a:spcBef>
+              <a:spcAft>
+                <a:spcPct val="0"/>
+              </a:spcAft>
+              <a:buClrTx/>
+              <a:buSzTx/>
+              <a:buFontTx/>
+              <a:buNone/>
+              <a:tabLst/>
+            </a:pPr>
+            <a:endParaRPr kumimoji="0" lang="de-DE" sz="2400" b="0" i="0" u="none" strike="noStrike" cap="none" normalizeH="0" baseline="0" dirty="0">
+              <a:ln>
+                <a:noFill/>
+              </a:ln>
+              <a:solidFill>
+                <a:schemeClr val="tx1"/>
+              </a:solidFill>
+              <a:effectLst/>
+              <a:latin typeface="Times New Roman" pitchFamily="18" charset="0"/>
+            </a:endParaRPr>
+          </a:p>
+          <a:p>
+            <a:pPr marL="0" marR="0" indent="0" algn="l" defTabSz="914400" rtl="0" eaLnBrk="0" fontAlgn="base" latinLnBrk="0" hangingPunct="0">
+              <a:lnSpc>
+                <a:spcPct val="100000"/>
+              </a:lnSpc>
+              <a:spcBef>
+                <a:spcPct val="0"/>
+              </a:spcBef>
+              <a:spcAft>
+                <a:spcPct val="0"/>
+              </a:spcAft>
+              <a:buClrTx/>
+              <a:buSzTx/>
+              <a:buFontTx/>
+              <a:buNone/>
+              <a:tabLst/>
+            </a:pPr>
+            <a:endParaRPr lang="de-DE" dirty="0"/>
+          </a:p>
+          <a:p>
+            <a:pPr marL="0" marR="0" indent="0" algn="ctr" defTabSz="914400" rtl="0" eaLnBrk="0" fontAlgn="base" latinLnBrk="0" hangingPunct="0">
+              <a:lnSpc>
+                <a:spcPct val="100000"/>
+              </a:lnSpc>
+              <a:spcBef>
+                <a:spcPct val="0"/>
+              </a:spcBef>
+              <a:spcAft>
+                <a:spcPct val="0"/>
+              </a:spcAft>
+              <a:buClrTx/>
+              <a:buSzTx/>
+              <a:buFontTx/>
+              <a:buNone/>
+              <a:tabLst/>
+            </a:pPr>
+            <a:r>
+              <a:rPr lang="de-DE" sz="900" dirty="0">
+                <a:latin typeface="+mj-lt"/>
+              </a:rPr>
+              <a:t>Target Cluster</a:t>
+            </a:r>
+          </a:p>
+        </p:txBody>
+      </p:sp>
+      <p:pic>
+        <p:nvPicPr>
+          <p:cNvPr id="13" name="Grafik 12">
+            <a:extLst>
+              <a:ext uri="{FF2B5EF4-FFF2-40B4-BE49-F238E27FC236}">
+                <a16:creationId xmlns:a16="http://schemas.microsoft.com/office/drawing/2014/main" id="{D047E364-8103-892C-9153-5CE0C5B33480}"/>
+              </a:ext>
+            </a:extLst>
+          </p:cNvPr>
+          <p:cNvPicPr>
+            <a:picLocks noChangeAspect="1"/>
+          </p:cNvPicPr>
+          <p:nvPr/>
+        </p:nvPicPr>
+        <p:blipFill>
+          <a:blip r:embed="rId4">
+            <a:extLst>
+              <a:ext uri="{28A0092B-C50C-407E-A947-70E740481C1C}">
+                <a14:useLocalDpi xmlns:a14="http://schemas.microsoft.com/office/drawing/2010/main" val="0"/>
+              </a:ext>
+            </a:extLst>
+          </a:blip>
+          <a:stretch>
+            <a:fillRect/>
+          </a:stretch>
+        </p:blipFill>
+        <p:spPr>
+          <a:xfrm>
+            <a:off x="3897419" y="4797152"/>
+            <a:ext cx="788034" cy="788034"/>
+          </a:xfrm>
+          <a:prstGeom prst="rect">
+            <a:avLst/>
+          </a:prstGeom>
+        </p:spPr>
+      </p:pic>
+      <p:sp>
+        <p:nvSpPr>
+          <p:cNvPr id="26" name="Rechteck: abgerundete Ecken 25">
+            <a:extLst>
+              <a:ext uri="{FF2B5EF4-FFF2-40B4-BE49-F238E27FC236}">
+                <a16:creationId xmlns:a16="http://schemas.microsoft.com/office/drawing/2014/main" id="{6EA90128-0143-6808-E831-AA5244FD4449}"/>
+              </a:ext>
+            </a:extLst>
+          </p:cNvPr>
+          <p:cNvSpPr/>
+          <p:nvPr/>
+        </p:nvSpPr>
+        <p:spPr bwMode="auto">
+          <a:xfrm>
+            <a:off x="2679680" y="2886052"/>
+            <a:ext cx="868501" cy="1200694"/>
+          </a:xfrm>
+          <a:prstGeom prst="roundRect">
+            <a:avLst/>
+          </a:prstGeom>
+          <a:solidFill>
+            <a:srgbClr val="DDEEE8"/>
+          </a:solidFill>
+          <a:ln w="12700" cap="flat" cmpd="sng" algn="ctr">
+            <a:solidFill>
+              <a:schemeClr val="bg1"/>
+            </a:solidFill>
+            <a:prstDash val="solid"/>
+            <a:round/>
+            <a:headEnd type="none" w="sm" len="sm"/>
+            <a:tailEnd type="none" w="sm" len="sm"/>
+          </a:ln>
+          <a:effectLst>
+            <a:outerShdw blurRad="50800" dist="38100" dir="2700000" algn="tl" rotWithShape="0">
+              <a:prstClr val="black">
+                <a:alpha val="40000"/>
+              </a:prstClr>
+            </a:outerShdw>
+          </a:effectLst>
+        </p:spPr>
+        <p:txBody>
+          <a:bodyPr vert="horz" wrap="square" lIns="91440" tIns="45720" rIns="91440" bIns="45720" numCol="1" rtlCol="0" anchor="t" anchorCtr="0" compatLnSpc="1">
+            <a:prstTxWarp prst="textNoShape">
+              <a:avLst/>
+            </a:prstTxWarp>
+          </a:bodyPr>
+          <a:lstStyle/>
+          <a:p>
+            <a:pPr marL="0" marR="0" indent="0" algn="l" defTabSz="914400" rtl="0" eaLnBrk="0" fontAlgn="base" latinLnBrk="0" hangingPunct="0">
+              <a:lnSpc>
+                <a:spcPct val="100000"/>
+              </a:lnSpc>
+              <a:spcBef>
+                <a:spcPct val="0"/>
+              </a:spcBef>
+              <a:spcAft>
+                <a:spcPct val="0"/>
+              </a:spcAft>
+              <a:buClrTx/>
+              <a:buSzTx/>
+              <a:buFontTx/>
+              <a:buNone/>
+              <a:tabLst/>
+            </a:pPr>
+            <a:endParaRPr kumimoji="0" lang="de-DE" sz="2400" b="0" i="0" u="none" strike="noStrike" cap="none" normalizeH="0" baseline="0" dirty="0">
+              <a:ln>
+                <a:noFill/>
+              </a:ln>
+              <a:solidFill>
+                <a:schemeClr val="tx1"/>
+              </a:solidFill>
+              <a:effectLst/>
+              <a:latin typeface="Times New Roman" pitchFamily="18" charset="0"/>
+            </a:endParaRPr>
+          </a:p>
+          <a:p>
+            <a:pPr marL="0" marR="0" indent="0" algn="ctr" defTabSz="914400" rtl="0" eaLnBrk="0" fontAlgn="base" latinLnBrk="0" hangingPunct="0">
+              <a:lnSpc>
+                <a:spcPct val="100000"/>
+              </a:lnSpc>
+              <a:spcBef>
+                <a:spcPct val="0"/>
+              </a:spcBef>
+              <a:spcAft>
+                <a:spcPct val="0"/>
+              </a:spcAft>
+              <a:buClrTx/>
+              <a:buSzTx/>
+              <a:buFontTx/>
+              <a:buNone/>
+              <a:tabLst/>
+            </a:pPr>
+            <a:endParaRPr lang="de-DE" dirty="0"/>
+          </a:p>
+          <a:p>
+            <a:pPr marL="0" marR="0" indent="0" algn="ctr" defTabSz="914400" rtl="0" eaLnBrk="0" fontAlgn="base" latinLnBrk="0" hangingPunct="0">
+              <a:lnSpc>
+                <a:spcPct val="100000"/>
+              </a:lnSpc>
+              <a:spcBef>
+                <a:spcPct val="0"/>
+              </a:spcBef>
+              <a:spcAft>
+                <a:spcPct val="0"/>
+              </a:spcAft>
+              <a:buClrTx/>
+              <a:buSzTx/>
+              <a:buFontTx/>
+              <a:buNone/>
+              <a:tabLst/>
+            </a:pPr>
+            <a:r>
+              <a:rPr lang="de-DE" sz="900" dirty="0" err="1">
+                <a:latin typeface="+mj-lt"/>
+              </a:rPr>
+              <a:t>GitOps</a:t>
+            </a:r>
+            <a:r>
+              <a:rPr lang="de-DE" sz="900" dirty="0">
+                <a:latin typeface="+mj-lt"/>
+              </a:rPr>
+              <a:t> Operator</a:t>
+            </a:r>
+          </a:p>
+        </p:txBody>
+      </p:sp>
+      <p:pic>
+        <p:nvPicPr>
+          <p:cNvPr id="27" name="Grafik 26">
+            <a:extLst>
+              <a:ext uri="{FF2B5EF4-FFF2-40B4-BE49-F238E27FC236}">
+                <a16:creationId xmlns:a16="http://schemas.microsoft.com/office/drawing/2014/main" id="{258F079E-EB74-DCB0-CD90-3ADBB0858A54}"/>
+              </a:ext>
+            </a:extLst>
+          </p:cNvPr>
+          <p:cNvPicPr>
+            <a:picLocks noChangeAspect="1"/>
+          </p:cNvPicPr>
+          <p:nvPr/>
+        </p:nvPicPr>
+        <p:blipFill>
+          <a:blip r:embed="rId5">
+            <a:extLst>
+              <a:ext uri="{28A0092B-C50C-407E-A947-70E740481C1C}">
+                <a14:useLocalDpi xmlns:a14="http://schemas.microsoft.com/office/drawing/2010/main" val="0"/>
+              </a:ext>
+            </a:extLst>
+          </a:blip>
+          <a:stretch>
+            <a:fillRect/>
+          </a:stretch>
+        </p:blipFill>
+        <p:spPr>
+          <a:xfrm>
+            <a:off x="2771664" y="2939530"/>
+            <a:ext cx="684532" cy="684532"/>
+          </a:xfrm>
+          <a:prstGeom prst="rect">
+            <a:avLst/>
+          </a:prstGeom>
+        </p:spPr>
+      </p:pic>
+      <p:sp>
+        <p:nvSpPr>
+          <p:cNvPr id="28" name="Rechteck: abgerundete Ecken 27">
+            <a:extLst>
+              <a:ext uri="{FF2B5EF4-FFF2-40B4-BE49-F238E27FC236}">
+                <a16:creationId xmlns:a16="http://schemas.microsoft.com/office/drawing/2014/main" id="{3FECEFC7-0C78-73BB-C2FE-C7B205E9CDC7}"/>
+              </a:ext>
+            </a:extLst>
+          </p:cNvPr>
+          <p:cNvSpPr/>
+          <p:nvPr/>
+        </p:nvSpPr>
+        <p:spPr bwMode="auto">
+          <a:xfrm>
+            <a:off x="4727320" y="2884049"/>
+            <a:ext cx="868501" cy="1200694"/>
+          </a:xfrm>
+          <a:prstGeom prst="roundRect">
+            <a:avLst/>
+          </a:prstGeom>
+          <a:solidFill>
+            <a:srgbClr val="DDEEE8"/>
+          </a:solidFill>
+          <a:ln w="12700" cap="flat" cmpd="sng" algn="ctr">
+            <a:solidFill>
+              <a:schemeClr val="bg1"/>
+            </a:solidFill>
+            <a:prstDash val="solid"/>
+            <a:round/>
+            <a:headEnd type="none" w="sm" len="sm"/>
+            <a:tailEnd type="none" w="sm" len="sm"/>
+          </a:ln>
+          <a:effectLst>
+            <a:outerShdw blurRad="50800" dist="38100" dir="2700000" algn="tl" rotWithShape="0">
+              <a:prstClr val="black">
+                <a:alpha val="40000"/>
+              </a:prstClr>
+            </a:outerShdw>
+          </a:effectLst>
+        </p:spPr>
+        <p:txBody>
+          <a:bodyPr vert="horz" wrap="square" lIns="91440" tIns="45720" rIns="91440" bIns="45720" numCol="1" rtlCol="0" anchor="t" anchorCtr="0" compatLnSpc="1">
+            <a:prstTxWarp prst="textNoShape">
+              <a:avLst/>
+            </a:prstTxWarp>
+          </a:bodyPr>
+          <a:lstStyle/>
+          <a:p>
+            <a:pPr marL="0" marR="0" indent="0" algn="l" defTabSz="914400" rtl="0" eaLnBrk="0" fontAlgn="base" latinLnBrk="0" hangingPunct="0">
+              <a:lnSpc>
+                <a:spcPct val="100000"/>
+              </a:lnSpc>
+              <a:spcBef>
+                <a:spcPct val="0"/>
+              </a:spcBef>
+              <a:spcAft>
+                <a:spcPct val="0"/>
+              </a:spcAft>
+              <a:buClrTx/>
+              <a:buSzTx/>
+              <a:buFontTx/>
+              <a:buNone/>
+              <a:tabLst/>
+            </a:pPr>
+            <a:endParaRPr kumimoji="0" lang="de-DE" sz="2400" b="0" i="0" u="none" strike="noStrike" cap="none" normalizeH="0" baseline="0" dirty="0">
+              <a:ln>
+                <a:noFill/>
+              </a:ln>
+              <a:solidFill>
+                <a:schemeClr val="tx1"/>
+              </a:solidFill>
+              <a:effectLst/>
+              <a:latin typeface="Times New Roman" pitchFamily="18" charset="0"/>
+            </a:endParaRPr>
+          </a:p>
+          <a:p>
+            <a:pPr marL="0" marR="0" indent="0" algn="ctr" defTabSz="914400" rtl="0" eaLnBrk="0" fontAlgn="base" latinLnBrk="0" hangingPunct="0">
+              <a:lnSpc>
+                <a:spcPct val="100000"/>
+              </a:lnSpc>
+              <a:spcBef>
+                <a:spcPct val="0"/>
+              </a:spcBef>
+              <a:spcAft>
+                <a:spcPct val="0"/>
+              </a:spcAft>
+              <a:buClrTx/>
+              <a:buSzTx/>
+              <a:buFontTx/>
+              <a:buNone/>
+              <a:tabLst/>
+            </a:pPr>
+            <a:endParaRPr lang="de-DE" dirty="0"/>
+          </a:p>
+          <a:p>
+            <a:pPr marL="0" marR="0" indent="0" algn="ctr" defTabSz="914400" rtl="0" eaLnBrk="0" fontAlgn="base" latinLnBrk="0" hangingPunct="0">
+              <a:lnSpc>
+                <a:spcPct val="100000"/>
+              </a:lnSpc>
+              <a:spcBef>
+                <a:spcPct val="0"/>
+              </a:spcBef>
+              <a:spcAft>
+                <a:spcPct val="0"/>
+              </a:spcAft>
+              <a:buClrTx/>
+              <a:buSzTx/>
+              <a:buFontTx/>
+              <a:buNone/>
+              <a:tabLst/>
+            </a:pPr>
+            <a:r>
+              <a:rPr lang="de-DE" sz="900" dirty="0">
+                <a:latin typeface="+mj-lt"/>
+              </a:rPr>
+              <a:t>API-Server</a:t>
+            </a:r>
+          </a:p>
+        </p:txBody>
+      </p:sp>
+      <p:sp>
+        <p:nvSpPr>
+          <p:cNvPr id="30" name="Rechteck: abgerundete Ecken 29">
+            <a:extLst>
+              <a:ext uri="{FF2B5EF4-FFF2-40B4-BE49-F238E27FC236}">
+                <a16:creationId xmlns:a16="http://schemas.microsoft.com/office/drawing/2014/main" id="{3F686288-FCED-BCC1-4FC8-DAEDB628DEB0}"/>
+              </a:ext>
+            </a:extLst>
+          </p:cNvPr>
+          <p:cNvSpPr/>
+          <p:nvPr/>
+        </p:nvSpPr>
+        <p:spPr bwMode="auto">
+          <a:xfrm>
+            <a:off x="6600302" y="2886052"/>
+            <a:ext cx="868501" cy="1200694"/>
+          </a:xfrm>
+          <a:prstGeom prst="roundRect">
+            <a:avLst/>
+          </a:prstGeom>
+          <a:solidFill>
+            <a:srgbClr val="DDEEE8"/>
+          </a:solidFill>
+          <a:ln w="12700" cap="flat" cmpd="sng" algn="ctr">
+            <a:solidFill>
+              <a:schemeClr val="bg1"/>
+            </a:solidFill>
+            <a:prstDash val="solid"/>
+            <a:round/>
+            <a:headEnd type="none" w="sm" len="sm"/>
+            <a:tailEnd type="none" w="sm" len="sm"/>
+          </a:ln>
+          <a:effectLst>
+            <a:outerShdw blurRad="50800" dist="38100" dir="2700000" algn="tl" rotWithShape="0">
+              <a:prstClr val="black">
+                <a:alpha val="40000"/>
+              </a:prstClr>
+            </a:outerShdw>
+          </a:effectLst>
+        </p:spPr>
+        <p:txBody>
+          <a:bodyPr vert="horz" wrap="square" lIns="91440" tIns="45720" rIns="91440" bIns="45720" numCol="1" rtlCol="0" anchor="t" anchorCtr="0" compatLnSpc="1">
+            <a:prstTxWarp prst="textNoShape">
+              <a:avLst/>
+            </a:prstTxWarp>
+          </a:bodyPr>
+          <a:lstStyle/>
+          <a:p>
+            <a:pPr marL="0" marR="0" indent="0" algn="l" defTabSz="914400" rtl="0" eaLnBrk="0" fontAlgn="base" latinLnBrk="0" hangingPunct="0">
+              <a:lnSpc>
+                <a:spcPct val="100000"/>
+              </a:lnSpc>
+              <a:spcBef>
+                <a:spcPct val="0"/>
+              </a:spcBef>
+              <a:spcAft>
+                <a:spcPct val="0"/>
+              </a:spcAft>
+              <a:buClrTx/>
+              <a:buSzTx/>
+              <a:buFontTx/>
+              <a:buNone/>
+              <a:tabLst/>
+            </a:pPr>
+            <a:endParaRPr kumimoji="0" lang="de-DE" sz="2400" b="0" i="0" u="none" strike="noStrike" cap="none" normalizeH="0" baseline="0" dirty="0">
+              <a:ln>
+                <a:noFill/>
+              </a:ln>
+              <a:solidFill>
+                <a:schemeClr val="tx1"/>
+              </a:solidFill>
+              <a:effectLst/>
+              <a:latin typeface="Times New Roman" pitchFamily="18" charset="0"/>
+            </a:endParaRPr>
+          </a:p>
+          <a:p>
+            <a:pPr marL="0" marR="0" indent="0" algn="ctr" defTabSz="914400" rtl="0" eaLnBrk="0" fontAlgn="base" latinLnBrk="0" hangingPunct="0">
+              <a:lnSpc>
+                <a:spcPct val="100000"/>
+              </a:lnSpc>
+              <a:spcBef>
+                <a:spcPct val="0"/>
+              </a:spcBef>
+              <a:spcAft>
+                <a:spcPct val="0"/>
+              </a:spcAft>
+              <a:buClrTx/>
+              <a:buSzTx/>
+              <a:buFontTx/>
+              <a:buNone/>
+              <a:tabLst/>
+            </a:pPr>
+            <a:endParaRPr lang="de-DE" dirty="0"/>
+          </a:p>
+          <a:p>
+            <a:pPr marL="0" marR="0" indent="0" algn="ctr" defTabSz="914400" rtl="0" eaLnBrk="0" fontAlgn="base" latinLnBrk="0" hangingPunct="0">
+              <a:lnSpc>
+                <a:spcPct val="100000"/>
+              </a:lnSpc>
+              <a:spcBef>
+                <a:spcPct val="0"/>
+              </a:spcBef>
+              <a:spcAft>
+                <a:spcPct val="0"/>
+              </a:spcAft>
+              <a:buClrTx/>
+              <a:buSzTx/>
+              <a:buFontTx/>
+              <a:buNone/>
+              <a:tabLst/>
+            </a:pPr>
+            <a:r>
+              <a:rPr lang="de-DE" sz="900" dirty="0" err="1">
+                <a:latin typeface="+mj-lt"/>
+              </a:rPr>
+              <a:t>Infra</a:t>
+            </a:r>
+            <a:r>
+              <a:rPr lang="de-DE" sz="900" dirty="0">
+                <a:latin typeface="+mj-lt"/>
+              </a:rPr>
+              <a:t> Operator</a:t>
+            </a:r>
+          </a:p>
+        </p:txBody>
+      </p:sp>
+      <p:pic>
+        <p:nvPicPr>
+          <p:cNvPr id="34" name="Grafik 33">
+            <a:extLst>
+              <a:ext uri="{FF2B5EF4-FFF2-40B4-BE49-F238E27FC236}">
+                <a16:creationId xmlns:a16="http://schemas.microsoft.com/office/drawing/2014/main" id="{3EAD5753-71AD-7EF4-9B33-F6EDD55635DF}"/>
+              </a:ext>
+            </a:extLst>
+          </p:cNvPr>
+          <p:cNvPicPr>
+            <a:picLocks noChangeAspect="1"/>
+          </p:cNvPicPr>
+          <p:nvPr/>
+        </p:nvPicPr>
+        <p:blipFill>
+          <a:blip r:embed="rId4">
+            <a:extLst>
+              <a:ext uri="{28A0092B-C50C-407E-A947-70E740481C1C}">
+                <a14:useLocalDpi xmlns:a14="http://schemas.microsoft.com/office/drawing/2010/main" val="0"/>
+              </a:ext>
+            </a:extLst>
+          </a:blip>
+          <a:stretch>
+            <a:fillRect/>
+          </a:stretch>
+        </p:blipFill>
+        <p:spPr>
+          <a:xfrm>
+            <a:off x="4772232" y="2891508"/>
+            <a:ext cx="788034" cy="788034"/>
+          </a:xfrm>
+          <a:prstGeom prst="rect">
+            <a:avLst/>
+          </a:prstGeom>
+        </p:spPr>
+      </p:pic>
+      <p:sp>
+        <p:nvSpPr>
+          <p:cNvPr id="35" name="Wolke 34">
+            <a:extLst>
+              <a:ext uri="{FF2B5EF4-FFF2-40B4-BE49-F238E27FC236}">
+                <a16:creationId xmlns:a16="http://schemas.microsoft.com/office/drawing/2014/main" id="{237A852A-044A-C58D-0347-9D50FFB2BE3C}"/>
+              </a:ext>
+            </a:extLst>
+          </p:cNvPr>
+          <p:cNvSpPr/>
+          <p:nvPr/>
+        </p:nvSpPr>
+        <p:spPr bwMode="auto">
+          <a:xfrm>
+            <a:off x="6134452" y="4840330"/>
+            <a:ext cx="1800200" cy="1127750"/>
+          </a:xfrm>
+          <a:prstGeom prst="cloud">
+            <a:avLst/>
+          </a:prstGeom>
+          <a:solidFill>
+            <a:srgbClr val="DDEEE8"/>
+          </a:solidFill>
+          <a:ln w="12700" cap="flat" cmpd="sng" algn="ctr">
+            <a:solidFill>
+              <a:schemeClr val="tx1"/>
+            </a:solidFill>
+            <a:prstDash val="solid"/>
+            <a:round/>
+            <a:headEnd type="none" w="sm" len="sm"/>
+            <a:tailEnd type="none" w="sm" len="sm"/>
+          </a:ln>
+          <a:effectLst/>
+        </p:spPr>
+        <p:txBody>
+          <a:bodyPr vert="horz" wrap="square" lIns="91440" tIns="45720" rIns="91440" bIns="45720" numCol="1" rtlCol="0" anchor="t" anchorCtr="0" compatLnSpc="1">
+            <a:prstTxWarp prst="textNoShape">
+              <a:avLst/>
+            </a:prstTxWarp>
+          </a:bodyPr>
+          <a:lstStyle/>
+          <a:p>
+            <a:pPr marL="0" marR="0" indent="0" algn="l" defTabSz="914400" rtl="0" eaLnBrk="0" fontAlgn="base" latinLnBrk="0" hangingPunct="0">
+              <a:lnSpc>
+                <a:spcPct val="100000"/>
+              </a:lnSpc>
+              <a:spcBef>
+                <a:spcPct val="0"/>
+              </a:spcBef>
+              <a:spcAft>
+                <a:spcPct val="0"/>
+              </a:spcAft>
+              <a:buClrTx/>
+              <a:buSzTx/>
+              <a:buFontTx/>
+              <a:buNone/>
+              <a:tabLst/>
+            </a:pPr>
+            <a:endParaRPr kumimoji="0" lang="de-DE" sz="2400" b="0" i="0" u="none" strike="noStrike" cap="none" normalizeH="0" baseline="0">
+              <a:ln>
+                <a:noFill/>
+              </a:ln>
+              <a:solidFill>
+                <a:schemeClr val="tx1"/>
+              </a:solidFill>
+              <a:effectLst/>
+              <a:latin typeface="Times New Roman" pitchFamily="18" charset="0"/>
+            </a:endParaRPr>
+          </a:p>
+        </p:txBody>
+      </p:sp>
+      <p:cxnSp>
+        <p:nvCxnSpPr>
+          <p:cNvPr id="37" name="Gerade Verbindung mit Pfeil 36">
+            <a:extLst>
+              <a:ext uri="{FF2B5EF4-FFF2-40B4-BE49-F238E27FC236}">
+                <a16:creationId xmlns:a16="http://schemas.microsoft.com/office/drawing/2014/main" id="{CA72351A-952C-D1F2-3BF8-552D33F49B3A}"/>
+              </a:ext>
+            </a:extLst>
+          </p:cNvPr>
+          <p:cNvCxnSpPr>
+            <a:stCxn id="26" idx="3"/>
+            <a:endCxn id="28" idx="1"/>
+          </p:cNvCxnSpPr>
+          <p:nvPr/>
+        </p:nvCxnSpPr>
+        <p:spPr bwMode="auto">
+          <a:xfrm flipV="1">
+            <a:off x="3548181" y="3484396"/>
+            <a:ext cx="1179139" cy="2003"/>
+          </a:xfrm>
+          <a:prstGeom prst="straightConnector1">
+            <a:avLst/>
+          </a:prstGeom>
+          <a:solidFill>
+            <a:schemeClr val="accent1"/>
+          </a:solidFill>
+          <a:ln w="12700" cap="flat" cmpd="sng" algn="ctr">
+            <a:solidFill>
+              <a:schemeClr val="tx1"/>
+            </a:solidFill>
+            <a:prstDash val="solid"/>
+            <a:round/>
+            <a:headEnd type="none" w="sm" len="sm"/>
+            <a:tailEnd type="triangle"/>
+          </a:ln>
+          <a:effectLst/>
+        </p:spPr>
+      </p:cxnSp>
+      <p:cxnSp>
+        <p:nvCxnSpPr>
+          <p:cNvPr id="39" name="Gerade Verbindung mit Pfeil 38">
+            <a:extLst>
+              <a:ext uri="{FF2B5EF4-FFF2-40B4-BE49-F238E27FC236}">
+                <a16:creationId xmlns:a16="http://schemas.microsoft.com/office/drawing/2014/main" id="{087A2492-CCD9-FAA8-4515-8BD5ADE5C054}"/>
+              </a:ext>
+            </a:extLst>
+          </p:cNvPr>
+          <p:cNvCxnSpPr>
+            <a:stCxn id="28" idx="3"/>
+            <a:endCxn id="30" idx="1"/>
+          </p:cNvCxnSpPr>
+          <p:nvPr/>
+        </p:nvCxnSpPr>
+        <p:spPr bwMode="auto">
+          <a:xfrm>
+            <a:off x="5595821" y="3484396"/>
+            <a:ext cx="1004481" cy="2003"/>
+          </a:xfrm>
+          <a:prstGeom prst="straightConnector1">
+            <a:avLst/>
+          </a:prstGeom>
+          <a:solidFill>
+            <a:schemeClr val="accent1"/>
+          </a:solidFill>
+          <a:ln w="12700" cap="flat" cmpd="sng" algn="ctr">
+            <a:solidFill>
+              <a:schemeClr val="tx1"/>
+            </a:solidFill>
+            <a:prstDash val="solid"/>
+            <a:round/>
+            <a:headEnd type="none" w="sm" len="sm"/>
+            <a:tailEnd type="triangle"/>
+          </a:ln>
+          <a:effectLst/>
+        </p:spPr>
+      </p:cxnSp>
+      <p:sp>
+        <p:nvSpPr>
+          <p:cNvPr id="43" name="Wolke 42">
+            <a:extLst>
+              <a:ext uri="{FF2B5EF4-FFF2-40B4-BE49-F238E27FC236}">
+                <a16:creationId xmlns:a16="http://schemas.microsoft.com/office/drawing/2014/main" id="{AB1C1CA9-C04A-F761-DE94-1DAD128B81C7}"/>
+              </a:ext>
+            </a:extLst>
+          </p:cNvPr>
+          <p:cNvSpPr/>
+          <p:nvPr/>
+        </p:nvSpPr>
+        <p:spPr bwMode="auto">
+          <a:xfrm>
+            <a:off x="6720988" y="3067661"/>
+            <a:ext cx="627128" cy="512891"/>
+          </a:xfrm>
+          <a:prstGeom prst="cloud">
+            <a:avLst/>
+          </a:prstGeom>
+          <a:solidFill>
+            <a:srgbClr val="DDEEE8"/>
+          </a:solidFill>
+          <a:ln w="12700" cap="flat" cmpd="sng" algn="ctr">
+            <a:solidFill>
+              <a:schemeClr val="tx1"/>
+            </a:solidFill>
+            <a:prstDash val="solid"/>
+            <a:round/>
+            <a:headEnd type="none" w="sm" len="sm"/>
+            <a:tailEnd type="none" w="sm" len="sm"/>
+          </a:ln>
+          <a:effectLst/>
+        </p:spPr>
+        <p:txBody>
+          <a:bodyPr vert="horz" wrap="square" lIns="91440" tIns="45720" rIns="91440" bIns="45720" numCol="1" rtlCol="0" anchor="t" anchorCtr="0" compatLnSpc="1">
+            <a:prstTxWarp prst="textNoShape">
+              <a:avLst/>
+            </a:prstTxWarp>
+          </a:bodyPr>
+          <a:lstStyle/>
+          <a:p>
+            <a:pPr marL="0" marR="0" indent="0" algn="l" defTabSz="914400" rtl="0" eaLnBrk="0" fontAlgn="base" latinLnBrk="0" hangingPunct="0">
+              <a:lnSpc>
+                <a:spcPct val="100000"/>
+              </a:lnSpc>
+              <a:spcBef>
+                <a:spcPct val="0"/>
+              </a:spcBef>
+              <a:spcAft>
+                <a:spcPct val="0"/>
+              </a:spcAft>
+              <a:buClrTx/>
+              <a:buSzTx/>
+              <a:buFontTx/>
+              <a:buNone/>
+              <a:tabLst/>
+            </a:pPr>
+            <a:endParaRPr kumimoji="0" lang="de-DE" sz="2400" b="0" i="0" u="none" strike="noStrike" cap="none" normalizeH="0" baseline="0">
+              <a:ln>
+                <a:noFill/>
+              </a:ln>
+              <a:solidFill>
+                <a:schemeClr val="tx1"/>
+              </a:solidFill>
+              <a:effectLst/>
+              <a:latin typeface="Times New Roman" pitchFamily="18" charset="0"/>
+            </a:endParaRPr>
+          </a:p>
+        </p:txBody>
+      </p:sp>
+      <p:cxnSp>
+        <p:nvCxnSpPr>
+          <p:cNvPr id="45" name="Verbinder: gewinkelt 44">
+            <a:extLst>
+              <a:ext uri="{FF2B5EF4-FFF2-40B4-BE49-F238E27FC236}">
+                <a16:creationId xmlns:a16="http://schemas.microsoft.com/office/drawing/2014/main" id="{26F5130C-F2D4-D882-1B2C-13B083AD477C}"/>
+              </a:ext>
+            </a:extLst>
+          </p:cNvPr>
+          <p:cNvCxnSpPr>
+            <a:stCxn id="26" idx="2"/>
+            <a:endCxn id="11" idx="1"/>
+          </p:cNvCxnSpPr>
+          <p:nvPr/>
+        </p:nvCxnSpPr>
+        <p:spPr bwMode="auto">
+          <a:xfrm rot="16200000" flipH="1">
+            <a:off x="2826509" y="4374167"/>
+            <a:ext cx="1310753" cy="735909"/>
+          </a:xfrm>
+          <a:prstGeom prst="bentConnector2">
+            <a:avLst/>
+          </a:prstGeom>
+          <a:solidFill>
+            <a:schemeClr val="accent1"/>
+          </a:solidFill>
+          <a:ln w="12700" cap="flat" cmpd="sng" algn="ctr">
+            <a:solidFill>
+              <a:schemeClr val="tx1"/>
+            </a:solidFill>
+            <a:prstDash val="solid"/>
+            <a:round/>
+            <a:headEnd type="none" w="sm" len="sm"/>
+            <a:tailEnd type="triangle"/>
+          </a:ln>
+          <a:effectLst/>
+        </p:spPr>
+      </p:cxnSp>
+      <p:cxnSp>
+        <p:nvCxnSpPr>
+          <p:cNvPr id="50" name="Gerade Verbindung mit Pfeil 49">
+            <a:extLst>
+              <a:ext uri="{FF2B5EF4-FFF2-40B4-BE49-F238E27FC236}">
+                <a16:creationId xmlns:a16="http://schemas.microsoft.com/office/drawing/2014/main" id="{99F70855-124C-2C49-220B-923B8532E923}"/>
+              </a:ext>
+            </a:extLst>
+          </p:cNvPr>
+          <p:cNvCxnSpPr>
+            <a:stCxn id="30" idx="2"/>
+            <a:endCxn id="35" idx="3"/>
+          </p:cNvCxnSpPr>
+          <p:nvPr/>
+        </p:nvCxnSpPr>
+        <p:spPr bwMode="auto">
+          <a:xfrm flipH="1">
+            <a:off x="7034552" y="4086746"/>
+            <a:ext cx="1" cy="818064"/>
+          </a:xfrm>
+          <a:prstGeom prst="straightConnector1">
+            <a:avLst/>
+          </a:prstGeom>
+          <a:solidFill>
+            <a:schemeClr val="accent1"/>
+          </a:solidFill>
+          <a:ln w="12700" cap="flat" cmpd="sng" algn="ctr">
+            <a:solidFill>
+              <a:schemeClr val="tx1"/>
+            </a:solidFill>
+            <a:prstDash val="solid"/>
+            <a:round/>
+            <a:headEnd type="none" w="sm" len="sm"/>
+            <a:tailEnd type="triangle"/>
+          </a:ln>
+          <a:effectLst/>
+        </p:spPr>
+      </p:cxnSp>
+      <p:cxnSp>
+        <p:nvCxnSpPr>
+          <p:cNvPr id="52" name="Gerade Verbindung mit Pfeil 51">
+            <a:extLst>
+              <a:ext uri="{FF2B5EF4-FFF2-40B4-BE49-F238E27FC236}">
+                <a16:creationId xmlns:a16="http://schemas.microsoft.com/office/drawing/2014/main" id="{13D52CE0-EB93-9895-B706-9D2B13CA9A51}"/>
+              </a:ext>
+            </a:extLst>
+          </p:cNvPr>
+          <p:cNvCxnSpPr>
+            <a:stCxn id="35" idx="2"/>
+            <a:endCxn id="11" idx="3"/>
+          </p:cNvCxnSpPr>
+          <p:nvPr/>
+        </p:nvCxnSpPr>
+        <p:spPr bwMode="auto">
+          <a:xfrm flipH="1" flipV="1">
+            <a:off x="4727320" y="5397499"/>
+            <a:ext cx="1412716" cy="6706"/>
+          </a:xfrm>
+          <a:prstGeom prst="straightConnector1">
+            <a:avLst/>
+          </a:prstGeom>
+          <a:solidFill>
+            <a:schemeClr val="accent1"/>
+          </a:solidFill>
+          <a:ln w="12700" cap="flat" cmpd="sng" algn="ctr">
+            <a:solidFill>
+              <a:schemeClr val="tx1"/>
+            </a:solidFill>
+            <a:prstDash val="solid"/>
+            <a:round/>
+            <a:headEnd type="none" w="sm" len="sm"/>
+            <a:tailEnd type="triangle"/>
+          </a:ln>
+          <a:effectLst/>
+        </p:spPr>
+      </p:cxnSp>
+      <p:cxnSp>
+        <p:nvCxnSpPr>
+          <p:cNvPr id="56" name="Gerade Verbindung mit Pfeil 55">
+            <a:extLst>
+              <a:ext uri="{FF2B5EF4-FFF2-40B4-BE49-F238E27FC236}">
+                <a16:creationId xmlns:a16="http://schemas.microsoft.com/office/drawing/2014/main" id="{BB18BA75-DB67-85F0-1C92-D9A2ACB4A76A}"/>
+              </a:ext>
+            </a:extLst>
+          </p:cNvPr>
+          <p:cNvCxnSpPr>
+            <a:stCxn id="30" idx="2"/>
+            <a:endCxn id="11" idx="3"/>
+          </p:cNvCxnSpPr>
+          <p:nvPr/>
+        </p:nvCxnSpPr>
+        <p:spPr bwMode="auto">
+          <a:xfrm flipH="1">
+            <a:off x="4727320" y="4086746"/>
+            <a:ext cx="2307233" cy="1310753"/>
+          </a:xfrm>
+          <a:prstGeom prst="straightConnector1">
+            <a:avLst/>
+          </a:prstGeom>
+          <a:solidFill>
+            <a:schemeClr val="accent1"/>
+          </a:solidFill>
+          <a:ln w="12700" cap="flat" cmpd="sng" algn="ctr">
+            <a:solidFill>
+              <a:schemeClr val="tx1"/>
+            </a:solidFill>
+            <a:prstDash val="solid"/>
+            <a:round/>
+            <a:headEnd type="none" w="sm" len="sm"/>
+            <a:tailEnd type="triangle"/>
+          </a:ln>
+          <a:effectLst/>
+        </p:spPr>
+      </p:cxnSp>
+      <p:sp>
+        <p:nvSpPr>
+          <p:cNvPr id="57" name="Textfeld 56">
+            <a:extLst>
+              <a:ext uri="{FF2B5EF4-FFF2-40B4-BE49-F238E27FC236}">
+                <a16:creationId xmlns:a16="http://schemas.microsoft.com/office/drawing/2014/main" id="{67E16115-53B4-2FA5-7933-1D62AAD607EA}"/>
+              </a:ext>
+            </a:extLst>
+          </p:cNvPr>
+          <p:cNvSpPr txBox="1"/>
+          <p:nvPr/>
+        </p:nvSpPr>
+        <p:spPr bwMode="auto">
+          <a:xfrm>
+            <a:off x="1830415" y="3245138"/>
+            <a:ext cx="519390" cy="230832"/>
+          </a:xfrm>
+          <a:prstGeom prst="rect">
+            <a:avLst/>
+          </a:prstGeom>
+          <a:noFill/>
+          <a:ln w="9525">
+            <a:noFill/>
+            <a:miter lim="800000"/>
+            <a:headEnd/>
+            <a:tailEnd/>
+          </a:ln>
+        </p:spPr>
+        <p:txBody>
+          <a:bodyPr wrap="square" rtlCol="0" anchor="ctr">
+            <a:spAutoFit/>
+          </a:bodyPr>
+          <a:lstStyle/>
+          <a:p>
+            <a:pPr eaLnBrk="1" hangingPunct="1"/>
+            <a:r>
+              <a:rPr lang="de-DE" sz="900" dirty="0">
+                <a:latin typeface="Arial" charset="0"/>
+              </a:rPr>
+              <a:t>pull</a:t>
+            </a:r>
+          </a:p>
+        </p:txBody>
+      </p:sp>
+      <p:sp>
+        <p:nvSpPr>
+          <p:cNvPr id="58" name="Textfeld 57">
+            <a:extLst>
+              <a:ext uri="{FF2B5EF4-FFF2-40B4-BE49-F238E27FC236}">
+                <a16:creationId xmlns:a16="http://schemas.microsoft.com/office/drawing/2014/main" id="{FFDFD6AB-3A40-8EC2-61FD-4D5BD5917968}"/>
+              </a:ext>
+            </a:extLst>
+          </p:cNvPr>
+          <p:cNvSpPr txBox="1"/>
+          <p:nvPr/>
+        </p:nvSpPr>
+        <p:spPr bwMode="auto">
+          <a:xfrm>
+            <a:off x="3668867" y="3224279"/>
+            <a:ext cx="995170" cy="230832"/>
+          </a:xfrm>
+          <a:prstGeom prst="rect">
+            <a:avLst/>
+          </a:prstGeom>
+          <a:noFill/>
+          <a:ln w="9525">
+            <a:noFill/>
+            <a:miter lim="800000"/>
+            <a:headEnd/>
+            <a:tailEnd/>
+          </a:ln>
+        </p:spPr>
+        <p:txBody>
+          <a:bodyPr wrap="square" rtlCol="0" anchor="ctr">
+            <a:spAutoFit/>
+          </a:bodyPr>
+          <a:lstStyle/>
+          <a:p>
+            <a:pPr eaLnBrk="1" hangingPunct="1"/>
+            <a:r>
+              <a:rPr lang="de-DE" sz="900" dirty="0" err="1">
+                <a:latin typeface="Arial" charset="0"/>
+              </a:rPr>
+              <a:t>apply</a:t>
+            </a:r>
+            <a:r>
+              <a:rPr lang="de-DE" sz="900" dirty="0">
+                <a:latin typeface="Arial" charset="0"/>
+              </a:rPr>
+              <a:t> </a:t>
+            </a:r>
+            <a:r>
+              <a:rPr lang="de-DE" sz="900" dirty="0" err="1">
+                <a:latin typeface="Arial" charset="0"/>
+              </a:rPr>
+              <a:t>resources</a:t>
+            </a:r>
+            <a:endParaRPr lang="de-DE" sz="900" dirty="0">
+              <a:latin typeface="Arial" charset="0"/>
+            </a:endParaRPr>
+          </a:p>
+        </p:txBody>
+      </p:sp>
+      <p:sp>
+        <p:nvSpPr>
+          <p:cNvPr id="59" name="Textfeld 58">
+            <a:extLst>
+              <a:ext uri="{FF2B5EF4-FFF2-40B4-BE49-F238E27FC236}">
+                <a16:creationId xmlns:a16="http://schemas.microsoft.com/office/drawing/2014/main" id="{AD4CFD98-2072-7271-80D4-55E06398B3D8}"/>
+              </a:ext>
+            </a:extLst>
+          </p:cNvPr>
+          <p:cNvSpPr txBox="1"/>
+          <p:nvPr/>
+        </p:nvSpPr>
+        <p:spPr bwMode="auto">
+          <a:xfrm>
+            <a:off x="5728736" y="3244324"/>
+            <a:ext cx="779581" cy="230832"/>
+          </a:xfrm>
+          <a:prstGeom prst="rect">
+            <a:avLst/>
+          </a:prstGeom>
+          <a:noFill/>
+          <a:ln w="9525">
+            <a:noFill/>
+            <a:miter lim="800000"/>
+            <a:headEnd/>
+            <a:tailEnd/>
+          </a:ln>
+        </p:spPr>
+        <p:txBody>
+          <a:bodyPr wrap="square" rtlCol="0" anchor="ctr">
+            <a:spAutoFit/>
+          </a:bodyPr>
+          <a:lstStyle/>
+          <a:p>
+            <a:pPr eaLnBrk="1" hangingPunct="1"/>
+            <a:r>
+              <a:rPr lang="de-DE" sz="900" dirty="0" err="1">
+                <a:latin typeface="Arial" charset="0"/>
+              </a:rPr>
+              <a:t>watch</a:t>
+            </a:r>
+            <a:r>
+              <a:rPr lang="de-DE" sz="900" dirty="0">
+                <a:latin typeface="Arial" charset="0"/>
+              </a:rPr>
+              <a:t> CRs</a:t>
+            </a:r>
+          </a:p>
+        </p:txBody>
+      </p:sp>
+      <p:sp>
+        <p:nvSpPr>
+          <p:cNvPr id="60" name="Textfeld 59">
+            <a:extLst>
+              <a:ext uri="{FF2B5EF4-FFF2-40B4-BE49-F238E27FC236}">
+                <a16:creationId xmlns:a16="http://schemas.microsoft.com/office/drawing/2014/main" id="{90ADCA7D-4831-DBB9-0A30-E6A83DDE8305}"/>
+              </a:ext>
+            </a:extLst>
+          </p:cNvPr>
+          <p:cNvSpPr txBox="1"/>
+          <p:nvPr/>
+        </p:nvSpPr>
+        <p:spPr bwMode="auto">
+          <a:xfrm>
+            <a:off x="3118930" y="4347911"/>
+            <a:ext cx="1047522" cy="230832"/>
+          </a:xfrm>
+          <a:prstGeom prst="rect">
+            <a:avLst/>
+          </a:prstGeom>
+          <a:noFill/>
+          <a:ln w="9525">
+            <a:noFill/>
+            <a:miter lim="800000"/>
+            <a:headEnd/>
+            <a:tailEnd/>
+          </a:ln>
+        </p:spPr>
+        <p:txBody>
+          <a:bodyPr wrap="square" rtlCol="0" anchor="ctr">
+            <a:spAutoFit/>
+          </a:bodyPr>
+          <a:lstStyle/>
+          <a:p>
+            <a:pPr eaLnBrk="1" hangingPunct="1"/>
+            <a:r>
+              <a:rPr lang="de-DE" sz="900" dirty="0" err="1">
+                <a:latin typeface="Arial" charset="0"/>
+              </a:rPr>
+              <a:t>apply</a:t>
+            </a:r>
+            <a:r>
+              <a:rPr lang="de-DE" sz="900" dirty="0">
+                <a:latin typeface="Arial" charset="0"/>
+              </a:rPr>
+              <a:t> </a:t>
+            </a:r>
+            <a:r>
+              <a:rPr lang="de-DE" sz="900" dirty="0" err="1">
+                <a:latin typeface="Arial" charset="0"/>
+              </a:rPr>
+              <a:t>resources</a:t>
+            </a:r>
+            <a:endParaRPr lang="de-DE" sz="900" dirty="0">
+              <a:latin typeface="Arial" charset="0"/>
+            </a:endParaRPr>
+          </a:p>
+        </p:txBody>
+      </p:sp>
+      <p:sp>
+        <p:nvSpPr>
+          <p:cNvPr id="61" name="Textfeld 60">
+            <a:extLst>
+              <a:ext uri="{FF2B5EF4-FFF2-40B4-BE49-F238E27FC236}">
+                <a16:creationId xmlns:a16="http://schemas.microsoft.com/office/drawing/2014/main" id="{9182B122-B331-0E6B-8456-18A31B69EB28}"/>
+              </a:ext>
+            </a:extLst>
+          </p:cNvPr>
+          <p:cNvSpPr txBox="1"/>
+          <p:nvPr/>
+        </p:nvSpPr>
+        <p:spPr bwMode="auto">
+          <a:xfrm>
+            <a:off x="5124508" y="4380362"/>
+            <a:ext cx="997429" cy="230832"/>
+          </a:xfrm>
+          <a:prstGeom prst="rect">
+            <a:avLst/>
+          </a:prstGeom>
+          <a:noFill/>
+          <a:ln w="9525">
+            <a:noFill/>
+            <a:miter lim="800000"/>
+            <a:headEnd/>
+            <a:tailEnd/>
+          </a:ln>
+        </p:spPr>
+        <p:txBody>
+          <a:bodyPr wrap="square" rtlCol="0" anchor="ctr">
+            <a:spAutoFit/>
+          </a:bodyPr>
+          <a:lstStyle/>
+          <a:p>
+            <a:pPr eaLnBrk="1" hangingPunct="1"/>
+            <a:r>
+              <a:rPr lang="de-DE" sz="900" dirty="0" err="1">
+                <a:latin typeface="Arial" charset="0"/>
+              </a:rPr>
+              <a:t>create</a:t>
+            </a:r>
+            <a:r>
+              <a:rPr lang="de-DE" sz="900" dirty="0">
+                <a:latin typeface="Arial" charset="0"/>
+              </a:rPr>
+              <a:t>/manage</a:t>
+            </a:r>
+          </a:p>
+        </p:txBody>
+      </p:sp>
+      <p:sp>
+        <p:nvSpPr>
+          <p:cNvPr id="62" name="Textfeld 61">
+            <a:extLst>
+              <a:ext uri="{FF2B5EF4-FFF2-40B4-BE49-F238E27FC236}">
+                <a16:creationId xmlns:a16="http://schemas.microsoft.com/office/drawing/2014/main" id="{7C09D4A5-2D70-ECC2-CEF7-ED9B6AD265E2}"/>
+              </a:ext>
+            </a:extLst>
+          </p:cNvPr>
+          <p:cNvSpPr txBox="1"/>
+          <p:nvPr/>
+        </p:nvSpPr>
+        <p:spPr bwMode="auto">
+          <a:xfrm>
+            <a:off x="5126205" y="5145738"/>
+            <a:ext cx="1022491" cy="230832"/>
+          </a:xfrm>
+          <a:prstGeom prst="rect">
+            <a:avLst/>
+          </a:prstGeom>
+          <a:noFill/>
+          <a:ln w="9525">
+            <a:noFill/>
+            <a:miter lim="800000"/>
+            <a:headEnd/>
+            <a:tailEnd/>
+          </a:ln>
+        </p:spPr>
+        <p:txBody>
+          <a:bodyPr wrap="square" rtlCol="0" anchor="ctr">
+            <a:spAutoFit/>
+          </a:bodyPr>
+          <a:lstStyle/>
+          <a:p>
+            <a:pPr eaLnBrk="1" hangingPunct="1"/>
+            <a:r>
+              <a:rPr lang="de-DE" sz="900" dirty="0" err="1">
+                <a:latin typeface="Arial" charset="0"/>
+              </a:rPr>
+              <a:t>create</a:t>
+            </a:r>
+            <a:r>
+              <a:rPr lang="de-DE" sz="900" dirty="0">
+                <a:latin typeface="Arial" charset="0"/>
+              </a:rPr>
+              <a:t>/manage</a:t>
+            </a:r>
+          </a:p>
+        </p:txBody>
+      </p:sp>
+      <p:sp>
+        <p:nvSpPr>
+          <p:cNvPr id="63" name="Textfeld 62">
+            <a:extLst>
+              <a:ext uri="{FF2B5EF4-FFF2-40B4-BE49-F238E27FC236}">
+                <a16:creationId xmlns:a16="http://schemas.microsoft.com/office/drawing/2014/main" id="{650669A8-5113-85BC-BB68-FAF6B41D522F}"/>
+              </a:ext>
+            </a:extLst>
+          </p:cNvPr>
+          <p:cNvSpPr txBox="1"/>
+          <p:nvPr/>
+        </p:nvSpPr>
+        <p:spPr bwMode="auto">
+          <a:xfrm>
+            <a:off x="7034552" y="4353011"/>
+            <a:ext cx="1785597" cy="230832"/>
+          </a:xfrm>
+          <a:prstGeom prst="rect">
+            <a:avLst/>
+          </a:prstGeom>
+          <a:noFill/>
+          <a:ln w="9525">
+            <a:noFill/>
+            <a:miter lim="800000"/>
+            <a:headEnd/>
+            <a:tailEnd/>
+          </a:ln>
+        </p:spPr>
+        <p:txBody>
+          <a:bodyPr wrap="square" rtlCol="0" anchor="ctr">
+            <a:spAutoFit/>
+          </a:bodyPr>
+          <a:lstStyle/>
+          <a:p>
+            <a:pPr eaLnBrk="1" hangingPunct="1"/>
+            <a:r>
+              <a:rPr lang="de-DE" sz="900" dirty="0" err="1">
+                <a:latin typeface="Arial" charset="0"/>
+              </a:rPr>
+              <a:t>create</a:t>
+            </a:r>
+            <a:r>
+              <a:rPr lang="de-DE" sz="900" dirty="0">
+                <a:latin typeface="Arial" charset="0"/>
+              </a:rPr>
+              <a:t>: </a:t>
+            </a:r>
+            <a:r>
+              <a:rPr lang="de-DE" sz="900" dirty="0" err="1">
+                <a:latin typeface="Arial" charset="0"/>
+              </a:rPr>
+              <a:t>clusters</a:t>
+            </a:r>
+            <a:r>
+              <a:rPr lang="de-DE" sz="900" dirty="0">
+                <a:latin typeface="Arial" charset="0"/>
+              </a:rPr>
+              <a:t> / VMs / </a:t>
+            </a:r>
+            <a:r>
+              <a:rPr lang="de-DE" sz="900" dirty="0" err="1">
+                <a:latin typeface="Arial" charset="0"/>
+              </a:rPr>
+              <a:t>metal</a:t>
+            </a:r>
+            <a:endParaRPr lang="de-DE" sz="900" dirty="0">
+              <a:latin typeface="Arial" charset="0"/>
+            </a:endParaRPr>
+          </a:p>
+        </p:txBody>
+      </p:sp>
+      <p:sp>
+        <p:nvSpPr>
+          <p:cNvPr id="64" name="Textfeld 63">
+            <a:extLst>
+              <a:ext uri="{FF2B5EF4-FFF2-40B4-BE49-F238E27FC236}">
+                <a16:creationId xmlns:a16="http://schemas.microsoft.com/office/drawing/2014/main" id="{A2DB3F06-ABDD-EA78-36C4-C372056F5FC5}"/>
+              </a:ext>
+            </a:extLst>
+          </p:cNvPr>
+          <p:cNvSpPr txBox="1"/>
+          <p:nvPr/>
+        </p:nvSpPr>
+        <p:spPr bwMode="auto">
+          <a:xfrm>
+            <a:off x="6517156" y="5197979"/>
+            <a:ext cx="1022491" cy="369332"/>
+          </a:xfrm>
+          <a:prstGeom prst="rect">
+            <a:avLst/>
+          </a:prstGeom>
+          <a:noFill/>
+          <a:ln w="9525">
+            <a:noFill/>
+            <a:miter lim="800000"/>
+            <a:headEnd/>
+            <a:tailEnd/>
+          </a:ln>
+        </p:spPr>
+        <p:txBody>
+          <a:bodyPr wrap="square" rtlCol="0" anchor="ctr">
+            <a:spAutoFit/>
+          </a:bodyPr>
+          <a:lstStyle/>
+          <a:p>
+            <a:pPr algn="ctr" eaLnBrk="1" hangingPunct="1"/>
+            <a:r>
+              <a:rPr lang="de-DE" sz="900" dirty="0">
+                <a:latin typeface="Arial" charset="0"/>
+              </a:rPr>
+              <a:t>Infrastructure </a:t>
+            </a:r>
+            <a:r>
+              <a:rPr lang="de-DE" sz="900" dirty="0" err="1">
+                <a:latin typeface="Arial" charset="0"/>
+              </a:rPr>
+              <a:t>providers</a:t>
+            </a:r>
+            <a:endParaRPr lang="de-DE" sz="900" dirty="0">
+              <a:latin typeface="Arial" charset="0"/>
+            </a:endParaRPr>
+          </a:p>
+        </p:txBody>
+      </p:sp>
+    </p:spTree>
+    <p:extLst>
+      <p:ext uri="{BB962C8B-B14F-4D97-AF65-F5344CB8AC3E}">
+        <p14:creationId xmlns:p14="http://schemas.microsoft.com/office/powerpoint/2010/main" val="829651483"/>
+      </p:ext>
+    </p:extLst>
+  </p:cSld>
+  <p:clrMapOvr>
+    <a:masterClrMapping/>
+  </p:clrMapOvr>
+  <p:timing>
+    <p:tnLst>
+      <p:par>
+        <p:cTn id="1" dur="indefinite" restart="never" nodeType="tmRoot">
+          <p:childTnLst>
+            <p:seq concurrent="1" nextAc="seek">
+              <p:cTn id="2" dur="indefinite" nodeType="mainSeq">
+                <p:childTnLst>
+                  <p:par>
+                    <p:cTn id="3" fill="hold">
+                      <p:stCondLst>
+                        <p:cond delay="indefinite"/>
+                        <p:cond evt="onBegin" delay="0">
+                          <p:tn val="2"/>
+                        </p:cond>
+                      </p:stCondLst>
+                      <p:childTnLst>
+                        <p:par>
+                          <p:cTn id="4" fill="hold">
+                            <p:stCondLst>
+                              <p:cond delay="0"/>
+                            </p:stCondLst>
+                            <p:childTnLst>
+                              <p:par>
+                                <p:cTn id="5" presetID="1" presetClass="entr" presetSubtype="0" fill="hold" grpId="0" nodeType="withEffect">
+                                  <p:stCondLst>
+                                    <p:cond delay="0"/>
+                                  </p:stCondLst>
+                                  <p:childTnLst>
+                                    <p:set>
+                                      <p:cBhvr>
+                                        <p:cTn id="6" dur="1" fill="hold">
+                                          <p:stCondLst>
+                                            <p:cond delay="0"/>
+                                          </p:stCondLst>
+                                        </p:cTn>
+                                        <p:tgtEl>
+                                          <p:spTgt spid="5"/>
+                                        </p:tgtEl>
+                                        <p:attrNameLst>
+                                          <p:attrName>style.visibility</p:attrName>
+                                        </p:attrNameLst>
+                                      </p:cBhvr>
+                                      <p:to>
+                                        <p:strVal val="visible"/>
+                                      </p:to>
+                                    </p:set>
+                                  </p:childTnLst>
+                                </p:cTn>
+                              </p:par>
+                              <p:par>
+                                <p:cTn id="7" presetID="1" presetClass="entr" presetSubtype="0" fill="hold" nodeType="withEffect">
+                                  <p:stCondLst>
+                                    <p:cond delay="0"/>
+                                  </p:stCondLst>
+                                  <p:childTnLst>
+                                    <p:set>
+                                      <p:cBhvr>
+                                        <p:cTn id="8" dur="1" fill="hold">
+                                          <p:stCondLst>
+                                            <p:cond delay="0"/>
+                                          </p:stCondLst>
+                                        </p:cTn>
+                                        <p:tgtEl>
+                                          <p:spTgt spid="6"/>
+                                        </p:tgtEl>
+                                        <p:attrNameLst>
+                                          <p:attrName>style.visibility</p:attrName>
+                                        </p:attrNameLst>
+                                      </p:cBhvr>
+                                      <p:to>
+                                        <p:strVal val="visible"/>
+                                      </p:to>
+                                    </p:set>
+                                  </p:childTnLst>
+                                </p:cTn>
+                              </p:par>
+                            </p:childTnLst>
+                          </p:cTn>
+                        </p:par>
+                      </p:childTnLst>
+                    </p:cTn>
+                  </p:par>
+                  <p:par>
+                    <p:cTn id="9" fill="hold">
+                      <p:stCondLst>
+                        <p:cond delay="indefinite"/>
+                      </p:stCondLst>
+                      <p:childTnLst>
+                        <p:par>
+                          <p:cTn id="10" fill="hold">
+                            <p:stCondLst>
+                              <p:cond delay="0"/>
+                            </p:stCondLst>
+                            <p:childTnLst>
+                              <p:par>
+                                <p:cTn id="11" presetID="1" presetClass="entr" presetSubtype="0" fill="hold" nodeType="clickEffect">
+                                  <p:stCondLst>
+                                    <p:cond delay="0"/>
+                                  </p:stCondLst>
+                                  <p:childTnLst>
+                                    <p:set>
+                                      <p:cBhvr>
+                                        <p:cTn id="12" dur="1" fill="hold">
+                                          <p:stCondLst>
+                                            <p:cond delay="0"/>
+                                          </p:stCondLst>
+                                        </p:cTn>
+                                        <p:tgtEl>
+                                          <p:spTgt spid="9"/>
+                                        </p:tgtEl>
+                                        <p:attrNameLst>
+                                          <p:attrName>style.visibility</p:attrName>
+                                        </p:attrNameLst>
+                                      </p:cBhvr>
+                                      <p:to>
+                                        <p:strVal val="visible"/>
+                                      </p:to>
+                                    </p:set>
+                                  </p:childTnLst>
+                                </p:cTn>
+                              </p:par>
+                              <p:par>
+                                <p:cTn id="13" presetID="1" presetClass="entr" presetSubtype="0" fill="hold" grpId="0" nodeType="withEffect">
+                                  <p:stCondLst>
+                                    <p:cond delay="0"/>
+                                  </p:stCondLst>
+                                  <p:childTnLst>
+                                    <p:set>
+                                      <p:cBhvr>
+                                        <p:cTn id="14" dur="1" fill="hold">
+                                          <p:stCondLst>
+                                            <p:cond delay="0"/>
+                                          </p:stCondLst>
+                                        </p:cTn>
+                                        <p:tgtEl>
+                                          <p:spTgt spid="4"/>
+                                        </p:tgtEl>
+                                        <p:attrNameLst>
+                                          <p:attrName>style.visibility</p:attrName>
+                                        </p:attrNameLst>
+                                      </p:cBhvr>
+                                      <p:to>
+                                        <p:strVal val="visible"/>
+                                      </p:to>
+                                    </p:set>
+                                  </p:childTnLst>
+                                </p:cTn>
+                              </p:par>
+                              <p:par>
+                                <p:cTn id="15" presetID="1" presetClass="entr" presetSubtype="0" fill="hold" grpId="0" nodeType="withEffect">
+                                  <p:stCondLst>
+                                    <p:cond delay="0"/>
+                                  </p:stCondLst>
+                                  <p:childTnLst>
+                                    <p:set>
+                                      <p:cBhvr>
+                                        <p:cTn id="16" dur="1" fill="hold">
+                                          <p:stCondLst>
+                                            <p:cond delay="0"/>
+                                          </p:stCondLst>
+                                        </p:cTn>
+                                        <p:tgtEl>
+                                          <p:spTgt spid="8"/>
+                                        </p:tgtEl>
+                                        <p:attrNameLst>
+                                          <p:attrName>style.visibility</p:attrName>
+                                        </p:attrNameLst>
+                                      </p:cBhvr>
+                                      <p:to>
+                                        <p:strVal val="visible"/>
+                                      </p:to>
+                                    </p:set>
+                                  </p:childTnLst>
+                                </p:cTn>
+                              </p:par>
+                              <p:par>
+                                <p:cTn id="17" presetID="1" presetClass="entr" presetSubtype="0" fill="hold" nodeType="withEffect">
+                                  <p:stCondLst>
+                                    <p:cond delay="0"/>
+                                  </p:stCondLst>
+                                  <p:childTnLst>
+                                    <p:set>
+                                      <p:cBhvr>
+                                        <p:cTn id="18" dur="1" fill="hold">
+                                          <p:stCondLst>
+                                            <p:cond delay="0"/>
+                                          </p:stCondLst>
+                                        </p:cTn>
+                                        <p:tgtEl>
+                                          <p:spTgt spid="7"/>
+                                        </p:tgtEl>
+                                        <p:attrNameLst>
+                                          <p:attrName>style.visibility</p:attrName>
+                                        </p:attrNameLst>
+                                      </p:cBhvr>
+                                      <p:to>
+                                        <p:strVal val="visible"/>
+                                      </p:to>
+                                    </p:set>
+                                  </p:childTnLst>
+                                </p:cTn>
+                              </p:par>
+                              <p:par>
+                                <p:cTn id="19" presetID="1" presetClass="entr" presetSubtype="0" fill="hold" grpId="0" nodeType="withEffect">
+                                  <p:stCondLst>
+                                    <p:cond delay="0"/>
+                                  </p:stCondLst>
+                                  <p:childTnLst>
+                                    <p:set>
+                                      <p:cBhvr>
+                                        <p:cTn id="20" dur="1" fill="hold">
+                                          <p:stCondLst>
+                                            <p:cond delay="0"/>
+                                          </p:stCondLst>
+                                        </p:cTn>
+                                        <p:tgtEl>
+                                          <p:spTgt spid="11"/>
+                                        </p:tgtEl>
+                                        <p:attrNameLst>
+                                          <p:attrName>style.visibility</p:attrName>
+                                        </p:attrNameLst>
+                                      </p:cBhvr>
+                                      <p:to>
+                                        <p:strVal val="visible"/>
+                                      </p:to>
+                                    </p:set>
+                                  </p:childTnLst>
+                                </p:cTn>
+                              </p:par>
+                              <p:par>
+                                <p:cTn id="21" presetID="1" presetClass="entr" presetSubtype="0" fill="hold" nodeType="withEffect">
+                                  <p:stCondLst>
+                                    <p:cond delay="0"/>
+                                  </p:stCondLst>
+                                  <p:childTnLst>
+                                    <p:set>
+                                      <p:cBhvr>
+                                        <p:cTn id="22" dur="1" fill="hold">
+                                          <p:stCondLst>
+                                            <p:cond delay="0"/>
+                                          </p:stCondLst>
+                                        </p:cTn>
+                                        <p:tgtEl>
+                                          <p:spTgt spid="13"/>
+                                        </p:tgtEl>
+                                        <p:attrNameLst>
+                                          <p:attrName>style.visibility</p:attrName>
+                                        </p:attrNameLst>
+                                      </p:cBhvr>
+                                      <p:to>
+                                        <p:strVal val="visible"/>
+                                      </p:to>
+                                    </p:set>
+                                  </p:childTnLst>
+                                </p:cTn>
+                              </p:par>
+                            </p:childTnLst>
+                          </p:cTn>
+                        </p:par>
+                      </p:childTnLst>
+                    </p:cTn>
+                  </p:par>
+                  <p:par>
+                    <p:cTn id="23" fill="hold">
+                      <p:stCondLst>
+                        <p:cond delay="indefinite"/>
+                      </p:stCondLst>
+                      <p:childTnLst>
+                        <p:par>
+                          <p:cTn id="24" fill="hold">
+                            <p:stCondLst>
+                              <p:cond delay="0"/>
+                            </p:stCondLst>
+                            <p:childTnLst>
+                              <p:par>
+                                <p:cTn id="25" presetID="1" presetClass="entr" presetSubtype="0" fill="hold" nodeType="clickEffect">
+                                  <p:stCondLst>
+                                    <p:cond delay="0"/>
+                                  </p:stCondLst>
+                                  <p:childTnLst>
+                                    <p:set>
+                                      <p:cBhvr>
+                                        <p:cTn id="26" dur="1" fill="hold">
+                                          <p:stCondLst>
+                                            <p:cond delay="0"/>
+                                          </p:stCondLst>
+                                        </p:cTn>
+                                        <p:tgtEl>
+                                          <p:spTgt spid="27"/>
+                                        </p:tgtEl>
+                                        <p:attrNameLst>
+                                          <p:attrName>style.visibility</p:attrName>
+                                        </p:attrNameLst>
+                                      </p:cBhvr>
+                                      <p:to>
+                                        <p:strVal val="visible"/>
+                                      </p:to>
+                                    </p:set>
+                                  </p:childTnLst>
+                                </p:cTn>
+                              </p:par>
+                              <p:par>
+                                <p:cTn id="27" presetID="1" presetClass="entr" presetSubtype="0" fill="hold" grpId="0" nodeType="withEffect">
+                                  <p:stCondLst>
+                                    <p:cond delay="0"/>
+                                  </p:stCondLst>
+                                  <p:childTnLst>
+                                    <p:set>
+                                      <p:cBhvr>
+                                        <p:cTn id="28" dur="1" fill="hold">
+                                          <p:stCondLst>
+                                            <p:cond delay="0"/>
+                                          </p:stCondLst>
+                                        </p:cTn>
+                                        <p:tgtEl>
+                                          <p:spTgt spid="26"/>
+                                        </p:tgtEl>
+                                        <p:attrNameLst>
+                                          <p:attrName>style.visibility</p:attrName>
+                                        </p:attrNameLst>
+                                      </p:cBhvr>
+                                      <p:to>
+                                        <p:strVal val="visible"/>
+                                      </p:to>
+                                    </p:set>
+                                  </p:childTnLst>
+                                </p:cTn>
+                              </p:par>
+                              <p:par>
+                                <p:cTn id="29" presetID="1" presetClass="entr" presetSubtype="0" fill="hold" grpId="0" nodeType="withEffect">
+                                  <p:stCondLst>
+                                    <p:cond delay="0"/>
+                                  </p:stCondLst>
+                                  <p:childTnLst>
+                                    <p:set>
+                                      <p:cBhvr>
+                                        <p:cTn id="30" dur="1" fill="hold">
+                                          <p:stCondLst>
+                                            <p:cond delay="0"/>
+                                          </p:stCondLst>
+                                        </p:cTn>
+                                        <p:tgtEl>
+                                          <p:spTgt spid="28"/>
+                                        </p:tgtEl>
+                                        <p:attrNameLst>
+                                          <p:attrName>style.visibility</p:attrName>
+                                        </p:attrNameLst>
+                                      </p:cBhvr>
+                                      <p:to>
+                                        <p:strVal val="visible"/>
+                                      </p:to>
+                                    </p:set>
+                                  </p:childTnLst>
+                                </p:cTn>
+                              </p:par>
+                              <p:par>
+                                <p:cTn id="31" presetID="1" presetClass="entr" presetSubtype="0" fill="hold" grpId="0" nodeType="withEffect">
+                                  <p:stCondLst>
+                                    <p:cond delay="0"/>
+                                  </p:stCondLst>
+                                  <p:childTnLst>
+                                    <p:set>
+                                      <p:cBhvr>
+                                        <p:cTn id="32" dur="1" fill="hold">
+                                          <p:stCondLst>
+                                            <p:cond delay="0"/>
+                                          </p:stCondLst>
+                                        </p:cTn>
+                                        <p:tgtEl>
+                                          <p:spTgt spid="30"/>
+                                        </p:tgtEl>
+                                        <p:attrNameLst>
+                                          <p:attrName>style.visibility</p:attrName>
+                                        </p:attrNameLst>
+                                      </p:cBhvr>
+                                      <p:to>
+                                        <p:strVal val="visible"/>
+                                      </p:to>
+                                    </p:set>
+                                  </p:childTnLst>
+                                </p:cTn>
+                              </p:par>
+                              <p:par>
+                                <p:cTn id="33" presetID="1" presetClass="entr" presetSubtype="0" fill="hold" nodeType="withEffect">
+                                  <p:stCondLst>
+                                    <p:cond delay="0"/>
+                                  </p:stCondLst>
+                                  <p:childTnLst>
+                                    <p:set>
+                                      <p:cBhvr>
+                                        <p:cTn id="34" dur="1" fill="hold">
+                                          <p:stCondLst>
+                                            <p:cond delay="0"/>
+                                          </p:stCondLst>
+                                        </p:cTn>
+                                        <p:tgtEl>
+                                          <p:spTgt spid="34"/>
+                                        </p:tgtEl>
+                                        <p:attrNameLst>
+                                          <p:attrName>style.visibility</p:attrName>
+                                        </p:attrNameLst>
+                                      </p:cBhvr>
+                                      <p:to>
+                                        <p:strVal val="visible"/>
+                                      </p:to>
+                                    </p:set>
+                                  </p:childTnLst>
+                                </p:cTn>
+                              </p:par>
+                              <p:par>
+                                <p:cTn id="35" presetID="1" presetClass="entr" presetSubtype="0" fill="hold" grpId="0" nodeType="withEffect">
+                                  <p:stCondLst>
+                                    <p:cond delay="0"/>
+                                  </p:stCondLst>
+                                  <p:childTnLst>
+                                    <p:set>
+                                      <p:cBhvr>
+                                        <p:cTn id="36" dur="1" fill="hold">
+                                          <p:stCondLst>
+                                            <p:cond delay="0"/>
+                                          </p:stCondLst>
+                                        </p:cTn>
+                                        <p:tgtEl>
+                                          <p:spTgt spid="57"/>
+                                        </p:tgtEl>
+                                        <p:attrNameLst>
+                                          <p:attrName>style.visibility</p:attrName>
+                                        </p:attrNameLst>
+                                      </p:cBhvr>
+                                      <p:to>
+                                        <p:strVal val="visible"/>
+                                      </p:to>
+                                    </p:set>
+                                  </p:childTnLst>
+                                </p:cTn>
+                              </p:par>
+                              <p:par>
+                                <p:cTn id="37" presetID="1" presetClass="entr" presetSubtype="0" fill="hold" grpId="0" nodeType="withEffect">
+                                  <p:stCondLst>
+                                    <p:cond delay="0"/>
+                                  </p:stCondLst>
+                                  <p:childTnLst>
+                                    <p:set>
+                                      <p:cBhvr>
+                                        <p:cTn id="38" dur="1" fill="hold">
+                                          <p:stCondLst>
+                                            <p:cond delay="0"/>
+                                          </p:stCondLst>
+                                        </p:cTn>
+                                        <p:tgtEl>
+                                          <p:spTgt spid="58"/>
+                                        </p:tgtEl>
+                                        <p:attrNameLst>
+                                          <p:attrName>style.visibility</p:attrName>
+                                        </p:attrNameLst>
+                                      </p:cBhvr>
+                                      <p:to>
+                                        <p:strVal val="visible"/>
+                                      </p:to>
+                                    </p:set>
+                                  </p:childTnLst>
+                                </p:cTn>
+                              </p:par>
+                              <p:par>
+                                <p:cTn id="39" presetID="1" presetClass="entr" presetSubtype="0" fill="hold" grpId="0" nodeType="withEffect">
+                                  <p:stCondLst>
+                                    <p:cond delay="0"/>
+                                  </p:stCondLst>
+                                  <p:childTnLst>
+                                    <p:set>
+                                      <p:cBhvr>
+                                        <p:cTn id="40" dur="1" fill="hold">
+                                          <p:stCondLst>
+                                            <p:cond delay="0"/>
+                                          </p:stCondLst>
+                                        </p:cTn>
+                                        <p:tgtEl>
+                                          <p:spTgt spid="59"/>
+                                        </p:tgtEl>
+                                        <p:attrNameLst>
+                                          <p:attrName>style.visibility</p:attrName>
+                                        </p:attrNameLst>
+                                      </p:cBhvr>
+                                      <p:to>
+                                        <p:strVal val="visible"/>
+                                      </p:to>
+                                    </p:set>
+                                  </p:childTnLst>
+                                </p:cTn>
+                              </p:par>
+                              <p:par>
+                                <p:cTn id="41" presetID="1" presetClass="entr" presetSubtype="0" fill="hold" grpId="0" nodeType="withEffect">
+                                  <p:stCondLst>
+                                    <p:cond delay="0"/>
+                                  </p:stCondLst>
+                                  <p:childTnLst>
+                                    <p:set>
+                                      <p:cBhvr>
+                                        <p:cTn id="42" dur="1" fill="hold">
+                                          <p:stCondLst>
+                                            <p:cond delay="0"/>
+                                          </p:stCondLst>
+                                        </p:cTn>
+                                        <p:tgtEl>
+                                          <p:spTgt spid="60"/>
+                                        </p:tgtEl>
+                                        <p:attrNameLst>
+                                          <p:attrName>style.visibility</p:attrName>
+                                        </p:attrNameLst>
+                                      </p:cBhvr>
+                                      <p:to>
+                                        <p:strVal val="visible"/>
+                                      </p:to>
+                                    </p:set>
+                                  </p:childTnLst>
+                                </p:cTn>
+                              </p:par>
+                              <p:par>
+                                <p:cTn id="43" presetID="1" presetClass="entr" presetSubtype="0" fill="hold" grpId="0" nodeType="withEffect">
+                                  <p:stCondLst>
+                                    <p:cond delay="0"/>
+                                  </p:stCondLst>
+                                  <p:childTnLst>
+                                    <p:set>
+                                      <p:cBhvr>
+                                        <p:cTn id="44" dur="1" fill="hold">
+                                          <p:stCondLst>
+                                            <p:cond delay="0"/>
+                                          </p:stCondLst>
+                                        </p:cTn>
+                                        <p:tgtEl>
+                                          <p:spTgt spid="61"/>
+                                        </p:tgtEl>
+                                        <p:attrNameLst>
+                                          <p:attrName>style.visibility</p:attrName>
+                                        </p:attrNameLst>
+                                      </p:cBhvr>
+                                      <p:to>
+                                        <p:strVal val="visible"/>
+                                      </p:to>
+                                    </p:set>
+                                  </p:childTnLst>
+                                </p:cTn>
+                              </p:par>
+                              <p:par>
+                                <p:cTn id="45" presetID="1" presetClass="entr" presetSubtype="0" fill="hold" grpId="0" nodeType="withEffect">
+                                  <p:stCondLst>
+                                    <p:cond delay="0"/>
+                                  </p:stCondLst>
+                                  <p:childTnLst>
+                                    <p:set>
+                                      <p:cBhvr>
+                                        <p:cTn id="46" dur="1" fill="hold">
+                                          <p:stCondLst>
+                                            <p:cond delay="0"/>
+                                          </p:stCondLst>
+                                        </p:cTn>
+                                        <p:tgtEl>
+                                          <p:spTgt spid="62"/>
+                                        </p:tgtEl>
+                                        <p:attrNameLst>
+                                          <p:attrName>style.visibility</p:attrName>
+                                        </p:attrNameLst>
+                                      </p:cBhvr>
+                                      <p:to>
+                                        <p:strVal val="visible"/>
+                                      </p:to>
+                                    </p:set>
+                                  </p:childTnLst>
+                                </p:cTn>
+                              </p:par>
+                              <p:par>
+                                <p:cTn id="47" presetID="1" presetClass="entr" presetSubtype="0" fill="hold" grpId="0" nodeType="withEffect">
+                                  <p:stCondLst>
+                                    <p:cond delay="0"/>
+                                  </p:stCondLst>
+                                  <p:childTnLst>
+                                    <p:set>
+                                      <p:cBhvr>
+                                        <p:cTn id="48" dur="1" fill="hold">
+                                          <p:stCondLst>
+                                            <p:cond delay="0"/>
+                                          </p:stCondLst>
+                                        </p:cTn>
+                                        <p:tgtEl>
+                                          <p:spTgt spid="63"/>
+                                        </p:tgtEl>
+                                        <p:attrNameLst>
+                                          <p:attrName>style.visibility</p:attrName>
+                                        </p:attrNameLst>
+                                      </p:cBhvr>
+                                      <p:to>
+                                        <p:strVal val="visible"/>
+                                      </p:to>
+                                    </p:set>
+                                  </p:childTnLst>
+                                </p:cTn>
+                              </p:par>
+                              <p:par>
+                                <p:cTn id="49" presetID="1" presetClass="entr" presetSubtype="0" fill="hold" grpId="0" nodeType="withEffect">
+                                  <p:stCondLst>
+                                    <p:cond delay="0"/>
+                                  </p:stCondLst>
+                                  <p:childTnLst>
+                                    <p:set>
+                                      <p:cBhvr>
+                                        <p:cTn id="50" dur="1" fill="hold">
+                                          <p:stCondLst>
+                                            <p:cond delay="0"/>
+                                          </p:stCondLst>
+                                        </p:cTn>
+                                        <p:tgtEl>
+                                          <p:spTgt spid="64"/>
+                                        </p:tgtEl>
+                                        <p:attrNameLst>
+                                          <p:attrName>style.visibility</p:attrName>
+                                        </p:attrNameLst>
+                                      </p:cBhvr>
+                                      <p:to>
+                                        <p:strVal val="visible"/>
+                                      </p:to>
+                                    </p:set>
+                                  </p:childTnLst>
+                                </p:cTn>
+                              </p:par>
+                            </p:childTnLst>
+                          </p:cTn>
+                        </p:par>
+                      </p:childTnLst>
+                    </p:cTn>
+                  </p:par>
+                </p:childTnLst>
+              </p:cTn>
+              <p:prevCondLst>
+                <p:cond evt="onPrev" delay="0">
+                  <p:tgtEl>
+                    <p:sldTgt/>
+                  </p:tgtEl>
+                </p:cond>
+              </p:prevCondLst>
+              <p:nextCondLst>
+                <p:cond evt="onNext" delay="0">
+                  <p:tgtEl>
+                    <p:sldTgt/>
+                  </p:tgtEl>
+                </p:cond>
+              </p:nextCondLst>
+            </p:seq>
+          </p:childTnLst>
+        </p:cTn>
+      </p:par>
+    </p:tnLst>
+    <p:bldLst>
+      <p:bldP spid="4" grpId="0" animBg="1"/>
+      <p:bldP spid="5" grpId="0" animBg="1"/>
+      <p:bldP spid="8" grpId="0"/>
+      <p:bldP spid="11" grpId="0" animBg="1"/>
+      <p:bldP spid="26" grpId="0" animBg="1"/>
+      <p:bldP spid="28" grpId="0" animBg="1"/>
+      <p:bldP spid="30" grpId="0" animBg="1"/>
+      <p:bldP spid="57" grpId="0"/>
+      <p:bldP spid="58" grpId="0"/>
+      <p:bldP spid="59" grpId="0"/>
+      <p:bldP spid="60" grpId="0"/>
+      <p:bldP spid="61" grpId="0"/>
+      <p:bldP spid="62" grpId="0"/>
+      <p:bldP spid="63" grpId="0"/>
+      <p:bldP spid="64" grpId="0"/>
+    </p:bldLst>
+  </p:timing>
+</p:sld>
+</file>
+
+<file path=ppt/slides/slide25.xml><?xml version="1.0" encoding="utf-8"?>
 <p:sld xmlns:a="http://schemas.openxmlformats.org/drawingml/2006/main" xmlns:r="http://schemas.openxmlformats.org/officeDocument/2006/relationships" xmlns:p="http://schemas.openxmlformats.org/presentationml/2006/main">
   <p:cSld>
     <p:spTree>
@@ -9726,12 +14084,109 @@
             </a:pPr>
             <a:r>
               <a:rPr lang="de-DE" dirty="0"/>
+              <a:t>Einsatzbereiche</a:t>
+            </a:r>
+          </a:p>
+        </p:txBody>
+      </p:sp>
+    </p:spTree>
+    <p:extLst>
+      <p:ext uri="{BB962C8B-B14F-4D97-AF65-F5344CB8AC3E}">
+        <p14:creationId xmlns:p14="http://schemas.microsoft.com/office/powerpoint/2010/main" val="350845558"/>
+      </p:ext>
+    </p:extLst>
+  </p:cSld>
+  <p:clrMapOvr>
+    <a:masterClrMapping/>
+  </p:clrMapOvr>
+</p:sld>
+</file>
+
+<file path=ppt/slides/slide26.xml><?xml version="1.0" encoding="utf-8"?>
+<p:sld xmlns:a="http://schemas.openxmlformats.org/drawingml/2006/main" xmlns:r="http://schemas.openxmlformats.org/officeDocument/2006/relationships" xmlns:p="http://schemas.openxmlformats.org/presentationml/2006/main">
+  <p:cSld>
+    <p:spTree>
+      <p:nvGrpSpPr>
+        <p:cNvPr id="1" name=""/>
+        <p:cNvGrpSpPr/>
+        <p:nvPr/>
+      </p:nvGrpSpPr>
+      <p:grpSpPr>
+        <a:xfrm>
+          <a:off x="0" y="0"/>
+          <a:ext cx="0" cy="0"/>
+          <a:chOff x="0" y="0"/>
+          <a:chExt cx="0" cy="0"/>
+        </a:xfrm>
+      </p:grpSpPr>
+      <p:sp>
+        <p:nvSpPr>
+          <p:cNvPr id="2" name="Titel 1">
+            <a:extLst>
+              <a:ext uri="{FF2B5EF4-FFF2-40B4-BE49-F238E27FC236}">
+                <a16:creationId xmlns:a16="http://schemas.microsoft.com/office/drawing/2014/main" id="{6852D978-9DF5-1E6A-F50B-0CA32EA8DAC7}"/>
+              </a:ext>
+            </a:extLst>
+          </p:cNvPr>
+          <p:cNvSpPr>
+            <a:spLocks noGrp="1"/>
+          </p:cNvSpPr>
+          <p:nvPr>
+            <p:ph type="title"/>
+          </p:nvPr>
+        </p:nvSpPr>
+        <p:spPr/>
+        <p:txBody>
+          <a:bodyPr/>
+          <a:lstStyle/>
+          <a:p>
+            <a:r>
+              <a:rPr lang="de-DE" dirty="0" err="1"/>
+              <a:t>GitOps</a:t>
+            </a:r>
+            <a:endParaRPr lang="de-DE" dirty="0"/>
+          </a:p>
+        </p:txBody>
+      </p:sp>
+      <p:sp>
+        <p:nvSpPr>
+          <p:cNvPr id="3" name="Inhaltsplatzhalter 2">
+            <a:extLst>
+              <a:ext uri="{FF2B5EF4-FFF2-40B4-BE49-F238E27FC236}">
+                <a16:creationId xmlns:a16="http://schemas.microsoft.com/office/drawing/2014/main" id="{81753C8B-5EF0-E49E-1FFB-0330FD2A3542}"/>
+              </a:ext>
+            </a:extLst>
+          </p:cNvPr>
+          <p:cNvSpPr>
+            <a:spLocks noGrp="1"/>
+          </p:cNvSpPr>
+          <p:nvPr>
+            <p:ph idx="1"/>
+          </p:nvPr>
+        </p:nvSpPr>
+        <p:spPr/>
+        <p:txBody>
+          <a:bodyPr/>
+          <a:lstStyle/>
+          <a:p>
+            <a:pPr marL="0" indent="0">
+              <a:buNone/>
+            </a:pPr>
+            <a:r>
+              <a:rPr lang="de-DE" dirty="0"/>
               <a:t>Best </a:t>
             </a:r>
             <a:r>
               <a:rPr lang="de-DE" dirty="0" err="1"/>
               <a:t>Practises</a:t>
             </a:r>
+            <a:endParaRPr lang="de-DE" dirty="0"/>
+          </a:p>
+          <a:p>
+            <a:pPr>
+              <a:buFont typeface="Arial" panose="020B0604020202020204" pitchFamily="34" charset="0"/>
+              <a:buChar char="•"/>
+            </a:pPr>
             <a:endParaRPr lang="de-DE" dirty="0"/>
           </a:p>
         </p:txBody>
@@ -9749,7 +14204,7 @@
 </p:sld>
 </file>
 
-<file path=ppt/slides/slide25.xml><?xml version="1.0" encoding="utf-8"?>
+<file path=ppt/slides/slide27.xml><?xml version="1.0" encoding="utf-8"?>
 <p:sld xmlns:a="http://schemas.openxmlformats.org/drawingml/2006/main" xmlns:r="http://schemas.openxmlformats.org/officeDocument/2006/relationships" xmlns:p="http://schemas.openxmlformats.org/presentationml/2006/main">
   <p:cSld>
     <p:spTree>

</xml_diff>

<commit_message>
Kleinigkeiten und Notizen ergänzt, Formatierungen angepasst
</commit_message>
<xml_diff>
--- a/slides/Tag-2_5-GitOps.pptx
+++ b/slides/Tag-2_5-GitOps.pptx
@@ -3263,7 +3263,103 @@
           <a:bodyPr/>
           <a:lstStyle/>
           <a:p>
+            <a:r>
+              <a:rPr lang="de-DE" dirty="0"/>
+              <a:t>Es gibt bei </a:t>
+            </a:r>
+            <a:r>
+              <a:rPr lang="de-DE" dirty="0" err="1"/>
+              <a:t>GitOps</a:t>
+            </a:r>
+            <a:r>
+              <a:rPr lang="de-DE" dirty="0"/>
+              <a:t> Operator die Möglichkeit, dass man den Operator automatisierte </a:t>
+            </a:r>
+            <a:r>
+              <a:rPr lang="de-DE" dirty="0" err="1"/>
+              <a:t>updates</a:t>
+            </a:r>
+            <a:r>
+              <a:rPr lang="de-DE" dirty="0"/>
+              <a:t> machen lässt</a:t>
+            </a:r>
+          </a:p>
+          <a:p>
+            <a:r>
+              <a:rPr lang="de-DE" dirty="0"/>
+              <a:t>- </a:t>
+            </a:r>
+            <a:r>
+              <a:rPr lang="de-DE" dirty="0" err="1"/>
+              <a:t>operator</a:t>
+            </a:r>
+            <a:r>
+              <a:rPr lang="de-DE" dirty="0"/>
+              <a:t> kann auf die </a:t>
+            </a:r>
+            <a:r>
+              <a:rPr lang="de-DE" dirty="0" err="1"/>
+              <a:t>container</a:t>
+            </a:r>
+            <a:r>
+              <a:rPr lang="de-DE" dirty="0"/>
+              <a:t> </a:t>
+            </a:r>
+            <a:r>
+              <a:rPr lang="de-DE" dirty="0" err="1"/>
+              <a:t>registry</a:t>
+            </a:r>
+            <a:r>
+              <a:rPr lang="de-DE" dirty="0"/>
+              <a:t> horchen (daher das +</a:t>
+            </a:r>
+            <a:r>
+              <a:rPr lang="de-DE" dirty="0" err="1"/>
+              <a:t>watch</a:t>
+            </a:r>
+            <a:r>
+              <a:rPr lang="de-DE" dirty="0"/>
+              <a:t>)</a:t>
+            </a:r>
+          </a:p>
+          <a:p>
+            <a:r>
+              <a:rPr lang="de-DE" dirty="0"/>
+              <a:t>- und danach dann das </a:t>
+            </a:r>
+            <a:r>
+              <a:rPr lang="de-DE" dirty="0" err="1"/>
+              <a:t>image</a:t>
+            </a:r>
+            <a:r>
+              <a:rPr lang="de-DE" dirty="0"/>
+              <a:t> zurück in </a:t>
+            </a:r>
+            <a:r>
+              <a:rPr lang="de-DE" dirty="0" err="1"/>
+              <a:t>git</a:t>
+            </a:r>
+            <a:r>
+              <a:rPr lang="de-DE" dirty="0"/>
+              <a:t> spielen (daher das +push)</a:t>
+            </a:r>
+          </a:p>
+          <a:p>
             <a:endParaRPr lang="de-DE" dirty="0"/>
+          </a:p>
+          <a:p>
+            <a:r>
+              <a:rPr lang="de-DE" dirty="0"/>
+              <a:t>Argo und </a:t>
+            </a:r>
+            <a:r>
+              <a:rPr lang="de-DE" dirty="0" err="1"/>
+              <a:t>Flux</a:t>
+            </a:r>
+            <a:r>
+              <a:rPr lang="de-DE" dirty="0"/>
+              <a:t> haben jeweils Konstrukte dafür. Hier eig. Nicht weiter relevant.</a:t>
+            </a:r>
           </a:p>
         </p:txBody>
       </p:sp>
@@ -5984,7 +6080,7 @@
               <a:pPr algn="ctr">
                 <a:defRPr/>
               </a:pPr>
-              <a:t>05.06.2024</a:t>
+              <a:t>06.06.2024</a:t>
             </a:fld>
             <a:endParaRPr lang="de-DE" sz="1000">
               <a:solidFill>
@@ -10236,23 +10332,23 @@
               <a:buChar char="•"/>
             </a:pPr>
             <a:r>
-              <a:rPr lang="de-DE" dirty="0"/>
+              <a:rPr lang="de-DE" sz="2000" dirty="0"/>
               <a:t>Sobald Änderungen im PR </a:t>
             </a:r>
             <a:r>
-              <a:rPr lang="de-DE" dirty="0" err="1"/>
+              <a:rPr lang="de-DE" sz="2000" dirty="0" err="1"/>
               <a:t>approved</a:t>
             </a:r>
             <a:r>
-              <a:rPr lang="de-DE" dirty="0"/>
+              <a:rPr lang="de-DE" sz="2000" dirty="0"/>
               <a:t> und </a:t>
             </a:r>
             <a:r>
-              <a:rPr lang="de-DE" dirty="0" err="1"/>
+              <a:rPr lang="de-DE" sz="2000" dirty="0" err="1"/>
               <a:t>merged</a:t>
             </a:r>
             <a:r>
-              <a:rPr lang="de-DE" dirty="0"/>
+              <a:rPr lang="de-DE" sz="2000" dirty="0"/>
               <a:t> sind, wird die Infrastruktur aktualisiert</a:t>
             </a:r>
           </a:p>
@@ -16390,20 +16486,53 @@
             </a:r>
           </a:p>
           <a:p>
+            <a:pPr lvl="1">
+              <a:buFont typeface="Arial" panose="020B0604020202020204" pitchFamily="34" charset="0"/>
+              <a:buChar char="•"/>
+            </a:pPr>
+            <a:r>
+              <a:rPr lang="de-DE" dirty="0"/>
+              <a:t>… und unser Main-Branch geht in die Produktion</a:t>
+            </a:r>
+          </a:p>
+          <a:p>
             <a:pPr>
               <a:buFont typeface="Arial" panose="020B0604020202020204" pitchFamily="34" charset="0"/>
               <a:buChar char="•"/>
             </a:pPr>
-            <a:r>
-              <a:rPr lang="de-DE" dirty="0"/>
-              <a:t>… und unser Main-Branch geht in die Produktion</a:t>
-            </a:r>
+            <a:endParaRPr lang="de-DE" dirty="0"/>
           </a:p>
           <a:p>
             <a:pPr>
               <a:buFont typeface="Arial" panose="020B0604020202020204" pitchFamily="34" charset="0"/>
               <a:buChar char="•"/>
             </a:pPr>
+            <a:r>
+              <a:rPr lang="de-DE" dirty="0" err="1"/>
+              <a:t>Merging</a:t>
+            </a:r>
+            <a:r>
+              <a:rPr lang="de-DE" dirty="0"/>
+              <a:t> wird schnell sehr kompliziert </a:t>
+            </a:r>
+            <a:r>
+              <a:rPr lang="de-DE" dirty="0">
+                <a:sym typeface="Wingdings" panose="05000000000000000000" pitchFamily="2" charset="2"/>
+              </a:rPr>
+              <a:t></a:t>
+            </a:r>
+          </a:p>
+          <a:p>
+            <a:pPr lvl="1">
+              <a:buFont typeface="Arial" panose="020B0604020202020204" pitchFamily="34" charset="0"/>
+              <a:buChar char="•"/>
+            </a:pPr>
+            <a:r>
+              <a:rPr lang="de-DE" dirty="0">
+                <a:sym typeface="Wingdings" panose="05000000000000000000" pitchFamily="2" charset="2"/>
+              </a:rPr>
+              <a:t>…und wird pro Stage komplexer </a:t>
+            </a:r>
             <a:endParaRPr lang="de-DE" dirty="0"/>
           </a:p>
           <a:p>
@@ -16411,20 +16540,7 @@
               <a:buFont typeface="Arial" panose="020B0604020202020204" pitchFamily="34" charset="0"/>
               <a:buChar char="•"/>
             </a:pPr>
-            <a:r>
-              <a:rPr lang="de-DE" dirty="0" err="1"/>
-              <a:t>Merging</a:t>
-            </a:r>
-            <a:r>
-              <a:rPr lang="de-DE" dirty="0"/>
-              <a:t> wird schnell sehr kompliziert </a:t>
-            </a:r>
-            <a:r>
-              <a:rPr lang="de-DE" dirty="0">
-                <a:sym typeface="Wingdings" panose="05000000000000000000" pitchFamily="2" charset="2"/>
-              </a:rPr>
-              <a:t></a:t>
-            </a:r>
+            <a:endParaRPr lang="de-DE" dirty="0"/>
           </a:p>
           <a:p>
             <a:pPr>
@@ -16435,22 +16551,8 @@
               <a:rPr lang="de-DE" dirty="0">
                 <a:sym typeface="Wingdings" panose="05000000000000000000" pitchFamily="2" charset="2"/>
               </a:rPr>
-              <a:t>…und wird pro Stage komplexer </a:t>
-            </a:r>
-            <a:endParaRPr lang="de-DE" dirty="0"/>
-          </a:p>
-          <a:p>
-            <a:pPr>
-              <a:buFont typeface="Arial" panose="020B0604020202020204" pitchFamily="34" charset="0"/>
-              <a:buChar char="•"/>
-            </a:pPr>
-            <a:endParaRPr lang="de-DE" dirty="0"/>
-          </a:p>
-          <a:p>
-            <a:pPr>
-              <a:buFont typeface="Arial" panose="020B0604020202020204" pitchFamily="34" charset="0"/>
-              <a:buChar char="•"/>
-            </a:pPr>
+              <a:t> </a:t>
+            </a:r>
             <a:r>
               <a:rPr lang="de-DE" dirty="0"/>
               <a:t>Wird generell von abgeraten!</a:t>
@@ -19119,6 +19221,205 @@
   <p:clrMapOvr>
     <a:masterClrMapping/>
   </p:clrMapOvr>
+  <p:timing>
+    <p:tnLst>
+      <p:par>
+        <p:cTn id="1" dur="indefinite" restart="never" nodeType="tmRoot">
+          <p:childTnLst>
+            <p:seq concurrent="1" nextAc="seek">
+              <p:cTn id="2" dur="indefinite" nodeType="mainSeq">
+                <p:childTnLst>
+                  <p:par>
+                    <p:cTn id="3" fill="hold">
+                      <p:stCondLst>
+                        <p:cond delay="indefinite"/>
+                      </p:stCondLst>
+                      <p:childTnLst>
+                        <p:par>
+                          <p:cTn id="4" fill="hold">
+                            <p:stCondLst>
+                              <p:cond delay="0"/>
+                            </p:stCondLst>
+                            <p:childTnLst>
+                              <p:par>
+                                <p:cTn id="5" presetID="1" presetClass="entr" presetSubtype="0" fill="hold" grpId="0" nodeType="clickEffect">
+                                  <p:stCondLst>
+                                    <p:cond delay="0"/>
+                                  </p:stCondLst>
+                                  <p:childTnLst>
+                                    <p:set>
+                                      <p:cBhvr>
+                                        <p:cTn id="6" dur="1" fill="hold">
+                                          <p:stCondLst>
+                                            <p:cond delay="0"/>
+                                          </p:stCondLst>
+                                        </p:cTn>
+                                        <p:tgtEl>
+                                          <p:spTgt spid="51"/>
+                                        </p:tgtEl>
+                                        <p:attrNameLst>
+                                          <p:attrName>style.visibility</p:attrName>
+                                        </p:attrNameLst>
+                                      </p:cBhvr>
+                                      <p:to>
+                                        <p:strVal val="visible"/>
+                                      </p:to>
+                                    </p:set>
+                                  </p:childTnLst>
+                                </p:cTn>
+                              </p:par>
+                              <p:par>
+                                <p:cTn id="7" presetID="1" presetClass="entr" presetSubtype="0" fill="hold" grpId="0" nodeType="withEffect">
+                                  <p:stCondLst>
+                                    <p:cond delay="0"/>
+                                  </p:stCondLst>
+                                  <p:childTnLst>
+                                    <p:set>
+                                      <p:cBhvr>
+                                        <p:cTn id="8" dur="1" fill="hold">
+                                          <p:stCondLst>
+                                            <p:cond delay="0"/>
+                                          </p:stCondLst>
+                                        </p:cTn>
+                                        <p:tgtEl>
+                                          <p:spTgt spid="46"/>
+                                        </p:tgtEl>
+                                        <p:attrNameLst>
+                                          <p:attrName>style.visibility</p:attrName>
+                                        </p:attrNameLst>
+                                      </p:cBhvr>
+                                      <p:to>
+                                        <p:strVal val="visible"/>
+                                      </p:to>
+                                    </p:set>
+                                  </p:childTnLst>
+                                </p:cTn>
+                              </p:par>
+                              <p:par>
+                                <p:cTn id="9" presetID="1" presetClass="entr" presetSubtype="0" fill="hold" nodeType="withEffect">
+                                  <p:stCondLst>
+                                    <p:cond delay="0"/>
+                                  </p:stCondLst>
+                                  <p:childTnLst>
+                                    <p:set>
+                                      <p:cBhvr>
+                                        <p:cTn id="10" dur="1" fill="hold">
+                                          <p:stCondLst>
+                                            <p:cond delay="0"/>
+                                          </p:stCondLst>
+                                        </p:cTn>
+                                        <p:tgtEl>
+                                          <p:spTgt spid="43">
+                                            <p:txEl>
+                                              <p:pRg st="10" end="10"/>
+                                            </p:txEl>
+                                          </p:spTgt>
+                                        </p:tgtEl>
+                                        <p:attrNameLst>
+                                          <p:attrName>style.visibility</p:attrName>
+                                        </p:attrNameLst>
+                                      </p:cBhvr>
+                                      <p:to>
+                                        <p:strVal val="visible"/>
+                                      </p:to>
+                                    </p:set>
+                                  </p:childTnLst>
+                                </p:cTn>
+                              </p:par>
+                              <p:par>
+                                <p:cTn id="11" presetID="1" presetClass="entr" presetSubtype="0" fill="hold" nodeType="withEffect">
+                                  <p:stCondLst>
+                                    <p:cond delay="0"/>
+                                  </p:stCondLst>
+                                  <p:childTnLst>
+                                    <p:set>
+                                      <p:cBhvr>
+                                        <p:cTn id="12" dur="1" fill="hold">
+                                          <p:stCondLst>
+                                            <p:cond delay="0"/>
+                                          </p:stCondLst>
+                                        </p:cTn>
+                                        <p:tgtEl>
+                                          <p:spTgt spid="43">
+                                            <p:txEl>
+                                              <p:pRg st="11" end="11"/>
+                                            </p:txEl>
+                                          </p:spTgt>
+                                        </p:tgtEl>
+                                        <p:attrNameLst>
+                                          <p:attrName>style.visibility</p:attrName>
+                                        </p:attrNameLst>
+                                      </p:cBhvr>
+                                      <p:to>
+                                        <p:strVal val="visible"/>
+                                      </p:to>
+                                    </p:set>
+                                  </p:childTnLst>
+                                </p:cTn>
+                              </p:par>
+                              <p:par>
+                                <p:cTn id="13" presetID="1" presetClass="entr" presetSubtype="0" fill="hold" nodeType="withEffect">
+                                  <p:stCondLst>
+                                    <p:cond delay="0"/>
+                                  </p:stCondLst>
+                                  <p:childTnLst>
+                                    <p:set>
+                                      <p:cBhvr>
+                                        <p:cTn id="14" dur="1" fill="hold">
+                                          <p:stCondLst>
+                                            <p:cond delay="0"/>
+                                          </p:stCondLst>
+                                        </p:cTn>
+                                        <p:tgtEl>
+                                          <p:spTgt spid="43">
+                                            <p:txEl>
+                                              <p:pRg st="12" end="12"/>
+                                            </p:txEl>
+                                          </p:spTgt>
+                                        </p:tgtEl>
+                                        <p:attrNameLst>
+                                          <p:attrName>style.visibility</p:attrName>
+                                        </p:attrNameLst>
+                                      </p:cBhvr>
+                                      <p:to>
+                                        <p:strVal val="visible"/>
+                                      </p:to>
+                                    </p:set>
+                                  </p:childTnLst>
+                                </p:cTn>
+                              </p:par>
+                            </p:childTnLst>
+                          </p:cTn>
+                        </p:par>
+                      </p:childTnLst>
+                    </p:cTn>
+                  </p:par>
+                </p:childTnLst>
+              </p:cTn>
+              <p:prevCondLst>
+                <p:cond evt="onPrev" delay="0">
+                  <p:tgtEl>
+                    <p:sldTgt/>
+                  </p:tgtEl>
+                </p:cond>
+              </p:prevCondLst>
+              <p:nextCondLst>
+                <p:cond evt="onNext" delay="0">
+                  <p:tgtEl>
+                    <p:sldTgt/>
+                  </p:tgtEl>
+                </p:cond>
+              </p:nextCondLst>
+            </p:seq>
+          </p:childTnLst>
+        </p:cTn>
+      </p:par>
+    </p:tnLst>
+    <p:bldLst>
+      <p:bldP spid="46" grpId="0"/>
+      <p:bldP spid="51" grpId="0"/>
+    </p:bldLst>
+  </p:timing>
 </p:sld>
 </file>
 

</xml_diff>